<commit_message>
pps: continued to work on poster
</commit_message>
<xml_diff>
--- a/physics_problem_solving/poster/supernova_poster.pptx
+++ b/physics_problem_solving/poster/supernova_poster.pptx
@@ -111,6 +111,9 @@
     <p:ext uri="{EFAFB233-063F-42B5-8137-9DF3F51BA10A}">
       <p15:sldGuideLst xmlns:p15="http://schemas.microsoft.com/office/powerpoint/2012/main"/>
     </p:ext>
+    <p:ext uri="{2D200454-40CA-4A62-9FC3-DE9A4176ACB9}">
+      <p15:notesGuideLst xmlns:p15="http://schemas.microsoft.com/office/powerpoint/2012/main"/>
+    </p:ext>
   </p:extLst>
 </p:presentation>
 </file>
@@ -164,7 +167,7 @@
             </a:lvl1pPr>
           </a:lstStyle>
           <a:p>
-            <a:endParaRPr lang="en-GB"/>
+            <a:endParaRPr lang="en-GB" dirty="0"/>
           </a:p>
         </p:txBody>
       </p:sp>
@@ -197,9 +200,9 @@
           <a:p>
             <a:fld id="{597BF9B5-34E6-3748-A3AE-97D3F6023AC7}" type="datetimeFigureOut">
               <a:rPr lang="en-GB" smtClean="0"/>
-              <a:t>24/01/2018</a:t>
+              <a:t>26/01/2018</a:t>
             </a:fld>
-            <a:endParaRPr lang="en-GB"/>
+            <a:endParaRPr lang="en-GB" dirty="0"/>
           </a:p>
         </p:txBody>
       </p:sp>
@@ -232,7 +235,7 @@
           <a:bodyPr vert="horz" lIns="91440" tIns="45720" rIns="91440" bIns="45720" rtlCol="0" anchor="ctr"/>
           <a:lstStyle/>
           <a:p>
-            <a:endParaRPr lang="en-GB"/>
+            <a:endParaRPr lang="en-GB" dirty="0"/>
           </a:p>
         </p:txBody>
       </p:sp>
@@ -323,7 +326,7 @@
             </a:lvl1pPr>
           </a:lstStyle>
           <a:p>
-            <a:endParaRPr lang="en-GB"/>
+            <a:endParaRPr lang="en-GB" dirty="0"/>
           </a:p>
         </p:txBody>
       </p:sp>
@@ -358,7 +361,7 @@
               <a:rPr lang="en-GB" smtClean="0"/>
               <a:t>‹#›</a:t>
             </a:fld>
-            <a:endParaRPr lang="en-GB"/>
+            <a:endParaRPr lang="en-GB" dirty="0"/>
           </a:p>
         </p:txBody>
       </p:sp>
@@ -564,7 +567,7 @@
               <a:rPr lang="en-GB" smtClean="0"/>
               <a:t>1</a:t>
             </a:fld>
-            <a:endParaRPr lang="en-GB"/>
+            <a:endParaRPr lang="en-GB" dirty="0"/>
           </a:p>
         </p:txBody>
       </p:sp>
@@ -712,9 +715,9 @@
           <a:p>
             <a:fld id="{E93572D2-1BD6-954F-86C4-419D8535D635}" type="datetimeFigureOut">
               <a:rPr lang="en-GB" smtClean="0"/>
-              <a:t>24/01/2018</a:t>
+              <a:t>26/01/2018</a:t>
             </a:fld>
-            <a:endParaRPr lang="en-GB"/>
+            <a:endParaRPr lang="en-GB" dirty="0"/>
           </a:p>
         </p:txBody>
       </p:sp>
@@ -733,7 +736,7 @@
           <a:bodyPr/>
           <a:lstStyle/>
           <a:p>
-            <a:endParaRPr lang="en-GB"/>
+            <a:endParaRPr lang="en-GB" dirty="0"/>
           </a:p>
         </p:txBody>
       </p:sp>
@@ -756,7 +759,7 @@
               <a:rPr lang="en-GB" smtClean="0"/>
               <a:t>‹#›</a:t>
             </a:fld>
-            <a:endParaRPr lang="en-GB"/>
+            <a:endParaRPr lang="en-GB" dirty="0"/>
           </a:p>
         </p:txBody>
       </p:sp>
@@ -877,9 +880,9 @@
           <a:p>
             <a:fld id="{E93572D2-1BD6-954F-86C4-419D8535D635}" type="datetimeFigureOut">
               <a:rPr lang="en-GB" smtClean="0"/>
-              <a:t>24/01/2018</a:t>
+              <a:t>26/01/2018</a:t>
             </a:fld>
-            <a:endParaRPr lang="en-GB"/>
+            <a:endParaRPr lang="en-GB" dirty="0"/>
           </a:p>
         </p:txBody>
       </p:sp>
@@ -898,7 +901,7 @@
           <a:bodyPr/>
           <a:lstStyle/>
           <a:p>
-            <a:endParaRPr lang="en-GB"/>
+            <a:endParaRPr lang="en-GB" dirty="0"/>
           </a:p>
         </p:txBody>
       </p:sp>
@@ -921,7 +924,7 @@
               <a:rPr lang="en-GB" smtClean="0"/>
               <a:t>‹#›</a:t>
             </a:fld>
-            <a:endParaRPr lang="en-GB"/>
+            <a:endParaRPr lang="en-GB" dirty="0"/>
           </a:p>
         </p:txBody>
       </p:sp>
@@ -1052,9 +1055,9 @@
           <a:p>
             <a:fld id="{E93572D2-1BD6-954F-86C4-419D8535D635}" type="datetimeFigureOut">
               <a:rPr lang="en-GB" smtClean="0"/>
-              <a:t>24/01/2018</a:t>
+              <a:t>26/01/2018</a:t>
             </a:fld>
-            <a:endParaRPr lang="en-GB"/>
+            <a:endParaRPr lang="en-GB" dirty="0"/>
           </a:p>
         </p:txBody>
       </p:sp>
@@ -1073,7 +1076,7 @@
           <a:bodyPr/>
           <a:lstStyle/>
           <a:p>
-            <a:endParaRPr lang="en-GB"/>
+            <a:endParaRPr lang="en-GB" dirty="0"/>
           </a:p>
         </p:txBody>
       </p:sp>
@@ -1096,7 +1099,7 @@
               <a:rPr lang="en-GB" smtClean="0"/>
               <a:t>‹#›</a:t>
             </a:fld>
-            <a:endParaRPr lang="en-GB"/>
+            <a:endParaRPr lang="en-GB" dirty="0"/>
           </a:p>
         </p:txBody>
       </p:sp>
@@ -1217,9 +1220,9 @@
           <a:p>
             <a:fld id="{E93572D2-1BD6-954F-86C4-419D8535D635}" type="datetimeFigureOut">
               <a:rPr lang="en-GB" smtClean="0"/>
-              <a:t>24/01/2018</a:t>
+              <a:t>26/01/2018</a:t>
             </a:fld>
-            <a:endParaRPr lang="en-GB"/>
+            <a:endParaRPr lang="en-GB" dirty="0"/>
           </a:p>
         </p:txBody>
       </p:sp>
@@ -1238,7 +1241,7 @@
           <a:bodyPr/>
           <a:lstStyle/>
           <a:p>
-            <a:endParaRPr lang="en-GB"/>
+            <a:endParaRPr lang="en-GB" dirty="0"/>
           </a:p>
         </p:txBody>
       </p:sp>
@@ -1261,7 +1264,7 @@
               <a:rPr lang="en-GB" smtClean="0"/>
               <a:t>‹#›</a:t>
             </a:fld>
-            <a:endParaRPr lang="en-GB"/>
+            <a:endParaRPr lang="en-GB" dirty="0"/>
           </a:p>
         </p:txBody>
       </p:sp>
@@ -1456,9 +1459,9 @@
           <a:p>
             <a:fld id="{E93572D2-1BD6-954F-86C4-419D8535D635}" type="datetimeFigureOut">
               <a:rPr lang="en-GB" smtClean="0"/>
-              <a:t>24/01/2018</a:t>
+              <a:t>26/01/2018</a:t>
             </a:fld>
-            <a:endParaRPr lang="en-GB"/>
+            <a:endParaRPr lang="en-GB" dirty="0"/>
           </a:p>
         </p:txBody>
       </p:sp>
@@ -1477,7 +1480,7 @@
           <a:bodyPr/>
           <a:lstStyle/>
           <a:p>
-            <a:endParaRPr lang="en-GB"/>
+            <a:endParaRPr lang="en-GB" dirty="0"/>
           </a:p>
         </p:txBody>
       </p:sp>
@@ -1500,7 +1503,7 @@
               <a:rPr lang="en-GB" smtClean="0"/>
               <a:t>‹#›</a:t>
             </a:fld>
-            <a:endParaRPr lang="en-GB"/>
+            <a:endParaRPr lang="en-GB" dirty="0"/>
           </a:p>
         </p:txBody>
       </p:sp>
@@ -1683,9 +1686,9 @@
           <a:p>
             <a:fld id="{E93572D2-1BD6-954F-86C4-419D8535D635}" type="datetimeFigureOut">
               <a:rPr lang="en-GB" smtClean="0"/>
-              <a:t>24/01/2018</a:t>
+              <a:t>26/01/2018</a:t>
             </a:fld>
-            <a:endParaRPr lang="en-GB"/>
+            <a:endParaRPr lang="en-GB" dirty="0"/>
           </a:p>
         </p:txBody>
       </p:sp>
@@ -1704,7 +1707,7 @@
           <a:bodyPr/>
           <a:lstStyle/>
           <a:p>
-            <a:endParaRPr lang="en-GB"/>
+            <a:endParaRPr lang="en-GB" dirty="0"/>
           </a:p>
         </p:txBody>
       </p:sp>
@@ -1727,7 +1730,7 @@
               <a:rPr lang="en-GB" smtClean="0"/>
               <a:t>‹#›</a:t>
             </a:fld>
-            <a:endParaRPr lang="en-GB"/>
+            <a:endParaRPr lang="en-GB" dirty="0"/>
           </a:p>
         </p:txBody>
       </p:sp>
@@ -2045,9 +2048,9 @@
           <a:p>
             <a:fld id="{E93572D2-1BD6-954F-86C4-419D8535D635}" type="datetimeFigureOut">
               <a:rPr lang="en-GB" smtClean="0"/>
-              <a:t>24/01/2018</a:t>
+              <a:t>26/01/2018</a:t>
             </a:fld>
-            <a:endParaRPr lang="en-GB"/>
+            <a:endParaRPr lang="en-GB" dirty="0"/>
           </a:p>
         </p:txBody>
       </p:sp>
@@ -2066,7 +2069,7 @@
           <a:bodyPr/>
           <a:lstStyle/>
           <a:p>
-            <a:endParaRPr lang="en-GB"/>
+            <a:endParaRPr lang="en-GB" dirty="0"/>
           </a:p>
         </p:txBody>
       </p:sp>
@@ -2089,7 +2092,7 @@
               <a:rPr lang="en-GB" smtClean="0"/>
               <a:t>‹#›</a:t>
             </a:fld>
-            <a:endParaRPr lang="en-GB"/>
+            <a:endParaRPr lang="en-GB" dirty="0"/>
           </a:p>
         </p:txBody>
       </p:sp>
@@ -2158,9 +2161,9 @@
           <a:p>
             <a:fld id="{E93572D2-1BD6-954F-86C4-419D8535D635}" type="datetimeFigureOut">
               <a:rPr lang="en-GB" smtClean="0"/>
-              <a:t>24/01/2018</a:t>
+              <a:t>26/01/2018</a:t>
             </a:fld>
-            <a:endParaRPr lang="en-GB"/>
+            <a:endParaRPr lang="en-GB" dirty="0"/>
           </a:p>
         </p:txBody>
       </p:sp>
@@ -2179,7 +2182,7 @@
           <a:bodyPr/>
           <a:lstStyle/>
           <a:p>
-            <a:endParaRPr lang="en-GB"/>
+            <a:endParaRPr lang="en-GB" dirty="0"/>
           </a:p>
         </p:txBody>
       </p:sp>
@@ -2202,7 +2205,7 @@
               <a:rPr lang="en-GB" smtClean="0"/>
               <a:t>‹#›</a:t>
             </a:fld>
-            <a:endParaRPr lang="en-GB"/>
+            <a:endParaRPr lang="en-GB" dirty="0"/>
           </a:p>
         </p:txBody>
       </p:sp>
@@ -2248,9 +2251,9 @@
           <a:p>
             <a:fld id="{E93572D2-1BD6-954F-86C4-419D8535D635}" type="datetimeFigureOut">
               <a:rPr lang="en-GB" smtClean="0"/>
-              <a:t>24/01/2018</a:t>
+              <a:t>26/01/2018</a:t>
             </a:fld>
-            <a:endParaRPr lang="en-GB"/>
+            <a:endParaRPr lang="en-GB" dirty="0"/>
           </a:p>
         </p:txBody>
       </p:sp>
@@ -2269,7 +2272,7 @@
           <a:bodyPr/>
           <a:lstStyle/>
           <a:p>
-            <a:endParaRPr lang="en-GB"/>
+            <a:endParaRPr lang="en-GB" dirty="0"/>
           </a:p>
         </p:txBody>
       </p:sp>
@@ -2292,7 +2295,7 @@
               <a:rPr lang="en-GB" smtClean="0"/>
               <a:t>‹#›</a:t>
             </a:fld>
-            <a:endParaRPr lang="en-GB"/>
+            <a:endParaRPr lang="en-GB" dirty="0"/>
           </a:p>
         </p:txBody>
       </p:sp>
@@ -2520,9 +2523,9 @@
           <a:p>
             <a:fld id="{E93572D2-1BD6-954F-86C4-419D8535D635}" type="datetimeFigureOut">
               <a:rPr lang="en-GB" smtClean="0"/>
-              <a:t>24/01/2018</a:t>
+              <a:t>26/01/2018</a:t>
             </a:fld>
-            <a:endParaRPr lang="en-GB"/>
+            <a:endParaRPr lang="en-GB" dirty="0"/>
           </a:p>
         </p:txBody>
       </p:sp>
@@ -2541,7 +2544,7 @@
           <a:bodyPr/>
           <a:lstStyle/>
           <a:p>
-            <a:endParaRPr lang="en-GB"/>
+            <a:endParaRPr lang="en-GB" dirty="0"/>
           </a:p>
         </p:txBody>
       </p:sp>
@@ -2564,7 +2567,7 @@
               <a:rPr lang="en-GB" smtClean="0"/>
               <a:t>‹#›</a:t>
             </a:fld>
-            <a:endParaRPr lang="en-GB"/>
+            <a:endParaRPr lang="en-GB" dirty="0"/>
           </a:p>
         </p:txBody>
       </p:sp>
@@ -2683,10 +2686,9 @@
           </a:lstStyle>
           <a:p>
             <a:r>
-              <a:rPr lang="en-US"/>
+              <a:rPr lang="en-US" dirty="0"/>
               <a:t>Drag picture to placeholder or click icon to add</a:t>
             </a:r>
-            <a:endParaRPr lang="en-US" dirty="0"/>
           </a:p>
         </p:txBody>
       </p:sp>
@@ -2772,9 +2774,9 @@
           <a:p>
             <a:fld id="{E93572D2-1BD6-954F-86C4-419D8535D635}" type="datetimeFigureOut">
               <a:rPr lang="en-GB" smtClean="0"/>
-              <a:t>24/01/2018</a:t>
+              <a:t>26/01/2018</a:t>
             </a:fld>
-            <a:endParaRPr lang="en-GB"/>
+            <a:endParaRPr lang="en-GB" dirty="0"/>
           </a:p>
         </p:txBody>
       </p:sp>
@@ -2793,7 +2795,7 @@
           <a:bodyPr/>
           <a:lstStyle/>
           <a:p>
-            <a:endParaRPr lang="en-GB"/>
+            <a:endParaRPr lang="en-GB" dirty="0"/>
           </a:p>
         </p:txBody>
       </p:sp>
@@ -2816,7 +2818,7 @@
               <a:rPr lang="en-GB" smtClean="0"/>
               <a:t>‹#›</a:t>
             </a:fld>
-            <a:endParaRPr lang="en-GB"/>
+            <a:endParaRPr lang="en-GB" dirty="0"/>
           </a:p>
         </p:txBody>
       </p:sp>
@@ -2980,9 +2982,9 @@
           <a:p>
             <a:fld id="{E93572D2-1BD6-954F-86C4-419D8535D635}" type="datetimeFigureOut">
               <a:rPr lang="en-GB" smtClean="0"/>
-              <a:t>24/01/2018</a:t>
+              <a:t>26/01/2018</a:t>
             </a:fld>
-            <a:endParaRPr lang="en-GB"/>
+            <a:endParaRPr lang="en-GB" dirty="0"/>
           </a:p>
         </p:txBody>
       </p:sp>
@@ -3019,7 +3021,7 @@
             </a:lvl1pPr>
           </a:lstStyle>
           <a:p>
-            <a:endParaRPr lang="en-GB"/>
+            <a:endParaRPr lang="en-GB" dirty="0"/>
           </a:p>
         </p:txBody>
       </p:sp>
@@ -3060,7 +3062,7 @@
               <a:rPr lang="en-GB" smtClean="0"/>
               <a:t>‹#›</a:t>
             </a:fld>
-            <a:endParaRPr lang="en-GB"/>
+            <a:endParaRPr lang="en-GB" dirty="0"/>
           </a:p>
         </p:txBody>
       </p:sp>
@@ -3795,27 +3797,10 @@
           <a:lstStyle/>
           <a:p>
             <a:pPr algn="ctr"/>
-            <a:r>
-              <a:rPr lang="en-GB" sz="1800" i="1" dirty="0">
-                <a:latin typeface="Roboto Mono" pitchFamily="2" charset="0"/>
-                <a:ea typeface="Roboto Mono" pitchFamily="2" charset="0"/>
-              </a:rPr>
-              <a:t>v=H</a:t>
-            </a:r>
-            <a:r>
-              <a:rPr lang="en-GB" sz="1800" i="1" baseline="-25000" dirty="0">
-                <a:latin typeface="Roboto Mono" pitchFamily="2" charset="0"/>
-                <a:ea typeface="Roboto Mono" pitchFamily="2" charset="0"/>
-              </a:rPr>
-              <a:t>0</a:t>
-            </a:r>
-            <a:r>
-              <a:rPr lang="en-GB" sz="1800" i="1" dirty="0">
-                <a:latin typeface="Roboto Mono" pitchFamily="2" charset="0"/>
-                <a:ea typeface="Roboto Mono" pitchFamily="2" charset="0"/>
-              </a:rPr>
-              <a:t>d</a:t>
-            </a:r>
+            <a:endParaRPr lang="en-GB" sz="1800" i="1" dirty="0">
+              <a:latin typeface="Roboto Mono" pitchFamily="2" charset="0"/>
+              <a:ea typeface="Roboto Mono" pitchFamily="2" charset="0"/>
+            </a:endParaRPr>
           </a:p>
         </p:txBody>
       </p:sp>
@@ -3922,7 +3907,7 @@
             <a:avLst/>
           </a:prstGeom>
           <a:solidFill>
-            <a:srgbClr val="0188D1"/>
+            <a:srgbClr val="1976D2"/>
           </a:solidFill>
           <a:ln>
             <a:noFill/>
@@ -3967,8 +3952,8 @@
         </p:nvSpPr>
         <p:spPr>
           <a:xfrm>
-            <a:off x="712465" y="3684144"/>
-            <a:ext cx="4497256" cy="1892826"/>
+            <a:off x="712465" y="3716228"/>
+            <a:ext cx="4497256" cy="5180905"/>
           </a:xfrm>
           <a:prstGeom prst="rect">
             <a:avLst/>
@@ -3982,19 +3967,19 @@
           <a:lstStyle/>
           <a:p>
             <a:r>
-              <a:rPr lang="en-GB" sz="1300" dirty="0">
+              <a:rPr lang="en-GB" sz="1600" dirty="0">
                 <a:solidFill>
                   <a:schemeClr val="bg1"/>
                 </a:solidFill>
                 <a:latin typeface="Roboto Mono" pitchFamily="2" charset="0"/>
                 <a:ea typeface="Roboto Mono" pitchFamily="2" charset="0"/>
               </a:rPr>
-              <a:t>To probe the geometry of the Universe, Type Ia supernovae can be utilised. Known for their curious homogenous nature, they are useful as standard candles, a feature which can be taken advantage of in cosmology.</a:t>
-            </a:r>
-          </a:p>
-          <a:p>
-            <a:r>
-              <a:rPr lang="en-GB" sz="1300" dirty="0">
+              <a:t>To probe the geometry of the Universe, Type Ia supernovae can be utilised. Known for their curious homogenous nature, they are used as standard candles, a feature which can be taken advantage of to calibrate cosmic distances.</a:t>
+            </a:r>
+          </a:p>
+          <a:p>
+            <a:r>
+              <a:rPr lang="en-GB" sz="1600" dirty="0">
                 <a:solidFill>
                   <a:schemeClr val="bg1"/>
                 </a:solidFill>
@@ -4006,14 +3991,105 @@
           </a:p>
           <a:p>
             <a:r>
-              <a:rPr lang="en-GB" sz="1300" dirty="0">
+              <a:rPr lang="en-GB" sz="1600" dirty="0">
                 <a:solidFill>
                   <a:schemeClr val="bg1"/>
                 </a:solidFill>
                 <a:latin typeface="Roboto Mono" pitchFamily="2" charset="0"/>
                 <a:ea typeface="Roboto Mono" pitchFamily="2" charset="0"/>
               </a:rPr>
-              <a:t>Through measuring the change in their magnitude with time, a ‘light-curve’ can be plotted and a maximum magnitude obtained. </a:t>
+              <a:t>Through measuring their magnitude as time evolves, a ‘light-curve’ can be plotted and a maximum B-band magnitude obtained. With this and a value for the supernova redshift, </a:t>
+            </a:r>
+            <a:r>
+              <a:rPr lang="en-GB" sz="1600" i="1" dirty="0">
+                <a:solidFill>
+                  <a:schemeClr val="bg1"/>
+                </a:solidFill>
+                <a:latin typeface="Roboto Mono Medium" pitchFamily="2" charset="0"/>
+                <a:ea typeface="Roboto Mono Medium" pitchFamily="2" charset="0"/>
+              </a:rPr>
+              <a:t>z</a:t>
+            </a:r>
+            <a:r>
+              <a:rPr lang="en-GB" sz="1600" dirty="0">
+                <a:solidFill>
+                  <a:schemeClr val="bg1"/>
+                </a:solidFill>
+                <a:latin typeface="Roboto Mono" pitchFamily="2" charset="0"/>
+                <a:ea typeface="Roboto Mono" pitchFamily="2" charset="0"/>
+              </a:rPr>
+              <a:t>, we can use Hubble’s Law and the Friedmann equation to find a value for the dark energy density, </a:t>
+            </a:r>
+            <a:r>
+              <a:rPr lang="el-GR" sz="1600" i="1" dirty="0">
+                <a:solidFill>
+                  <a:schemeClr val="bg1"/>
+                </a:solidFill>
+                <a:latin typeface="Roboto Mono Medium" pitchFamily="2" charset="0"/>
+                <a:ea typeface="Roboto Mono Medium" pitchFamily="2" charset="0"/>
+              </a:rPr>
+              <a:t>Ω</a:t>
+            </a:r>
+            <a:r>
+              <a:rPr lang="en-GB" sz="1600" i="1" baseline="-25000" dirty="0">
+                <a:solidFill>
+                  <a:schemeClr val="bg1"/>
+                </a:solidFill>
+                <a:latin typeface="Roboto Mono Medium" pitchFamily="2" charset="0"/>
+                <a:ea typeface="Roboto Mono Medium" pitchFamily="2" charset="0"/>
+              </a:rPr>
+              <a:t>Λ</a:t>
+            </a:r>
+            <a:r>
+              <a:rPr lang="en-GB" sz="1600" dirty="0">
+                <a:solidFill>
+                  <a:schemeClr val="bg1"/>
+                </a:solidFill>
+                <a:latin typeface="Roboto Mono Medium" pitchFamily="2" charset="0"/>
+                <a:ea typeface="Roboto Mono Medium" pitchFamily="2" charset="0"/>
+              </a:rPr>
+              <a:t>.</a:t>
+            </a:r>
+            <a:r>
+              <a:rPr lang="en-GB" sz="1600" baseline="-25000" dirty="0">
+                <a:solidFill>
+                  <a:schemeClr val="bg1"/>
+                </a:solidFill>
+                <a:latin typeface="Roboto Mono Medium" pitchFamily="2" charset="0"/>
+                <a:ea typeface="Roboto Mono Medium" pitchFamily="2" charset="0"/>
+              </a:rPr>
+              <a:t> </a:t>
+            </a:r>
+          </a:p>
+          <a:p>
+            <a:endParaRPr lang="en-GB" sz="1600" baseline="-25000" dirty="0">
+              <a:solidFill>
+                <a:schemeClr val="bg1"/>
+              </a:solidFill>
+              <a:latin typeface="Roboto Mono Medium" pitchFamily="2" charset="0"/>
+              <a:ea typeface="Roboto Mono Medium" pitchFamily="2" charset="0"/>
+            </a:endParaRPr>
+          </a:p>
+          <a:p>
+            <a:r>
+              <a:rPr lang="en-GB" sz="1600" dirty="0">
+                <a:solidFill>
+                  <a:schemeClr val="bg1"/>
+                </a:solidFill>
+                <a:latin typeface="Roboto Mono" pitchFamily="2" charset="0"/>
+                <a:ea typeface="Roboto Mono" pitchFamily="2" charset="0"/>
+              </a:rPr>
+              <a:t>In our model, the following equation was utilised in the Friedmann equation as the </a:t>
+            </a:r>
+            <a:r>
+              <a:rPr lang="en-GB" sz="1600" dirty="0">
+                <a:solidFill>
+                  <a:schemeClr val="bg1"/>
+                </a:solidFill>
+                <a:latin typeface="Roboto Mono Medium" pitchFamily="2" charset="0"/>
+                <a:ea typeface="Roboto Mono Medium" pitchFamily="2" charset="0"/>
+              </a:rPr>
+              <a:t>Hubble Parameter, </a:t>
             </a:r>
           </a:p>
         </p:txBody>
@@ -4950,8 +5026,8 @@
               </p:nvSpPr>
               <p:spPr>
                 <a:xfrm>
-                  <a:off x="8245003" y="5778523"/>
-                  <a:ext cx="1438214" cy="307777"/>
+                  <a:off x="8052963" y="5758437"/>
+                  <a:ext cx="1624163" cy="338554"/>
                 </a:xfrm>
                 <a:prstGeom prst="rect">
                   <a:avLst/>
@@ -4965,27 +5041,27 @@
                 <a:lstStyle/>
                 <a:p>
                   <a:r>
-                    <a:rPr lang="el-GR" sz="1400" b="1" dirty="0">
+                    <a:rPr lang="el-GR" sz="1600" b="1" dirty="0">
                       <a:latin typeface="Roboto Mono" pitchFamily="2" charset="0"/>
                       <a:ea typeface="Roboto Mono" pitchFamily="2" charset="0"/>
                     </a:rPr>
                     <a:t>Ω</a:t>
                   </a:r>
                   <a:r>
-                    <a:rPr lang="en-GB" sz="1400" b="1" baseline="-25000" dirty="0">
+                    <a:rPr lang="en-GB" sz="1600" b="1" baseline="-25000" dirty="0">
                       <a:latin typeface="Roboto Mono" pitchFamily="2" charset="0"/>
                       <a:ea typeface="Roboto Mono" pitchFamily="2" charset="0"/>
                     </a:rPr>
                     <a:t>Λ</a:t>
                   </a:r>
                   <a:r>
-                    <a:rPr lang="en-GB" sz="1400" dirty="0">
+                    <a:rPr lang="en-GB" sz="1600" dirty="0">
                       <a:latin typeface="Roboto Mono" pitchFamily="2" charset="0"/>
                       <a:ea typeface="Roboto Mono" pitchFamily="2" charset="0"/>
                     </a:rPr>
                     <a:t>=0.86±0.04</a:t>
                   </a:r>
-                  <a:endParaRPr lang="en-GB" sz="1400" b="1" dirty="0">
+                  <a:endParaRPr lang="en-GB" sz="1600" b="1" dirty="0">
                     <a:latin typeface="Roboto Mono" pitchFamily="2" charset="0"/>
                     <a:ea typeface="Roboto Mono" pitchFamily="2" charset="0"/>
                   </a:endParaRPr>
@@ -5006,8 +5082,8 @@
               </p:nvSpPr>
               <p:spPr>
                 <a:xfrm>
-                  <a:off x="8245003" y="6031100"/>
-                  <a:ext cx="1438214" cy="307777"/>
+                  <a:off x="8052964" y="6000723"/>
+                  <a:ext cx="1624163" cy="338554"/>
                 </a:xfrm>
                 <a:prstGeom prst="rect">
                   <a:avLst/>
@@ -5021,27 +5097,27 @@
                 <a:lstStyle/>
                 <a:p>
                   <a:r>
-                    <a:rPr lang="el-GR" sz="1400" b="1" dirty="0">
+                    <a:rPr lang="el-GR" sz="1600" b="1" dirty="0">
                       <a:latin typeface="Roboto Mono" pitchFamily="2" charset="0"/>
                       <a:ea typeface="Roboto Mono" pitchFamily="2" charset="0"/>
                     </a:rPr>
                     <a:t>Ω</a:t>
                   </a:r>
                   <a:r>
-                    <a:rPr lang="en-GB" sz="1400" b="1" baseline="-25000" dirty="0">
+                    <a:rPr lang="en-GB" sz="1600" b="1" baseline="-25000" dirty="0">
                       <a:latin typeface="Roboto Mono" pitchFamily="2" charset="0"/>
                       <a:ea typeface="Roboto Mono" pitchFamily="2" charset="0"/>
                     </a:rPr>
                     <a:t>Λ</a:t>
                   </a:r>
                   <a:r>
-                    <a:rPr lang="en-GB" sz="1400" dirty="0">
+                    <a:rPr lang="en-GB" sz="1600" dirty="0">
                       <a:latin typeface="Roboto Mono" pitchFamily="2" charset="0"/>
                       <a:ea typeface="Roboto Mono" pitchFamily="2" charset="0"/>
                     </a:rPr>
                     <a:t>=0.74±0.01</a:t>
                   </a:r>
-                  <a:endParaRPr lang="en-GB" sz="1400" b="1" dirty="0">
+                  <a:endParaRPr lang="en-GB" sz="1600" b="1" dirty="0">
                     <a:latin typeface="Roboto Mono" pitchFamily="2" charset="0"/>
                     <a:ea typeface="Roboto Mono" pitchFamily="2" charset="0"/>
                   </a:endParaRPr>
@@ -5064,8 +5140,8 @@
               </p:nvCxnSpPr>
               <p:spPr>
                 <a:xfrm>
-                  <a:off x="8042170" y="5930994"/>
-                  <a:ext cx="215533" cy="0"/>
+                  <a:off x="7707360" y="5937275"/>
+                  <a:ext cx="345603" cy="0"/>
                 </a:xfrm>
                 <a:prstGeom prst="line">
                   <a:avLst/>
@@ -5107,8 +5183,8 @@
               </p:nvCxnSpPr>
               <p:spPr>
                 <a:xfrm>
-                  <a:off x="8042170" y="6172288"/>
-                  <a:ext cx="215533" cy="0"/>
+                  <a:off x="7707360" y="6170000"/>
+                  <a:ext cx="345603" cy="0"/>
                 </a:xfrm>
                 <a:prstGeom prst="line">
                   <a:avLst/>
@@ -5266,7 +5342,7 @@
         <p:spPr>
           <a:xfrm>
             <a:off x="651052" y="10302945"/>
-            <a:ext cx="4410671" cy="523220"/>
+            <a:ext cx="4410671" cy="1569660"/>
           </a:xfrm>
           <a:prstGeom prst="rect">
             <a:avLst/>
@@ -5280,11 +5356,11 @@
           <a:lstStyle/>
           <a:p>
             <a:r>
-              <a:rPr lang="en-GB" sz="1400" dirty="0">
+              <a:rPr lang="en-GB" sz="1600" dirty="0">
                 <a:latin typeface="Roboto Mono" pitchFamily="2" charset="0"/>
                 <a:ea typeface="Roboto Mono" pitchFamily="2" charset="0"/>
               </a:rPr>
-              <a:t>What if we wanted to find the parameters of the universe?</a:t>
+              <a:t>In exploring more complex models of the universe, we are required to find multiple parameters instead of one. With this we have to sample a parameter space instead of </a:t>
             </a:r>
           </a:p>
         </p:txBody>
@@ -5304,7 +5380,7 @@
         <p:spPr>
           <a:xfrm>
             <a:off x="5245598" y="6757467"/>
-            <a:ext cx="4410671" cy="1685077"/>
+            <a:ext cx="4410671" cy="2546851"/>
           </a:xfrm>
           <a:prstGeom prst="rect">
             <a:avLst/>
@@ -5318,28 +5394,28 @@
           <a:lstStyle/>
           <a:p>
             <a:r>
-              <a:rPr lang="en-GB" sz="1150" dirty="0">
+              <a:rPr lang="en-GB" sz="1450" dirty="0">
                 <a:latin typeface="Roboto Mono" pitchFamily="2" charset="0"/>
                 <a:ea typeface="Roboto Mono" pitchFamily="2" charset="0"/>
               </a:rPr>
               <a:t>FIG. 1: Hubble’s diagram plotted with data from the Supernova Cosmology Project and using data provided for our initial research – uncertainties have been plotted as well. Two models were also fitted, one using </a:t>
             </a:r>
             <a:r>
-              <a:rPr lang="el-GR" sz="1150" dirty="0">
+              <a:rPr lang="el-GR" sz="1450" dirty="0">
                 <a:latin typeface="Roboto Mono" pitchFamily="2" charset="0"/>
                 <a:ea typeface="Roboto Mono" pitchFamily="2" charset="0"/>
               </a:rPr>
               <a:t>Ω</a:t>
             </a:r>
             <a:r>
-              <a:rPr lang="en-GB" sz="1150" baseline="-25000" dirty="0">
+              <a:rPr lang="en-GB" sz="1450" baseline="-25000" dirty="0">
                 <a:latin typeface="Roboto Mono" pitchFamily="2" charset="0"/>
                 <a:ea typeface="Roboto Mono" pitchFamily="2" charset="0"/>
               </a:rPr>
               <a:t>Λ </a:t>
             </a:r>
             <a:r>
-              <a:rPr lang="en-GB" sz="1150" dirty="0">
+              <a:rPr lang="en-GB" sz="1450" dirty="0">
                 <a:latin typeface="Roboto Mono" pitchFamily="2" charset="0"/>
                 <a:ea typeface="Roboto Mono" pitchFamily="2" charset="0"/>
               </a:rPr>
@@ -5396,7 +5472,7 @@
           <a:lstStyle/>
           <a:p>
             <a:pPr algn="ctr"/>
-            <a:endParaRPr lang="en-GB"/>
+            <a:endParaRPr lang="en-GB" dirty="0"/>
           </a:p>
         </p:txBody>
       </p:sp>
@@ -5485,8 +5561,8 @@
         </p:nvSpPr>
         <p:spPr>
           <a:xfrm>
-            <a:off x="9994443" y="3199207"/>
-            <a:ext cx="4640819" cy="523220"/>
+            <a:off x="9919141" y="3231944"/>
+            <a:ext cx="4318436" cy="523220"/>
           </a:xfrm>
           <a:prstGeom prst="rect">
             <a:avLst/>
@@ -5514,10 +5590,10 @@
       </p:sp>
       <p:sp>
         <p:nvSpPr>
-          <p:cNvPr id="59" name="Rectangle 58">
+          <p:cNvPr id="67" name="Rectangle 66">
             <a:extLst>
               <a:ext uri="{FF2B5EF4-FFF2-40B4-BE49-F238E27FC236}">
-                <a16:creationId xmlns:a16="http://schemas.microsoft.com/office/drawing/2014/main" id="{21D227BD-4C54-E84D-8813-D4B9E41723BD}"/>
+                <a16:creationId xmlns:a16="http://schemas.microsoft.com/office/drawing/2014/main" id="{BD940DD7-93B9-514A-B446-4483BCCF3590}"/>
               </a:ext>
             </a:extLst>
           </p:cNvPr>
@@ -5526,14 +5602,14 @@
         </p:nvSpPr>
         <p:spPr>
           <a:xfrm>
-            <a:off x="9885181" y="3793264"/>
-            <a:ext cx="4553994" cy="3151577"/>
+            <a:off x="9879362" y="6795360"/>
+            <a:ext cx="4559813" cy="2633150"/>
           </a:xfrm>
           <a:prstGeom prst="rect">
             <a:avLst/>
           </a:prstGeom>
           <a:solidFill>
-            <a:srgbClr val="03A9F4"/>
+            <a:srgbClr val="EDEDED"/>
           </a:solidFill>
           <a:ln>
             <a:noFill/>
@@ -5566,10 +5642,10 @@
       </p:sp>
       <p:sp>
         <p:nvSpPr>
-          <p:cNvPr id="61" name="Right Triangle 60">
+          <p:cNvPr id="59" name="Rectangle 58">
             <a:extLst>
               <a:ext uri="{FF2B5EF4-FFF2-40B4-BE49-F238E27FC236}">
-                <a16:creationId xmlns:a16="http://schemas.microsoft.com/office/drawing/2014/main" id="{5803AA44-A7B3-2F44-9B50-95AAA1966B21}"/>
+                <a16:creationId xmlns:a16="http://schemas.microsoft.com/office/drawing/2014/main" id="{21D227BD-4C54-E84D-8813-D4B9E41723BD}"/>
               </a:ext>
             </a:extLst>
           </p:cNvPr>
@@ -5578,18 +5654,25 @@
         </p:nvSpPr>
         <p:spPr>
           <a:xfrm>
-            <a:off x="9885181" y="7575260"/>
-            <a:ext cx="2467553" cy="1097013"/>
+            <a:off x="9885181" y="3755164"/>
+            <a:ext cx="4553994" cy="3063265"/>
           </a:xfrm>
-          <a:prstGeom prst="rtTriangle">
+          <a:prstGeom prst="rect">
             <a:avLst/>
           </a:prstGeom>
           <a:solidFill>
-            <a:schemeClr val="bg1"/>
+            <a:srgbClr val="2096F4"/>
           </a:solidFill>
           <a:ln>
             <a:noFill/>
           </a:ln>
+          <a:effectLst>
+            <a:outerShdw blurRad="50800" dist="38100" dir="5400000" algn="t" rotWithShape="0">
+              <a:prstClr val="black">
+                <a:alpha val="15000"/>
+              </a:prstClr>
+            </a:outerShdw>
+          </a:effectLst>
         </p:spPr>
         <p:style>
           <a:lnRef idx="2">
@@ -5612,7 +5695,7 @@
           <a:lstStyle/>
           <a:p>
             <a:pPr algn="ctr"/>
-            <a:endParaRPr lang="en-GB"/>
+            <a:endParaRPr lang="en-GB" dirty="0"/>
           </a:p>
         </p:txBody>
       </p:sp>
@@ -5630,8 +5713,8 @@
         </p:nvSpPr>
         <p:spPr>
           <a:xfrm>
-            <a:off x="9907731" y="3835609"/>
-            <a:ext cx="4497256" cy="1892826"/>
+            <a:off x="9907730" y="3771441"/>
+            <a:ext cx="4531446" cy="3046988"/>
           </a:xfrm>
           <a:prstGeom prst="rect">
             <a:avLst/>
@@ -5645,36 +5728,847 @@
           <a:lstStyle/>
           <a:p>
             <a:r>
-              <a:rPr lang="en-GB" sz="1300" dirty="0">
+              <a:rPr lang="en-GB" sz="1600" dirty="0">
                 <a:solidFill>
                   <a:schemeClr val="bg1"/>
                 </a:solidFill>
                 <a:latin typeface="Roboto Mono" pitchFamily="2" charset="0"/>
                 <a:ea typeface="Roboto Mono" pitchFamily="2" charset="0"/>
               </a:rPr>
-              <a:t>To probe the geometry of the Universe, Type Ia supernovae can be utilised. Known for their curious homogenous nature, they are useful as standard candles, a feature which can be taken advantage of in cosmology.</a:t>
-            </a:r>
-          </a:p>
-          <a:p>
-            <a:r>
-              <a:rPr lang="en-GB" sz="1300" dirty="0">
+              <a:t>For our first model cosmic model, we only had to find an optimum value for the dark energy density parameter, </a:t>
+            </a:r>
+            <a:r>
+              <a:rPr lang="el-GR" sz="1600" dirty="0">
+                <a:solidFill>
+                  <a:schemeClr val="bg1"/>
+                </a:solidFill>
+                <a:latin typeface="Roboto Mono Medium" pitchFamily="2" charset="0"/>
+                <a:ea typeface="Roboto Mono Medium" pitchFamily="2" charset="0"/>
+              </a:rPr>
+              <a:t>Ω</a:t>
+            </a:r>
+            <a:r>
+              <a:rPr lang="en-GB" sz="1600" baseline="-25000" dirty="0">
+                <a:solidFill>
+                  <a:schemeClr val="bg1"/>
+                </a:solidFill>
+                <a:latin typeface="Roboto Mono Medium" pitchFamily="2" charset="0"/>
+                <a:ea typeface="Roboto Mono Medium" pitchFamily="2" charset="0"/>
+              </a:rPr>
+              <a:t>Λ</a:t>
+            </a:r>
+            <a:r>
+              <a:rPr lang="en-GB" sz="1600" dirty="0">
+                <a:solidFill>
+                  <a:schemeClr val="bg1"/>
+                </a:solidFill>
+                <a:latin typeface="Roboto Mono Medium" pitchFamily="2" charset="0"/>
+                <a:ea typeface="Roboto Mono Medium" pitchFamily="2" charset="0"/>
+              </a:rPr>
+              <a:t>. </a:t>
+            </a:r>
+            <a:r>
+              <a:rPr lang="en-GB" sz="1600" dirty="0">
                 <a:solidFill>
                   <a:schemeClr val="bg1"/>
                 </a:solidFill>
                 <a:latin typeface="Roboto Mono" pitchFamily="2" charset="0"/>
                 <a:ea typeface="Roboto Mono" pitchFamily="2" charset="0"/>
               </a:rPr>
+              <a:t>To find this</a:t>
+            </a:r>
+            <a:r>
+              <a:rPr lang="en-GB" sz="1600" baseline="-25000" dirty="0">
+                <a:solidFill>
+                  <a:schemeClr val="bg1"/>
+                </a:solidFill>
+                <a:latin typeface="Roboto Mono Medium" pitchFamily="2" charset="0"/>
+                <a:ea typeface="Roboto Mono Medium" pitchFamily="2" charset="0"/>
+              </a:rPr>
               <a:t> </a:t>
             </a:r>
-          </a:p>
-          <a:p>
-            <a:r>
-              <a:rPr lang="en-GB" sz="1300" dirty="0">
+            <a:r>
+              <a:rPr lang="en-GB" sz="1600" dirty="0">
+                <a:solidFill>
+                  <a:schemeClr val="bg1"/>
+                </a:solidFill>
                 <a:latin typeface="Roboto Mono" pitchFamily="2" charset="0"/>
                 <a:ea typeface="Roboto Mono" pitchFamily="2" charset="0"/>
               </a:rPr>
-              <a:t>Through measuring the change in their magnitude with time, a ‘light-curve’ can be plotted and a maximum magnitude obtained. </a:t>
-            </a:r>
+              <a:t>we chose to employ </a:t>
+            </a:r>
+            <a:r>
+              <a:rPr lang="el-GR" sz="1600" i="1" dirty="0">
+                <a:solidFill>
+                  <a:schemeClr val="bg1"/>
+                </a:solidFill>
+                <a:latin typeface="Roboto Mono Medium" pitchFamily="2" charset="0"/>
+                <a:ea typeface="Roboto Mono Medium" pitchFamily="2" charset="0"/>
+              </a:rPr>
+              <a:t>Χ</a:t>
+            </a:r>
+            <a:r>
+              <a:rPr lang="en-GB" sz="1600" i="1" baseline="30000" dirty="0">
+                <a:solidFill>
+                  <a:schemeClr val="bg1"/>
+                </a:solidFill>
+                <a:latin typeface="Roboto Mono Medium" pitchFamily="2" charset="0"/>
+                <a:ea typeface="Roboto Mono Medium" pitchFamily="2" charset="0"/>
+              </a:rPr>
+              <a:t>2</a:t>
+            </a:r>
+            <a:r>
+              <a:rPr lang="en-GB" sz="1600" i="1" baseline="30000" dirty="0">
+                <a:solidFill>
+                  <a:schemeClr val="bg1"/>
+                </a:solidFill>
+                <a:latin typeface="Roboto Mono" pitchFamily="2" charset="0"/>
+                <a:ea typeface="Roboto Mono" pitchFamily="2" charset="0"/>
+              </a:rPr>
+              <a:t> </a:t>
+            </a:r>
+            <a:r>
+              <a:rPr lang="en-GB" sz="1600" dirty="0">
+                <a:solidFill>
+                  <a:schemeClr val="bg1"/>
+                </a:solidFill>
+                <a:latin typeface="Roboto Mono" pitchFamily="2" charset="0"/>
+                <a:ea typeface="Roboto Mono" pitchFamily="2" charset="0"/>
+              </a:rPr>
+              <a:t>statistics. With,</a:t>
+            </a:r>
+          </a:p>
+          <a:p>
+            <a:endParaRPr lang="en-GB" sz="1400" dirty="0">
+              <a:solidFill>
+                <a:schemeClr val="bg1"/>
+              </a:solidFill>
+              <a:latin typeface="Roboto Mono" pitchFamily="2" charset="0"/>
+              <a:ea typeface="Roboto Mono" pitchFamily="2" charset="0"/>
+            </a:endParaRPr>
+          </a:p>
+          <a:p>
+            <a:endParaRPr lang="en-GB" sz="1400" dirty="0">
+              <a:solidFill>
+                <a:schemeClr val="bg1"/>
+              </a:solidFill>
+              <a:latin typeface="Roboto Mono" pitchFamily="2" charset="0"/>
+              <a:ea typeface="Roboto Mono" pitchFamily="2" charset="0"/>
+            </a:endParaRPr>
+          </a:p>
+          <a:p>
+            <a:r>
+              <a:rPr lang="en-GB" sz="1600" dirty="0">
+                <a:solidFill>
+                  <a:schemeClr val="bg1"/>
+                </a:solidFill>
+                <a:latin typeface="Roboto Mono" pitchFamily="2" charset="0"/>
+                <a:ea typeface="Roboto Mono" pitchFamily="2" charset="0"/>
+              </a:rPr>
+              <a:t>where </a:t>
+            </a:r>
+            <a:r>
+              <a:rPr lang="en-GB" sz="1600" i="1" dirty="0">
+                <a:solidFill>
+                  <a:schemeClr val="bg1"/>
+                </a:solidFill>
+                <a:latin typeface="Roboto Mono Medium" pitchFamily="2" charset="0"/>
+                <a:ea typeface="Roboto Mono Medium" pitchFamily="2" charset="0"/>
+              </a:rPr>
+              <a:t>f</a:t>
+            </a:r>
+            <a:r>
+              <a:rPr lang="en-GB" sz="1600" i="1" baseline="-25000" dirty="0">
+                <a:solidFill>
+                  <a:schemeClr val="bg1"/>
+                </a:solidFill>
+                <a:latin typeface="Roboto Mono Medium" pitchFamily="2" charset="0"/>
+                <a:ea typeface="Roboto Mono Medium" pitchFamily="2" charset="0"/>
+              </a:rPr>
+              <a:t>obs</a:t>
+            </a:r>
+            <a:r>
+              <a:rPr lang="en-GB" sz="1600" i="1" dirty="0">
+                <a:solidFill>
+                  <a:schemeClr val="bg1"/>
+                </a:solidFill>
+                <a:latin typeface="Roboto Mono Medium" pitchFamily="2" charset="0"/>
+                <a:ea typeface="Roboto Mono Medium" pitchFamily="2" charset="0"/>
+              </a:rPr>
+              <a:t> </a:t>
+            </a:r>
+            <a:r>
+              <a:rPr lang="en-GB" sz="1600" dirty="0">
+                <a:solidFill>
+                  <a:schemeClr val="bg1"/>
+                </a:solidFill>
+                <a:latin typeface="Roboto Mono" pitchFamily="2" charset="0"/>
+                <a:ea typeface="Roboto Mono" pitchFamily="2" charset="0"/>
+              </a:rPr>
+              <a:t>is the flux of the observed supernovae,</a:t>
+            </a:r>
+            <a:r>
+              <a:rPr lang="en-GB" sz="1600" i="1" dirty="0">
+                <a:solidFill>
+                  <a:schemeClr val="bg1"/>
+                </a:solidFill>
+                <a:latin typeface="Roboto Mono Medium" pitchFamily="2" charset="0"/>
+                <a:ea typeface="Roboto Mono Medium" pitchFamily="2" charset="0"/>
+              </a:rPr>
+              <a:t>f</a:t>
+            </a:r>
+            <a:r>
+              <a:rPr lang="en-GB" sz="1600" i="1" baseline="-25000" dirty="0">
+                <a:solidFill>
+                  <a:schemeClr val="bg1"/>
+                </a:solidFill>
+                <a:latin typeface="Roboto Mono Medium" pitchFamily="2" charset="0"/>
+                <a:ea typeface="Roboto Mono Medium" pitchFamily="2" charset="0"/>
+              </a:rPr>
+              <a:t>model </a:t>
+            </a:r>
+            <a:r>
+              <a:rPr lang="en-GB" sz="1600" dirty="0">
+                <a:solidFill>
+                  <a:schemeClr val="bg1"/>
+                </a:solidFill>
+                <a:latin typeface="Roboto Mono" pitchFamily="2" charset="0"/>
+                <a:ea typeface="Roboto Mono" pitchFamily="2" charset="0"/>
+              </a:rPr>
+              <a:t>is the flux for the model corresponding to the same redshift, and </a:t>
+            </a:r>
+            <a:r>
+              <a:rPr lang="el-GR" sz="1600" i="1" dirty="0">
+                <a:solidFill>
+                  <a:schemeClr val="bg1"/>
+                </a:solidFill>
+                <a:latin typeface="Roboto Mono Medium" pitchFamily="2" charset="0"/>
+                <a:ea typeface="Roboto Mono Medium" pitchFamily="2" charset="0"/>
+              </a:rPr>
+              <a:t>σ </a:t>
+            </a:r>
+            <a:r>
+              <a:rPr lang="en-GB" sz="1600" dirty="0">
+                <a:solidFill>
+                  <a:schemeClr val="bg1"/>
+                </a:solidFill>
+                <a:latin typeface="Roboto Mono" pitchFamily="2" charset="0"/>
+                <a:ea typeface="Roboto Mono" pitchFamily="2" charset="0"/>
+              </a:rPr>
+              <a:t>is uncertainty on the supernova data. </a:t>
+            </a:r>
+          </a:p>
+        </p:txBody>
+      </p:sp>
+      <p:sp>
+        <p:nvSpPr>
+          <p:cNvPr id="57" name="TextBox 56">
+            <a:extLst>
+              <a:ext uri="{FF2B5EF4-FFF2-40B4-BE49-F238E27FC236}">
+                <a16:creationId xmlns:a16="http://schemas.microsoft.com/office/drawing/2014/main" id="{2D29C8CD-5B82-FB4F-A6B9-2516E0E00A89}"/>
+              </a:ext>
+            </a:extLst>
+          </p:cNvPr>
+          <p:cNvSpPr txBox="1"/>
+          <p:nvPr/>
+        </p:nvSpPr>
+        <p:spPr>
+          <a:xfrm>
+            <a:off x="704171" y="8858246"/>
+            <a:ext cx="4441238" cy="369332"/>
+          </a:xfrm>
+          <a:prstGeom prst="rect">
+            <a:avLst/>
+          </a:prstGeom>
+          <a:noFill/>
+        </p:spPr>
+        <p:txBody>
+          <a:bodyPr wrap="square" rtlCol="0">
+            <a:spAutoFit/>
+          </a:bodyPr>
+          <a:lstStyle/>
+          <a:p>
+            <a:pPr algn="ctr"/>
+            <a:r>
+              <a:rPr lang="en-GB" sz="1800" i="1" dirty="0">
+                <a:solidFill>
+                  <a:schemeClr val="bg1"/>
+                </a:solidFill>
+                <a:latin typeface="Roboto Mono Medium" pitchFamily="2" charset="0"/>
+                <a:ea typeface="Roboto Mono Medium" pitchFamily="2" charset="0"/>
+              </a:rPr>
+              <a:t>H=H</a:t>
+            </a:r>
+            <a:r>
+              <a:rPr lang="en-GB" sz="1800" i="1" baseline="-25000" dirty="0">
+                <a:solidFill>
+                  <a:schemeClr val="bg1"/>
+                </a:solidFill>
+                <a:latin typeface="Roboto Mono Medium" pitchFamily="2" charset="0"/>
+                <a:ea typeface="Roboto Mono Medium" pitchFamily="2" charset="0"/>
+              </a:rPr>
+              <a:t>0</a:t>
+            </a:r>
+            <a:r>
+              <a:rPr lang="en-GB" sz="1800" i="1" dirty="0">
+                <a:solidFill>
+                  <a:schemeClr val="bg1"/>
+                </a:solidFill>
+                <a:latin typeface="Roboto Mono Medium" pitchFamily="2" charset="0"/>
+                <a:ea typeface="Roboto Mono Medium" pitchFamily="2" charset="0"/>
+              </a:rPr>
+              <a:t>[(1+z)</a:t>
+            </a:r>
+            <a:r>
+              <a:rPr lang="en-GB" sz="1800" i="1" baseline="30000" dirty="0">
+                <a:solidFill>
+                  <a:schemeClr val="bg1"/>
+                </a:solidFill>
+                <a:latin typeface="Roboto Mono Medium" pitchFamily="2" charset="0"/>
+                <a:ea typeface="Roboto Mono Medium" pitchFamily="2" charset="0"/>
+              </a:rPr>
+              <a:t>3</a:t>
+            </a:r>
+            <a:r>
+              <a:rPr lang="en-GB" sz="1800" i="1" dirty="0">
+                <a:solidFill>
+                  <a:schemeClr val="bg1"/>
+                </a:solidFill>
+                <a:latin typeface="Roboto Mono Medium" pitchFamily="2" charset="0"/>
+                <a:ea typeface="Roboto Mono Medium" pitchFamily="2" charset="0"/>
+              </a:rPr>
+              <a:t>-</a:t>
+            </a:r>
+            <a:r>
+              <a:rPr lang="el-GR" sz="1800" i="1" dirty="0">
+                <a:solidFill>
+                  <a:schemeClr val="bg1"/>
+                </a:solidFill>
+                <a:latin typeface="Roboto Mono Medium" pitchFamily="2" charset="0"/>
+                <a:ea typeface="Roboto Mono Medium" pitchFamily="2" charset="0"/>
+              </a:rPr>
+              <a:t>Ω</a:t>
+            </a:r>
+            <a:r>
+              <a:rPr lang="en-GB" sz="1800" i="1" baseline="-25000" dirty="0">
+                <a:solidFill>
+                  <a:schemeClr val="bg1"/>
+                </a:solidFill>
+                <a:latin typeface="Roboto Mono Medium" pitchFamily="2" charset="0"/>
+                <a:ea typeface="Roboto Mono Medium" pitchFamily="2" charset="0"/>
+              </a:rPr>
+              <a:t>Λ</a:t>
+            </a:r>
+            <a:r>
+              <a:rPr lang="en-GB" sz="1800" i="1" dirty="0">
+                <a:solidFill>
+                  <a:schemeClr val="bg1"/>
+                </a:solidFill>
+                <a:latin typeface="Roboto Mono Medium" pitchFamily="2" charset="0"/>
+                <a:ea typeface="Roboto Mono Medium" pitchFamily="2" charset="0"/>
+              </a:rPr>
+              <a:t>((1+z)</a:t>
+            </a:r>
+            <a:r>
+              <a:rPr lang="en-GB" sz="1800" i="1" baseline="30000" dirty="0">
+                <a:solidFill>
+                  <a:schemeClr val="bg1"/>
+                </a:solidFill>
+                <a:latin typeface="Roboto Mono Medium" pitchFamily="2" charset="0"/>
+                <a:ea typeface="Roboto Mono Medium" pitchFamily="2" charset="0"/>
+              </a:rPr>
+              <a:t>3</a:t>
+            </a:r>
+            <a:r>
+              <a:rPr lang="en-GB" sz="1800" i="1" dirty="0">
+                <a:solidFill>
+                  <a:schemeClr val="bg1"/>
+                </a:solidFill>
+                <a:latin typeface="Roboto Mono Medium" pitchFamily="2" charset="0"/>
+                <a:ea typeface="Roboto Mono Medium" pitchFamily="2" charset="0"/>
+              </a:rPr>
+              <a:t>-1)]</a:t>
+            </a:r>
+            <a:r>
+              <a:rPr lang="en-GB" sz="1800" i="1" baseline="30000" dirty="0">
+                <a:solidFill>
+                  <a:schemeClr val="bg1"/>
+                </a:solidFill>
+                <a:latin typeface="Roboto Mono Medium" pitchFamily="2" charset="0"/>
+                <a:ea typeface="Roboto Mono Medium" pitchFamily="2" charset="0"/>
+              </a:rPr>
+              <a:t>1/2</a:t>
+            </a:r>
+            <a:r>
+              <a:rPr lang="en-GB" sz="1800" i="1" dirty="0">
+                <a:solidFill>
+                  <a:schemeClr val="bg1"/>
+                </a:solidFill>
+                <a:latin typeface="Roboto Mono Medium" pitchFamily="2" charset="0"/>
+                <a:ea typeface="Roboto Mono Medium" pitchFamily="2" charset="0"/>
+              </a:rPr>
+              <a:t>.</a:t>
+            </a:r>
+          </a:p>
+        </p:txBody>
+      </p:sp>
+      <p:sp>
+        <p:nvSpPr>
+          <p:cNvPr id="62" name="TextBox 61">
+            <a:extLst>
+              <a:ext uri="{FF2B5EF4-FFF2-40B4-BE49-F238E27FC236}">
+                <a16:creationId xmlns:a16="http://schemas.microsoft.com/office/drawing/2014/main" id="{E3FFCFDD-E86F-2442-A1E0-088C8770F07B}"/>
+              </a:ext>
+            </a:extLst>
+          </p:cNvPr>
+          <p:cNvSpPr txBox="1"/>
+          <p:nvPr/>
+        </p:nvSpPr>
+        <p:spPr>
+          <a:xfrm>
+            <a:off x="10604067" y="5097507"/>
+            <a:ext cx="3104584" cy="338554"/>
+          </a:xfrm>
+          <a:prstGeom prst="rect">
+            <a:avLst/>
+          </a:prstGeom>
+          <a:noFill/>
+        </p:spPr>
+        <p:txBody>
+          <a:bodyPr wrap="square" rtlCol="0">
+            <a:spAutoFit/>
+          </a:bodyPr>
+          <a:lstStyle/>
+          <a:p>
+            <a:pPr algn="ctr"/>
+            <a:r>
+              <a:rPr lang="el-GR" sz="1600" i="1" dirty="0">
+                <a:solidFill>
+                  <a:schemeClr val="bg1"/>
+                </a:solidFill>
+                <a:latin typeface="Roboto Mono Medium" pitchFamily="2" charset="0"/>
+                <a:ea typeface="Roboto Mono Medium" pitchFamily="2" charset="0"/>
+              </a:rPr>
+              <a:t>Χ</a:t>
+            </a:r>
+            <a:r>
+              <a:rPr lang="en-GB" sz="1600" i="1" baseline="30000" dirty="0">
+                <a:solidFill>
+                  <a:schemeClr val="bg1"/>
+                </a:solidFill>
+                <a:latin typeface="Roboto Mono Medium" pitchFamily="2" charset="0"/>
+                <a:ea typeface="Roboto Mono Medium" pitchFamily="2" charset="0"/>
+              </a:rPr>
+              <a:t>2</a:t>
+            </a:r>
+            <a:r>
+              <a:rPr lang="en-GB" sz="1600" i="1" dirty="0">
+                <a:solidFill>
+                  <a:schemeClr val="bg1"/>
+                </a:solidFill>
+                <a:latin typeface="Roboto Mono Medium" pitchFamily="2" charset="0"/>
+                <a:ea typeface="Roboto Mono Medium" pitchFamily="2" charset="0"/>
+              </a:rPr>
+              <a:t>=</a:t>
+            </a:r>
+            <a:r>
+              <a:rPr lang="el-GR" sz="1600" i="1" dirty="0">
+                <a:solidFill>
+                  <a:schemeClr val="bg1"/>
+                </a:solidFill>
+                <a:latin typeface="Roboto Mono Medium" pitchFamily="2" charset="0"/>
+                <a:ea typeface="Roboto Mono Medium" pitchFamily="2" charset="0"/>
+              </a:rPr>
+              <a:t>Σ</a:t>
+            </a:r>
+            <a:r>
+              <a:rPr lang="en-GB" sz="1600" i="1" dirty="0">
+                <a:solidFill>
+                  <a:schemeClr val="bg1"/>
+                </a:solidFill>
+                <a:latin typeface="Roboto Mono Medium" pitchFamily="2" charset="0"/>
+                <a:ea typeface="Roboto Mono Medium" pitchFamily="2" charset="0"/>
+              </a:rPr>
+              <a:t>(f</a:t>
+            </a:r>
+            <a:r>
+              <a:rPr lang="en-GB" sz="1600" i="1" baseline="-25000" dirty="0">
+                <a:solidFill>
+                  <a:schemeClr val="bg1"/>
+                </a:solidFill>
+                <a:latin typeface="Roboto Mono Medium" pitchFamily="2" charset="0"/>
+                <a:ea typeface="Roboto Mono Medium" pitchFamily="2" charset="0"/>
+              </a:rPr>
+              <a:t>obs</a:t>
+            </a:r>
+            <a:r>
+              <a:rPr lang="en-GB" sz="1600" i="1" dirty="0">
+                <a:solidFill>
+                  <a:schemeClr val="bg1"/>
+                </a:solidFill>
+                <a:latin typeface="Roboto Mono Medium" pitchFamily="2" charset="0"/>
+                <a:ea typeface="Roboto Mono Medium" pitchFamily="2" charset="0"/>
+              </a:rPr>
+              <a:t>-f</a:t>
+            </a:r>
+            <a:r>
+              <a:rPr lang="en-GB" sz="1600" i="1" baseline="-25000" dirty="0">
+                <a:solidFill>
+                  <a:schemeClr val="bg1"/>
+                </a:solidFill>
+                <a:latin typeface="Roboto Mono Medium" pitchFamily="2" charset="0"/>
+                <a:ea typeface="Roboto Mono Medium" pitchFamily="2" charset="0"/>
+              </a:rPr>
+              <a:t>model</a:t>
+            </a:r>
+            <a:r>
+              <a:rPr lang="en-GB" sz="1600" i="1" dirty="0">
+                <a:solidFill>
+                  <a:schemeClr val="bg1"/>
+                </a:solidFill>
+                <a:latin typeface="Roboto Mono Medium" pitchFamily="2" charset="0"/>
+                <a:ea typeface="Roboto Mono Medium" pitchFamily="2" charset="0"/>
+              </a:rPr>
+              <a:t>)</a:t>
+            </a:r>
+            <a:r>
+              <a:rPr lang="en-GB" sz="1600" i="1" baseline="30000" dirty="0">
+                <a:solidFill>
+                  <a:schemeClr val="bg1"/>
+                </a:solidFill>
+                <a:latin typeface="Roboto Mono Medium" pitchFamily="2" charset="0"/>
+                <a:ea typeface="Roboto Mono Medium" pitchFamily="2" charset="0"/>
+              </a:rPr>
+              <a:t>2</a:t>
+            </a:r>
+            <a:r>
+              <a:rPr lang="en-GB" sz="1600" i="1" dirty="0">
+                <a:solidFill>
+                  <a:schemeClr val="bg1"/>
+                </a:solidFill>
+                <a:latin typeface="Roboto Mono Medium" pitchFamily="2" charset="0"/>
+                <a:ea typeface="Roboto Mono Medium" pitchFamily="2" charset="0"/>
+              </a:rPr>
+              <a:t>/</a:t>
+            </a:r>
+            <a:r>
+              <a:rPr lang="el-GR" sz="1600" i="1" dirty="0">
+                <a:solidFill>
+                  <a:schemeClr val="bg1"/>
+                </a:solidFill>
+                <a:latin typeface="Roboto Mono Medium" pitchFamily="2" charset="0"/>
+                <a:ea typeface="Roboto Mono Medium" pitchFamily="2" charset="0"/>
+              </a:rPr>
+              <a:t>σ</a:t>
+            </a:r>
+            <a:r>
+              <a:rPr lang="en-GB" sz="1600" i="1" baseline="30000" dirty="0">
+                <a:solidFill>
+                  <a:schemeClr val="bg1"/>
+                </a:solidFill>
+                <a:latin typeface="Roboto Mono Medium" pitchFamily="2" charset="0"/>
+                <a:ea typeface="Roboto Mono Medium" pitchFamily="2" charset="0"/>
+              </a:rPr>
+              <a:t>2</a:t>
+            </a:r>
+            <a:r>
+              <a:rPr lang="en-GB" sz="1600" i="1" dirty="0">
+                <a:solidFill>
+                  <a:schemeClr val="bg1"/>
+                </a:solidFill>
+                <a:latin typeface="Roboto Mono Medium" pitchFamily="2" charset="0"/>
+                <a:ea typeface="Roboto Mono Medium" pitchFamily="2" charset="0"/>
+              </a:rPr>
+              <a:t>,</a:t>
+            </a:r>
+            <a:endParaRPr lang="en-GB" sz="1600" i="1" dirty="0">
+              <a:solidFill>
+                <a:schemeClr val="bg1"/>
+              </a:solidFill>
+              <a:latin typeface="Roboto Mono" pitchFamily="2" charset="0"/>
+              <a:ea typeface="Roboto Mono" pitchFamily="2" charset="0"/>
+            </a:endParaRPr>
+          </a:p>
+        </p:txBody>
+      </p:sp>
+      <p:sp>
+        <p:nvSpPr>
+          <p:cNvPr id="63" name="TextBox 62">
+            <a:extLst>
+              <a:ext uri="{FF2B5EF4-FFF2-40B4-BE49-F238E27FC236}">
+                <a16:creationId xmlns:a16="http://schemas.microsoft.com/office/drawing/2014/main" id="{72ACB3DE-746F-ED49-B9D4-6355784CAC76}"/>
+              </a:ext>
+            </a:extLst>
+          </p:cNvPr>
+          <p:cNvSpPr txBox="1"/>
+          <p:nvPr/>
+        </p:nvSpPr>
+        <p:spPr>
+          <a:xfrm>
+            <a:off x="501481" y="19091880"/>
+            <a:ext cx="12571423" cy="315471"/>
+          </a:xfrm>
+          <a:prstGeom prst="rect">
+            <a:avLst/>
+          </a:prstGeom>
+          <a:noFill/>
+        </p:spPr>
+        <p:txBody>
+          <a:bodyPr wrap="square" rtlCol="0">
+            <a:spAutoFit/>
+          </a:bodyPr>
+          <a:lstStyle/>
+          <a:p>
+            <a:r>
+              <a:rPr lang="en-GB" sz="1450" dirty="0">
+                <a:latin typeface="Roboto Mono" pitchFamily="2" charset="0"/>
+                <a:ea typeface="Roboto Mono" pitchFamily="2" charset="0"/>
+              </a:rPr>
+              <a:t>M. </a:t>
+            </a:r>
+            <a:r>
+              <a:rPr lang="en-GB" sz="1450" dirty="0" err="1">
+                <a:latin typeface="Roboto Mono" pitchFamily="2" charset="0"/>
+                <a:ea typeface="Roboto Mono" pitchFamily="2" charset="0"/>
+              </a:rPr>
+              <a:t>Teymark</a:t>
+            </a:r>
+            <a:r>
+              <a:rPr lang="en-GB" sz="1450" dirty="0">
+                <a:latin typeface="Roboto Mono" pitchFamily="2" charset="0"/>
+                <a:ea typeface="Roboto Mono" pitchFamily="2" charset="0"/>
+              </a:rPr>
+              <a:t> et al. </a:t>
+            </a:r>
+            <a:r>
+              <a:rPr lang="en-GB" sz="1450" i="1" dirty="0">
+                <a:latin typeface="Roboto Mono" pitchFamily="2" charset="0"/>
+                <a:ea typeface="Roboto Mono" pitchFamily="2" charset="0"/>
+              </a:rPr>
+              <a:t>Cosmological constraints from the SDSS luminous red galaxies</a:t>
+            </a:r>
+            <a:r>
+              <a:rPr lang="en-GB" sz="1450" dirty="0">
+                <a:latin typeface="Roboto Mono" pitchFamily="2" charset="0"/>
+                <a:ea typeface="Roboto Mono" pitchFamily="2" charset="0"/>
+              </a:rPr>
+              <a:t>. Physical Review 74, 2006.</a:t>
+            </a:r>
+          </a:p>
+        </p:txBody>
+      </p:sp>
+      <p:sp>
+        <p:nvSpPr>
+          <p:cNvPr id="66" name="TextBox 65">
+            <a:extLst>
+              <a:ext uri="{FF2B5EF4-FFF2-40B4-BE49-F238E27FC236}">
+                <a16:creationId xmlns:a16="http://schemas.microsoft.com/office/drawing/2014/main" id="{CE08C0EC-A52A-A74E-A86A-99596FC9DE0F}"/>
+              </a:ext>
+            </a:extLst>
+          </p:cNvPr>
+          <p:cNvSpPr txBox="1"/>
+          <p:nvPr/>
+        </p:nvSpPr>
+        <p:spPr>
+          <a:xfrm>
+            <a:off x="6326322" y="11523178"/>
+            <a:ext cx="4318436" cy="523220"/>
+          </a:xfrm>
+          <a:prstGeom prst="rect">
+            <a:avLst/>
+          </a:prstGeom>
+          <a:noFill/>
+        </p:spPr>
+        <p:txBody>
+          <a:bodyPr wrap="square" rtlCol="0">
+            <a:spAutoFit/>
+          </a:bodyPr>
+          <a:lstStyle/>
+          <a:p>
+            <a:r>
+              <a:rPr lang="en-GB" sz="2800" b="1" dirty="0">
+                <a:solidFill>
+                  <a:srgbClr val="202020"/>
+                </a:solidFill>
+                <a:latin typeface="Roboto Mono" pitchFamily="2" charset="0"/>
+                <a:ea typeface="Roboto Mono" pitchFamily="2" charset="0"/>
+              </a:rPr>
+              <a:t>MCMC</a:t>
+            </a:r>
+          </a:p>
+        </p:txBody>
+      </p:sp>
+      <p:sp>
+        <p:nvSpPr>
+          <p:cNvPr id="64" name="TextBox 63">
+            <a:extLst>
+              <a:ext uri="{FF2B5EF4-FFF2-40B4-BE49-F238E27FC236}">
+                <a16:creationId xmlns:a16="http://schemas.microsoft.com/office/drawing/2014/main" id="{8FCE9ADA-2762-774C-BF4E-97C436FEFF82}"/>
+              </a:ext>
+            </a:extLst>
+          </p:cNvPr>
+          <p:cNvSpPr txBox="1"/>
+          <p:nvPr/>
+        </p:nvSpPr>
+        <p:spPr>
+          <a:xfrm>
+            <a:off x="9938343" y="6874445"/>
+            <a:ext cx="4500832" cy="3046988"/>
+          </a:xfrm>
+          <a:prstGeom prst="rect">
+            <a:avLst/>
+          </a:prstGeom>
+          <a:noFill/>
+        </p:spPr>
+        <p:txBody>
+          <a:bodyPr wrap="square" rtlCol="0">
+            <a:spAutoFit/>
+          </a:bodyPr>
+          <a:lstStyle/>
+          <a:p>
+            <a:r>
+              <a:rPr lang="en-GB" sz="1600" dirty="0">
+                <a:latin typeface="Roboto Mono" pitchFamily="2" charset="0"/>
+                <a:ea typeface="Roboto Mono" pitchFamily="2" charset="0"/>
+              </a:rPr>
+              <a:t>Each model used a different </a:t>
+            </a:r>
+            <a:r>
+              <a:rPr lang="el-GR" sz="1600" dirty="0">
+                <a:latin typeface="Roboto Mono Medium" pitchFamily="2" charset="0"/>
+                <a:ea typeface="Roboto Mono Medium" pitchFamily="2" charset="0"/>
+              </a:rPr>
+              <a:t>Ω</a:t>
+            </a:r>
+            <a:r>
+              <a:rPr lang="en-GB" sz="1600" baseline="-25000" dirty="0">
+                <a:latin typeface="Roboto Mono Medium" pitchFamily="2" charset="0"/>
+                <a:ea typeface="Roboto Mono Medium" pitchFamily="2" charset="0"/>
+              </a:rPr>
+              <a:t>Λ</a:t>
+            </a:r>
+            <a:r>
+              <a:rPr lang="en-GB" sz="1600" dirty="0">
+                <a:latin typeface="Roboto Mono Medium" pitchFamily="2" charset="0"/>
+                <a:ea typeface="Roboto Mono Medium" pitchFamily="2" charset="0"/>
+              </a:rPr>
+              <a:t>,</a:t>
+            </a:r>
+            <a:r>
+              <a:rPr lang="en-GB" sz="1600" dirty="0">
+                <a:latin typeface="Roboto Mono" pitchFamily="2" charset="0"/>
+                <a:ea typeface="Roboto Mono" pitchFamily="2" charset="0"/>
+              </a:rPr>
+              <a:t>the smallest value for </a:t>
+            </a:r>
+            <a:r>
+              <a:rPr lang="el-GR" sz="1600" i="1" dirty="0">
+                <a:latin typeface="Roboto Mono Medium" pitchFamily="2" charset="0"/>
+                <a:ea typeface="Roboto Mono Medium" pitchFamily="2" charset="0"/>
+              </a:rPr>
+              <a:t>Χ</a:t>
+            </a:r>
+            <a:r>
+              <a:rPr lang="en-GB" sz="1600" i="1" baseline="30000" dirty="0">
+                <a:latin typeface="Roboto Mono Medium" pitchFamily="2" charset="0"/>
+                <a:ea typeface="Roboto Mono Medium" pitchFamily="2" charset="0"/>
+              </a:rPr>
+              <a:t>2 </a:t>
+            </a:r>
+            <a:r>
+              <a:rPr lang="en-GB" sz="1600" dirty="0">
+                <a:latin typeface="Roboto Mono" pitchFamily="2" charset="0"/>
+                <a:ea typeface="Roboto Mono" pitchFamily="2" charset="0"/>
+              </a:rPr>
+              <a:t>overall would correspond to the best parameter.</a:t>
+            </a:r>
+          </a:p>
+          <a:p>
+            <a:endParaRPr lang="en-GB" sz="1200" dirty="0">
+              <a:latin typeface="Roboto Mono" pitchFamily="2" charset="0"/>
+              <a:ea typeface="Roboto Mono" pitchFamily="2" charset="0"/>
+            </a:endParaRPr>
+          </a:p>
+          <a:p>
+            <a:r>
+              <a:rPr lang="en-GB" sz="1600" dirty="0">
+                <a:latin typeface="Roboto Mono" pitchFamily="2" charset="0"/>
+                <a:ea typeface="Roboto Mono" pitchFamily="2" charset="0"/>
+              </a:rPr>
+              <a:t>We found a value of </a:t>
+            </a:r>
+            <a:r>
+              <a:rPr lang="el-GR" sz="1600" dirty="0">
+                <a:latin typeface="Roboto Mono Medium" pitchFamily="2" charset="0"/>
+                <a:ea typeface="Roboto Mono Medium" pitchFamily="2" charset="0"/>
+              </a:rPr>
+              <a:t>Ω</a:t>
+            </a:r>
+            <a:r>
+              <a:rPr lang="en-GB" sz="1600" baseline="-25000" dirty="0">
+                <a:latin typeface="Roboto Mono Medium" pitchFamily="2" charset="0"/>
+                <a:ea typeface="Roboto Mono Medium" pitchFamily="2" charset="0"/>
+              </a:rPr>
+              <a:t>Λ</a:t>
+            </a:r>
+            <a:r>
+              <a:rPr lang="en-GB" sz="1600" dirty="0">
+                <a:latin typeface="Roboto Mono Medium" pitchFamily="2" charset="0"/>
+                <a:ea typeface="Roboto Mono Medium" pitchFamily="2" charset="0"/>
+              </a:rPr>
+              <a:t>=0.86±0.04 </a:t>
+            </a:r>
+            <a:r>
+              <a:rPr lang="en-GB" sz="1600" dirty="0">
+                <a:latin typeface="Roboto Mono" pitchFamily="2" charset="0"/>
+                <a:ea typeface="Roboto Mono" pitchFamily="2" charset="0"/>
+              </a:rPr>
+              <a:t>in our initial experimentation. Compared to a literature value of </a:t>
+            </a:r>
+            <a:r>
+              <a:rPr lang="el-GR" sz="1600" dirty="0">
+                <a:latin typeface="Roboto Mono Medium" pitchFamily="2" charset="0"/>
+                <a:ea typeface="Roboto Mono Medium" pitchFamily="2" charset="0"/>
+              </a:rPr>
+              <a:t>Ω</a:t>
+            </a:r>
+            <a:r>
+              <a:rPr lang="en-GB" sz="1600" baseline="-25000" dirty="0">
+                <a:latin typeface="Roboto Mono Medium" pitchFamily="2" charset="0"/>
+                <a:ea typeface="Roboto Mono Medium" pitchFamily="2" charset="0"/>
+              </a:rPr>
+              <a:t>Λ</a:t>
+            </a:r>
+            <a:r>
+              <a:rPr lang="en-GB" sz="1600" dirty="0">
+                <a:latin typeface="Roboto Mono Medium" pitchFamily="2" charset="0"/>
+                <a:ea typeface="Roboto Mono Medium" pitchFamily="2" charset="0"/>
+              </a:rPr>
+              <a:t>=0.761±0.018</a:t>
+            </a:r>
+            <a:r>
+              <a:rPr lang="en-GB" sz="1600" dirty="0">
+                <a:latin typeface="Roboto Mono" pitchFamily="2" charset="0"/>
+                <a:ea typeface="Roboto Mono" pitchFamily="2" charset="0"/>
+              </a:rPr>
+              <a:t>, we find that it is similar, but more work is required to improve the accuracy.</a:t>
+            </a:r>
+            <a:endParaRPr lang="en-GB" sz="1600" b="1" dirty="0">
+              <a:latin typeface="Roboto Mono" pitchFamily="2" charset="0"/>
+              <a:ea typeface="Roboto Mono" pitchFamily="2" charset="0"/>
+            </a:endParaRPr>
+          </a:p>
+          <a:p>
+            <a:endParaRPr lang="en-GB" sz="1600" b="1" dirty="0">
+              <a:latin typeface="Roboto Mono" pitchFamily="2" charset="0"/>
+              <a:ea typeface="Roboto Mono" pitchFamily="2" charset="0"/>
+            </a:endParaRPr>
+          </a:p>
+          <a:p>
+            <a:endParaRPr lang="en-GB" sz="1600" dirty="0">
+              <a:latin typeface="Roboto Mono" pitchFamily="2" charset="0"/>
+              <a:ea typeface="Roboto Mono" pitchFamily="2" charset="0"/>
+            </a:endParaRPr>
           </a:p>
         </p:txBody>
       </p:sp>

</xml_diff>

<commit_message>
pps: more or less done?
</commit_message>
<xml_diff>
--- a/physics_problem_solving/poster/supernova_poster.pptx
+++ b/physics_problem_solving/poster/supernova_poster.pptx
@@ -3409,8 +3409,8 @@
         </p:nvSpPr>
         <p:spPr>
           <a:xfrm>
-            <a:off x="-187569" y="17614392"/>
-            <a:ext cx="15521354" cy="3585919"/>
+            <a:off x="-187569" y="17597460"/>
+            <a:ext cx="15521354" cy="3501090"/>
           </a:xfrm>
           <a:prstGeom prst="rect">
             <a:avLst/>
@@ -4170,7 +4170,7 @@
         </p:nvSpPr>
         <p:spPr>
           <a:xfrm>
-            <a:off x="446568" y="9762180"/>
+            <a:off x="446568" y="9711381"/>
             <a:ext cx="11400917" cy="623119"/>
           </a:xfrm>
           <a:prstGeom prst="rect">
@@ -5341,8 +5341,8 @@
         </p:nvSpPr>
         <p:spPr>
           <a:xfrm>
-            <a:off x="651052" y="10302945"/>
-            <a:ext cx="4410671" cy="1569660"/>
+            <a:off x="418797" y="10620534"/>
+            <a:ext cx="4725692" cy="3724096"/>
           </a:xfrm>
           <a:prstGeom prst="rect">
             <a:avLst/>
@@ -5360,7 +5360,137 @@
                 <a:latin typeface="Roboto Mono" pitchFamily="2" charset="0"/>
                 <a:ea typeface="Roboto Mono" pitchFamily="2" charset="0"/>
               </a:rPr>
-              <a:t>In exploring more complex models of the universe, we are required to find multiple parameters instead of one. With this we have to sample a parameter space instead of </a:t>
+              <a:t>Using a larger data set improves the accuracy of our results, with the </a:t>
+            </a:r>
+            <a:r>
+              <a:rPr lang="en-GB" sz="1600" i="1" dirty="0">
+                <a:latin typeface="Roboto Mono" pitchFamily="2" charset="0"/>
+                <a:ea typeface="Roboto Mono" pitchFamily="2" charset="0"/>
+              </a:rPr>
+              <a:t>Supernova Cosmology Project</a:t>
+            </a:r>
+            <a:r>
+              <a:rPr lang="en-GB" sz="1600" dirty="0">
+                <a:latin typeface="Roboto Mono" pitchFamily="2" charset="0"/>
+                <a:ea typeface="Roboto Mono" pitchFamily="2" charset="0"/>
+              </a:rPr>
+              <a:t>’s Union2.1 data set and with the </a:t>
+            </a:r>
+            <a:r>
+              <a:rPr lang="el-GR" sz="1600" i="1" dirty="0">
+                <a:latin typeface="Roboto Mono Medium" pitchFamily="2" charset="0"/>
+                <a:ea typeface="Roboto Mono Medium" pitchFamily="2" charset="0"/>
+              </a:rPr>
+              <a:t>Χ</a:t>
+            </a:r>
+            <a:r>
+              <a:rPr lang="en-GB" sz="1600" i="1" baseline="30000" dirty="0">
+                <a:latin typeface="Roboto Mono Medium" pitchFamily="2" charset="0"/>
+                <a:ea typeface="Roboto Mono Medium" pitchFamily="2" charset="0"/>
+              </a:rPr>
+              <a:t>2 </a:t>
+            </a:r>
+            <a:r>
+              <a:rPr lang="en-GB" sz="1600" dirty="0">
+                <a:latin typeface="Roboto Mono" pitchFamily="2" charset="0"/>
+                <a:ea typeface="Roboto Mono" pitchFamily="2" charset="0"/>
+              </a:rPr>
+              <a:t>method we were able to produce </a:t>
+            </a:r>
+            <a:r>
+              <a:rPr lang="el-GR" sz="1600" b="1" dirty="0">
+                <a:latin typeface="Roboto Mono" pitchFamily="2" charset="0"/>
+                <a:ea typeface="Roboto Mono" pitchFamily="2" charset="0"/>
+              </a:rPr>
+              <a:t>Ω</a:t>
+            </a:r>
+            <a:r>
+              <a:rPr lang="en-GB" sz="1600" b="1" baseline="-25000" dirty="0">
+                <a:latin typeface="Roboto Mono" pitchFamily="2" charset="0"/>
+                <a:ea typeface="Roboto Mono" pitchFamily="2" charset="0"/>
+              </a:rPr>
+              <a:t>Λ</a:t>
+            </a:r>
+            <a:r>
+              <a:rPr lang="en-GB" sz="1600" b="1" dirty="0">
+                <a:latin typeface="Roboto Mono" pitchFamily="2" charset="0"/>
+                <a:ea typeface="Roboto Mono" pitchFamily="2" charset="0"/>
+              </a:rPr>
+              <a:t>=0.74±0.01</a:t>
+            </a:r>
+            <a:r>
+              <a:rPr lang="en-GB" sz="1600" dirty="0">
+                <a:latin typeface="Roboto Mono" pitchFamily="2" charset="0"/>
+                <a:ea typeface="Roboto Mono" pitchFamily="2" charset="0"/>
+              </a:rPr>
+              <a:t> which is more accurate than our previous value.</a:t>
+            </a:r>
+          </a:p>
+          <a:p>
+            <a:endParaRPr lang="en-GB" sz="1050" dirty="0">
+              <a:latin typeface="Roboto Mono" pitchFamily="2" charset="0"/>
+              <a:ea typeface="Roboto Mono" pitchFamily="2" charset="0"/>
+            </a:endParaRPr>
+          </a:p>
+          <a:p>
+            <a:r>
+              <a:rPr lang="en-GB" sz="1600" dirty="0">
+                <a:latin typeface="Roboto Mono" pitchFamily="2" charset="0"/>
+                <a:ea typeface="Roboto Mono" pitchFamily="2" charset="0"/>
+              </a:rPr>
+              <a:t>In Figure 1 we can see the fitting of this larger data set to our two models which made use of </a:t>
+            </a:r>
+            <a:r>
+              <a:rPr lang="el-GR" sz="1600" b="1" i="1" dirty="0">
+                <a:latin typeface="Roboto Mono" pitchFamily="2" charset="0"/>
+                <a:ea typeface="Roboto Mono" pitchFamily="2" charset="0"/>
+              </a:rPr>
+              <a:t>Ω</a:t>
+            </a:r>
+            <a:r>
+              <a:rPr lang="en-GB" sz="1600" b="1" i="1" baseline="-25000" dirty="0">
+                <a:latin typeface="Roboto Mono" pitchFamily="2" charset="0"/>
+                <a:ea typeface="Roboto Mono" pitchFamily="2" charset="0"/>
+              </a:rPr>
+              <a:t>Λ</a:t>
+            </a:r>
+            <a:r>
+              <a:rPr lang="en-GB" sz="1600" dirty="0">
+                <a:latin typeface="Roboto Mono" pitchFamily="2" charset="0"/>
+                <a:ea typeface="Roboto Mono" pitchFamily="2" charset="0"/>
+              </a:rPr>
+              <a:t>.</a:t>
+            </a:r>
+            <a:endParaRPr lang="en-GB" sz="1600" b="1" i="1" baseline="-25000" dirty="0">
+              <a:latin typeface="Roboto Mono" pitchFamily="2" charset="0"/>
+              <a:ea typeface="Roboto Mono" pitchFamily="2" charset="0"/>
+            </a:endParaRPr>
+          </a:p>
+          <a:p>
+            <a:endParaRPr lang="en-GB" sz="1600" dirty="0">
+              <a:latin typeface="Roboto Mono" pitchFamily="2" charset="0"/>
+              <a:ea typeface="Roboto Mono" pitchFamily="2" charset="0"/>
+            </a:endParaRPr>
+          </a:p>
+          <a:p>
+            <a:endParaRPr lang="en-GB" sz="1600" dirty="0">
+              <a:latin typeface="Roboto Mono" pitchFamily="2" charset="0"/>
+              <a:ea typeface="Roboto Mono" pitchFamily="2" charset="0"/>
+            </a:endParaRPr>
+          </a:p>
+          <a:p>
+            <a:endParaRPr lang="en-GB" sz="1600" dirty="0">
+              <a:latin typeface="Roboto Mono" pitchFamily="2" charset="0"/>
+              <a:ea typeface="Roboto Mono" pitchFamily="2" charset="0"/>
+            </a:endParaRPr>
+          </a:p>
+          <a:p>
+            <a:r>
+              <a:rPr lang="en-GB" sz="1600" dirty="0">
+                <a:latin typeface="Roboto Mono" pitchFamily="2" charset="0"/>
+                <a:ea typeface="Roboto Mono" pitchFamily="2" charset="0"/>
+              </a:rPr>
+              <a:t> </a:t>
             </a:r>
           </a:p>
         </p:txBody>
@@ -5490,7 +5620,7 @@
         </p:nvSpPr>
         <p:spPr>
           <a:xfrm>
-            <a:off x="489097" y="18714854"/>
+            <a:off x="489097" y="17759943"/>
             <a:ext cx="2101703" cy="461665"/>
           </a:xfrm>
           <a:prstGeom prst="rect">
@@ -6305,8 +6435,8 @@
         </p:nvSpPr>
         <p:spPr>
           <a:xfrm>
-            <a:off x="501481" y="19091880"/>
-            <a:ext cx="12571423" cy="315471"/>
+            <a:off x="651052" y="18185080"/>
+            <a:ext cx="6357420" cy="3816429"/>
           </a:xfrm>
           <a:prstGeom prst="rect">
             <a:avLst/>
@@ -6324,27 +6454,93 @@
                 <a:latin typeface="Roboto Mono" pitchFamily="2" charset="0"/>
                 <a:ea typeface="Roboto Mono" pitchFamily="2" charset="0"/>
               </a:rPr>
-              <a:t>M. </a:t>
-            </a:r>
-            <a:r>
-              <a:rPr lang="en-GB" sz="1450" dirty="0" err="1">
-                <a:latin typeface="Roboto Mono" pitchFamily="2" charset="0"/>
-                <a:ea typeface="Roboto Mono" pitchFamily="2" charset="0"/>
-              </a:rPr>
-              <a:t>Teymark</a:t>
+              <a:t>B. W. Carroll and D. A. Ostlie. </a:t>
+            </a:r>
+            <a:r>
+              <a:rPr lang="en-GB" sz="1450" i="1" dirty="0">
+                <a:latin typeface="Roboto Mono" pitchFamily="2" charset="0"/>
+                <a:ea typeface="Roboto Mono" pitchFamily="2" charset="0"/>
+              </a:rPr>
+              <a:t>An Introduction to Modern Astrophysics</a:t>
             </a:r>
             <a:r>
               <a:rPr lang="en-GB" sz="1450" dirty="0">
                 <a:latin typeface="Roboto Mono" pitchFamily="2" charset="0"/>
                 <a:ea typeface="Roboto Mono" pitchFamily="2" charset="0"/>
               </a:rPr>
-              <a:t> et al. </a:t>
+              <a:t>. Pearson, 2nd edition, 2007.</a:t>
+            </a:r>
+          </a:p>
+          <a:p>
+            <a:endParaRPr lang="en-GB" sz="500" dirty="0">
+              <a:latin typeface="Roboto Mono" pitchFamily="2" charset="0"/>
+              <a:ea typeface="Roboto Mono" pitchFamily="2" charset="0"/>
+            </a:endParaRPr>
+          </a:p>
+          <a:p>
+            <a:r>
+              <a:rPr lang="en-GB" sz="1450" dirty="0">
+                <a:latin typeface="Roboto Mono" pitchFamily="2" charset="0"/>
+                <a:ea typeface="Roboto Mono" pitchFamily="2" charset="0"/>
+              </a:rPr>
+              <a:t>J. Akeret et al. </a:t>
             </a:r>
             <a:r>
               <a:rPr lang="en-GB" sz="1450" i="1" dirty="0">
                 <a:latin typeface="Roboto Mono" pitchFamily="2" charset="0"/>
                 <a:ea typeface="Roboto Mono" pitchFamily="2" charset="0"/>
               </a:rPr>
+              <a:t>CosmoHammer: Cosmological parameter estimation with the MCMC Hammer. </a:t>
+            </a:r>
+            <a:r>
+              <a:rPr lang="en-GB" sz="1450" dirty="0">
+                <a:latin typeface="Roboto Mono" pitchFamily="2" charset="0"/>
+                <a:ea typeface="Roboto Mono" pitchFamily="2" charset="0"/>
+              </a:rPr>
+              <a:t>Astronomy and Computing, 27-39, 2013.</a:t>
+            </a:r>
+          </a:p>
+          <a:p>
+            <a:endParaRPr lang="en-GB" sz="500" dirty="0">
+              <a:latin typeface="Roboto Mono" pitchFamily="2" charset="0"/>
+              <a:ea typeface="Roboto Mono" pitchFamily="2" charset="0"/>
+            </a:endParaRPr>
+          </a:p>
+          <a:p>
+            <a:r>
+              <a:rPr lang="en-GB" sz="1450" dirty="0">
+                <a:latin typeface="Roboto Mono" pitchFamily="2" charset="0"/>
+                <a:ea typeface="Roboto Mono" pitchFamily="2" charset="0"/>
+              </a:rPr>
+              <a:t>N. Suzuki et al. </a:t>
+            </a:r>
+            <a:r>
+              <a:rPr lang="en-GB" sz="1450" i="1" dirty="0">
+                <a:latin typeface="Roboto Mono" pitchFamily="2" charset="0"/>
+                <a:ea typeface="Roboto Mono" pitchFamily="2" charset="0"/>
+              </a:rPr>
+              <a:t>The Hubble Space Telescope Cluster Supernova Survey: V. Improving the Dark Energy Constraints Above z&gt;1 and Building an Early-Type-Hosted Supernova Sample. The Astrophysical Journal, 785, 2012. </a:t>
+            </a:r>
+          </a:p>
+          <a:p>
+            <a:endParaRPr lang="en-GB" sz="500" i="1" dirty="0">
+              <a:latin typeface="Roboto Mono" pitchFamily="2" charset="0"/>
+              <a:ea typeface="Roboto Mono" pitchFamily="2" charset="0"/>
+            </a:endParaRPr>
+          </a:p>
+          <a:p>
+            <a:r>
+              <a:rPr lang="en-GB" sz="1450" dirty="0">
+                <a:latin typeface="Roboto Mono" pitchFamily="2" charset="0"/>
+                <a:ea typeface="Roboto Mono" pitchFamily="2" charset="0"/>
+              </a:rPr>
+              <a:t>M. Teymark et al. </a:t>
+            </a:r>
+            <a:r>
+              <a:rPr lang="en-GB" sz="1450" i="1" dirty="0">
+                <a:latin typeface="Roboto Mono" pitchFamily="2" charset="0"/>
+                <a:ea typeface="Roboto Mono" pitchFamily="2" charset="0"/>
+              </a:rPr>
               <a:t>Cosmological constraints from the SDSS luminous red galaxies</a:t>
             </a:r>
             <a:r>
@@ -6352,8 +6548,32 @@
                 <a:latin typeface="Roboto Mono" pitchFamily="2" charset="0"/>
                 <a:ea typeface="Roboto Mono" pitchFamily="2" charset="0"/>
               </a:rPr>
-              <a:t>. Physical Review 74, 2006.</a:t>
-            </a:r>
+              <a:t>. Physical Review, 74, 2006.</a:t>
+            </a:r>
+          </a:p>
+          <a:p>
+            <a:endParaRPr lang="en-GB" sz="1450" i="1" dirty="0">
+              <a:latin typeface="Roboto Mono" pitchFamily="2" charset="0"/>
+              <a:ea typeface="Roboto Mono" pitchFamily="2" charset="0"/>
+            </a:endParaRPr>
+          </a:p>
+          <a:p>
+            <a:endParaRPr lang="en-GB" sz="1450" dirty="0">
+              <a:latin typeface="Roboto Mono" pitchFamily="2" charset="0"/>
+              <a:ea typeface="Roboto Mono" pitchFamily="2" charset="0"/>
+            </a:endParaRPr>
+          </a:p>
+          <a:p>
+            <a:endParaRPr lang="en-GB" sz="1450" dirty="0">
+              <a:latin typeface="Roboto Mono" pitchFamily="2" charset="0"/>
+              <a:ea typeface="Roboto Mono" pitchFamily="2" charset="0"/>
+            </a:endParaRPr>
+          </a:p>
+          <a:p>
+            <a:endParaRPr lang="en-GB" sz="1450" dirty="0">
+              <a:latin typeface="Roboto Mono" pitchFamily="2" charset="0"/>
+              <a:ea typeface="Roboto Mono" pitchFamily="2" charset="0"/>
+            </a:endParaRPr>
           </a:p>
         </p:txBody>
       </p:sp>
@@ -6371,8 +6591,8 @@
         </p:nvSpPr>
         <p:spPr>
           <a:xfrm>
-            <a:off x="6326322" y="11523178"/>
-            <a:ext cx="4318436" cy="523220"/>
+            <a:off x="279146" y="13230208"/>
+            <a:ext cx="3024333" cy="492443"/>
           </a:xfrm>
           <a:prstGeom prst="rect">
             <a:avLst/>
@@ -6386,14 +6606,14 @@
           <a:lstStyle/>
           <a:p>
             <a:r>
-              <a:rPr lang="en-GB" sz="2800" b="1" dirty="0">
+              <a:rPr lang="en-GB" sz="2600" b="1" i="1" dirty="0">
                 <a:solidFill>
-                  <a:srgbClr val="202020"/>
+                  <a:srgbClr val="757575"/>
                 </a:solidFill>
                 <a:latin typeface="Roboto Mono" pitchFamily="2" charset="0"/>
                 <a:ea typeface="Roboto Mono" pitchFamily="2" charset="0"/>
               </a:rPr>
-              <a:t>MCMC</a:t>
+              <a:t>MCMC Analysis</a:t>
             </a:r>
           </a:p>
         </p:txBody>
@@ -6569,6 +6789,1893 @@
               <a:latin typeface="Roboto Mono" pitchFamily="2" charset="0"/>
               <a:ea typeface="Roboto Mono" pitchFamily="2" charset="0"/>
             </a:endParaRPr>
+          </a:p>
+        </p:txBody>
+      </p:sp>
+      <p:sp>
+        <p:nvSpPr>
+          <p:cNvPr id="68" name="TextBox 67">
+            <a:extLst>
+              <a:ext uri="{FF2B5EF4-FFF2-40B4-BE49-F238E27FC236}">
+                <a16:creationId xmlns:a16="http://schemas.microsoft.com/office/drawing/2014/main" id="{536F96D6-A3BE-B64A-84F4-E4818240B506}"/>
+              </a:ext>
+            </a:extLst>
+          </p:cNvPr>
+          <p:cNvSpPr txBox="1"/>
+          <p:nvPr/>
+        </p:nvSpPr>
+        <p:spPr>
+          <a:xfrm>
+            <a:off x="5200901" y="10309937"/>
+            <a:ext cx="4816100" cy="338554"/>
+          </a:xfrm>
+          <a:prstGeom prst="rect">
+            <a:avLst/>
+          </a:prstGeom>
+          <a:noFill/>
+        </p:spPr>
+        <p:txBody>
+          <a:bodyPr wrap="square" rtlCol="0">
+            <a:spAutoFit/>
+          </a:bodyPr>
+          <a:lstStyle/>
+          <a:p>
+            <a:r>
+              <a:rPr lang="en-GB" sz="1600" dirty="0">
+                <a:latin typeface="Roboto Mono" pitchFamily="2" charset="0"/>
+                <a:ea typeface="Roboto Mono" pitchFamily="2" charset="0"/>
+              </a:rPr>
+              <a:t> </a:t>
+            </a:r>
+          </a:p>
+        </p:txBody>
+      </p:sp>
+      <p:sp>
+        <p:nvSpPr>
+          <p:cNvPr id="96" name="Rectangle 95">
+            <a:extLst>
+              <a:ext uri="{FF2B5EF4-FFF2-40B4-BE49-F238E27FC236}">
+                <a16:creationId xmlns:a16="http://schemas.microsoft.com/office/drawing/2014/main" id="{C74941D4-145C-894B-B39F-B8AE1A547C70}"/>
+              </a:ext>
+            </a:extLst>
+          </p:cNvPr>
+          <p:cNvSpPr/>
+          <p:nvPr/>
+        </p:nvSpPr>
+        <p:spPr>
+          <a:xfrm>
+            <a:off x="10208451" y="10371752"/>
+            <a:ext cx="4535426" cy="6527849"/>
+          </a:xfrm>
+          <a:prstGeom prst="rect">
+            <a:avLst/>
+          </a:prstGeom>
+          <a:solidFill>
+            <a:schemeClr val="bg1"/>
+          </a:solidFill>
+          <a:ln>
+            <a:noFill/>
+          </a:ln>
+          <a:effectLst>
+            <a:outerShdw blurRad="190500" dist="38100" dir="5400000" sx="99000" sy="99000" algn="ctr" rotWithShape="0">
+              <a:prstClr val="black">
+                <a:alpha val="40000"/>
+              </a:prstClr>
+            </a:outerShdw>
+          </a:effectLst>
+        </p:spPr>
+        <p:style>
+          <a:lnRef idx="2">
+            <a:schemeClr val="accent1">
+              <a:shade val="50000"/>
+            </a:schemeClr>
+          </a:lnRef>
+          <a:fillRef idx="1">
+            <a:schemeClr val="accent1"/>
+          </a:fillRef>
+          <a:effectRef idx="0">
+            <a:schemeClr val="accent1"/>
+          </a:effectRef>
+          <a:fontRef idx="minor">
+            <a:schemeClr val="lt1"/>
+          </a:fontRef>
+        </p:style>
+        <p:txBody>
+          <a:bodyPr rtlCol="0" anchor="ctr"/>
+          <a:lstStyle/>
+          <a:p>
+            <a:pPr algn="ctr"/>
+            <a:endParaRPr lang="en-GB" dirty="0"/>
+          </a:p>
+        </p:txBody>
+      </p:sp>
+      <p:pic>
+        <p:nvPicPr>
+          <p:cNvPr id="98" name="Picture 97">
+            <a:extLst>
+              <a:ext uri="{FF2B5EF4-FFF2-40B4-BE49-F238E27FC236}">
+                <a16:creationId xmlns:a16="http://schemas.microsoft.com/office/drawing/2014/main" id="{EC8299F9-4CC3-ED45-AD09-AA7549A5B29A}"/>
+              </a:ext>
+            </a:extLst>
+          </p:cNvPr>
+          <p:cNvPicPr>
+            <a:picLocks noChangeAspect="1"/>
+          </p:cNvPicPr>
+          <p:nvPr/>
+        </p:nvPicPr>
+        <p:blipFill rotWithShape="1">
+          <a:blip r:embed="rId6"/>
+          <a:srcRect l="6719" t="11882" r="8081"/>
+          <a:stretch/>
+        </p:blipFill>
+        <p:spPr>
+          <a:xfrm>
+            <a:off x="10518256" y="10467523"/>
+            <a:ext cx="4197969" cy="3265782"/>
+          </a:xfrm>
+          <a:prstGeom prst="rect">
+            <a:avLst/>
+          </a:prstGeom>
+        </p:spPr>
+      </p:pic>
+      <p:sp>
+        <p:nvSpPr>
+          <p:cNvPr id="99" name="Rectangle 98">
+            <a:extLst>
+              <a:ext uri="{FF2B5EF4-FFF2-40B4-BE49-F238E27FC236}">
+                <a16:creationId xmlns:a16="http://schemas.microsoft.com/office/drawing/2014/main" id="{0F3A41AE-ADF5-8149-B6D3-70AB951FE57B}"/>
+              </a:ext>
+            </a:extLst>
+          </p:cNvPr>
+          <p:cNvSpPr/>
+          <p:nvPr/>
+        </p:nvSpPr>
+        <p:spPr>
+          <a:xfrm>
+            <a:off x="10535678" y="10456889"/>
+            <a:ext cx="210001" cy="2959111"/>
+          </a:xfrm>
+          <a:prstGeom prst="rect">
+            <a:avLst/>
+          </a:prstGeom>
+          <a:solidFill>
+            <a:schemeClr val="bg1"/>
+          </a:solidFill>
+          <a:ln>
+            <a:noFill/>
+          </a:ln>
+        </p:spPr>
+        <p:style>
+          <a:lnRef idx="2">
+            <a:schemeClr val="accent1">
+              <a:shade val="50000"/>
+            </a:schemeClr>
+          </a:lnRef>
+          <a:fillRef idx="1">
+            <a:schemeClr val="accent1"/>
+          </a:fillRef>
+          <a:effectRef idx="0">
+            <a:schemeClr val="accent1"/>
+          </a:effectRef>
+          <a:fontRef idx="minor">
+            <a:schemeClr val="lt1"/>
+          </a:fontRef>
+        </p:style>
+        <p:txBody>
+          <a:bodyPr rtlCol="0" anchor="ctr"/>
+          <a:lstStyle/>
+          <a:p>
+            <a:pPr algn="ctr"/>
+            <a:endParaRPr lang="en-GB"/>
+          </a:p>
+        </p:txBody>
+      </p:sp>
+      <p:sp>
+        <p:nvSpPr>
+          <p:cNvPr id="97" name="TextBox 96">
+            <a:extLst>
+              <a:ext uri="{FF2B5EF4-FFF2-40B4-BE49-F238E27FC236}">
+                <a16:creationId xmlns:a16="http://schemas.microsoft.com/office/drawing/2014/main" id="{CF890B9D-43FF-9249-897F-8F7D8B5034EB}"/>
+              </a:ext>
+            </a:extLst>
+          </p:cNvPr>
+          <p:cNvSpPr txBox="1"/>
+          <p:nvPr/>
+        </p:nvSpPr>
+        <p:spPr>
+          <a:xfrm>
+            <a:off x="10318224" y="13045908"/>
+            <a:ext cx="506870" cy="307777"/>
+          </a:xfrm>
+          <a:prstGeom prst="rect">
+            <a:avLst/>
+          </a:prstGeom>
+          <a:noFill/>
+        </p:spPr>
+        <p:txBody>
+          <a:bodyPr wrap="none" rtlCol="0">
+            <a:spAutoFit/>
+          </a:bodyPr>
+          <a:lstStyle/>
+          <a:p>
+            <a:r>
+              <a:rPr lang="en-GB" sz="1400" dirty="0">
+                <a:latin typeface="Roboto Mono" pitchFamily="2" charset="0"/>
+                <a:ea typeface="Roboto Mono" pitchFamily="2" charset="0"/>
+              </a:rPr>
+              <a:t>0.0</a:t>
+            </a:r>
+          </a:p>
+        </p:txBody>
+      </p:sp>
+      <p:sp>
+        <p:nvSpPr>
+          <p:cNvPr id="100" name="TextBox 99">
+            <a:extLst>
+              <a:ext uri="{FF2B5EF4-FFF2-40B4-BE49-F238E27FC236}">
+                <a16:creationId xmlns:a16="http://schemas.microsoft.com/office/drawing/2014/main" id="{3D5B9817-CBDF-784B-B4FD-3BD7A7435965}"/>
+              </a:ext>
+            </a:extLst>
+          </p:cNvPr>
+          <p:cNvSpPr txBox="1"/>
+          <p:nvPr/>
+        </p:nvSpPr>
+        <p:spPr>
+          <a:xfrm>
+            <a:off x="10318224" y="12614941"/>
+            <a:ext cx="506870" cy="307777"/>
+          </a:xfrm>
+          <a:prstGeom prst="rect">
+            <a:avLst/>
+          </a:prstGeom>
+          <a:noFill/>
+        </p:spPr>
+        <p:txBody>
+          <a:bodyPr wrap="none" rtlCol="0">
+            <a:spAutoFit/>
+          </a:bodyPr>
+          <a:lstStyle/>
+          <a:p>
+            <a:r>
+              <a:rPr lang="en-GB" sz="1400" dirty="0">
+                <a:latin typeface="Roboto Mono" pitchFamily="2" charset="0"/>
+                <a:ea typeface="Roboto Mono" pitchFamily="2" charset="0"/>
+              </a:rPr>
+              <a:t>0.2</a:t>
+            </a:r>
+          </a:p>
+        </p:txBody>
+      </p:sp>
+      <p:sp>
+        <p:nvSpPr>
+          <p:cNvPr id="101" name="TextBox 100">
+            <a:extLst>
+              <a:ext uri="{FF2B5EF4-FFF2-40B4-BE49-F238E27FC236}">
+                <a16:creationId xmlns:a16="http://schemas.microsoft.com/office/drawing/2014/main" id="{C84CBD56-E59C-0B41-8E14-7C094B0C3F9F}"/>
+              </a:ext>
+            </a:extLst>
+          </p:cNvPr>
+          <p:cNvSpPr txBox="1"/>
+          <p:nvPr/>
+        </p:nvSpPr>
+        <p:spPr>
+          <a:xfrm>
+            <a:off x="10318224" y="12164022"/>
+            <a:ext cx="506870" cy="307777"/>
+          </a:xfrm>
+          <a:prstGeom prst="rect">
+            <a:avLst/>
+          </a:prstGeom>
+          <a:noFill/>
+        </p:spPr>
+        <p:txBody>
+          <a:bodyPr wrap="none" rtlCol="0">
+            <a:spAutoFit/>
+          </a:bodyPr>
+          <a:lstStyle/>
+          <a:p>
+            <a:r>
+              <a:rPr lang="en-GB" sz="1400" dirty="0">
+                <a:latin typeface="Roboto Mono" pitchFamily="2" charset="0"/>
+                <a:ea typeface="Roboto Mono" pitchFamily="2" charset="0"/>
+              </a:rPr>
+              <a:t>0.4</a:t>
+            </a:r>
+          </a:p>
+        </p:txBody>
+      </p:sp>
+      <p:sp>
+        <p:nvSpPr>
+          <p:cNvPr id="102" name="TextBox 101">
+            <a:extLst>
+              <a:ext uri="{FF2B5EF4-FFF2-40B4-BE49-F238E27FC236}">
+                <a16:creationId xmlns:a16="http://schemas.microsoft.com/office/drawing/2014/main" id="{2C546B30-26B1-6348-8DA1-ACDA6632BFE5}"/>
+              </a:ext>
+            </a:extLst>
+          </p:cNvPr>
+          <p:cNvSpPr txBox="1"/>
+          <p:nvPr/>
+        </p:nvSpPr>
+        <p:spPr>
+          <a:xfrm>
+            <a:off x="10318224" y="11721815"/>
+            <a:ext cx="506870" cy="307777"/>
+          </a:xfrm>
+          <a:prstGeom prst="rect">
+            <a:avLst/>
+          </a:prstGeom>
+          <a:noFill/>
+        </p:spPr>
+        <p:txBody>
+          <a:bodyPr wrap="none" rtlCol="0">
+            <a:spAutoFit/>
+          </a:bodyPr>
+          <a:lstStyle/>
+          <a:p>
+            <a:r>
+              <a:rPr lang="en-GB" sz="1400" dirty="0">
+                <a:latin typeface="Roboto Mono" pitchFamily="2" charset="0"/>
+                <a:ea typeface="Roboto Mono" pitchFamily="2" charset="0"/>
+              </a:rPr>
+              <a:t>0.6</a:t>
+            </a:r>
+          </a:p>
+        </p:txBody>
+      </p:sp>
+      <p:sp>
+        <p:nvSpPr>
+          <p:cNvPr id="103" name="TextBox 102">
+            <a:extLst>
+              <a:ext uri="{FF2B5EF4-FFF2-40B4-BE49-F238E27FC236}">
+                <a16:creationId xmlns:a16="http://schemas.microsoft.com/office/drawing/2014/main" id="{B0557B46-9D26-8149-A160-4C26B277239B}"/>
+              </a:ext>
+            </a:extLst>
+          </p:cNvPr>
+          <p:cNvSpPr txBox="1"/>
+          <p:nvPr/>
+        </p:nvSpPr>
+        <p:spPr>
+          <a:xfrm>
+            <a:off x="10226211" y="10438838"/>
+            <a:ext cx="389850" cy="338554"/>
+          </a:xfrm>
+          <a:prstGeom prst="rect">
+            <a:avLst/>
+          </a:prstGeom>
+          <a:noFill/>
+        </p:spPr>
+        <p:txBody>
+          <a:bodyPr wrap="none" rtlCol="0">
+            <a:spAutoFit/>
+          </a:bodyPr>
+          <a:lstStyle/>
+          <a:p>
+            <a:r>
+              <a:rPr lang="el-GR" sz="1600" b="1" i="1" dirty="0">
+                <a:latin typeface="Roboto Mono" pitchFamily="2" charset="0"/>
+                <a:ea typeface="Roboto Mono" pitchFamily="2" charset="0"/>
+              </a:rPr>
+              <a:t>Ω</a:t>
+            </a:r>
+            <a:r>
+              <a:rPr lang="en-GB" sz="1600" b="1" i="1" baseline="-25000" dirty="0">
+                <a:latin typeface="Roboto Mono" pitchFamily="2" charset="0"/>
+                <a:ea typeface="Roboto Mono" pitchFamily="2" charset="0"/>
+              </a:rPr>
+              <a:t>Λ</a:t>
+            </a:r>
+            <a:endParaRPr lang="en-GB" sz="1600" b="1" i="1" dirty="0">
+              <a:latin typeface="Roboto Mono" pitchFamily="2" charset="0"/>
+              <a:ea typeface="Roboto Mono" pitchFamily="2" charset="0"/>
+            </a:endParaRPr>
+          </a:p>
+        </p:txBody>
+      </p:sp>
+      <p:sp>
+        <p:nvSpPr>
+          <p:cNvPr id="104" name="TextBox 103">
+            <a:extLst>
+              <a:ext uri="{FF2B5EF4-FFF2-40B4-BE49-F238E27FC236}">
+                <a16:creationId xmlns:a16="http://schemas.microsoft.com/office/drawing/2014/main" id="{609BD436-2FFD-9740-84B8-B4FF7E4CF083}"/>
+              </a:ext>
+            </a:extLst>
+          </p:cNvPr>
+          <p:cNvSpPr txBox="1"/>
+          <p:nvPr/>
+        </p:nvSpPr>
+        <p:spPr>
+          <a:xfrm>
+            <a:off x="10329883" y="11290848"/>
+            <a:ext cx="506870" cy="307777"/>
+          </a:xfrm>
+          <a:prstGeom prst="rect">
+            <a:avLst/>
+          </a:prstGeom>
+          <a:noFill/>
+        </p:spPr>
+        <p:txBody>
+          <a:bodyPr wrap="none" rtlCol="0">
+            <a:spAutoFit/>
+          </a:bodyPr>
+          <a:lstStyle/>
+          <a:p>
+            <a:r>
+              <a:rPr lang="en-GB" sz="1400" dirty="0">
+                <a:latin typeface="Roboto Mono" pitchFamily="2" charset="0"/>
+                <a:ea typeface="Roboto Mono" pitchFamily="2" charset="0"/>
+              </a:rPr>
+              <a:t>0.8</a:t>
+            </a:r>
+          </a:p>
+        </p:txBody>
+      </p:sp>
+      <p:sp>
+        <p:nvSpPr>
+          <p:cNvPr id="105" name="TextBox 104">
+            <a:extLst>
+              <a:ext uri="{FF2B5EF4-FFF2-40B4-BE49-F238E27FC236}">
+                <a16:creationId xmlns:a16="http://schemas.microsoft.com/office/drawing/2014/main" id="{B997BA20-4984-174C-AC0B-FCDCDEC07EDF}"/>
+              </a:ext>
+            </a:extLst>
+          </p:cNvPr>
+          <p:cNvSpPr txBox="1"/>
+          <p:nvPr/>
+        </p:nvSpPr>
+        <p:spPr>
+          <a:xfrm>
+            <a:off x="10318224" y="10835781"/>
+            <a:ext cx="506870" cy="307777"/>
+          </a:xfrm>
+          <a:prstGeom prst="rect">
+            <a:avLst/>
+          </a:prstGeom>
+          <a:noFill/>
+        </p:spPr>
+        <p:txBody>
+          <a:bodyPr wrap="none" rtlCol="0">
+            <a:spAutoFit/>
+          </a:bodyPr>
+          <a:lstStyle/>
+          <a:p>
+            <a:r>
+              <a:rPr lang="en-GB" sz="1400" dirty="0">
+                <a:latin typeface="Roboto Mono" pitchFamily="2" charset="0"/>
+                <a:ea typeface="Roboto Mono" pitchFamily="2" charset="0"/>
+              </a:rPr>
+              <a:t>1.0</a:t>
+            </a:r>
+          </a:p>
+        </p:txBody>
+      </p:sp>
+      <p:sp>
+        <p:nvSpPr>
+          <p:cNvPr id="106" name="Rectangle 105">
+            <a:extLst>
+              <a:ext uri="{FF2B5EF4-FFF2-40B4-BE49-F238E27FC236}">
+                <a16:creationId xmlns:a16="http://schemas.microsoft.com/office/drawing/2014/main" id="{994A3F8F-3067-F149-975F-2BEFEDEF1901}"/>
+              </a:ext>
+            </a:extLst>
+          </p:cNvPr>
+          <p:cNvSpPr/>
+          <p:nvPr/>
+        </p:nvSpPr>
+        <p:spPr>
+          <a:xfrm rot="5400000">
+            <a:off x="12508461" y="11525545"/>
+            <a:ext cx="348661" cy="4066864"/>
+          </a:xfrm>
+          <a:prstGeom prst="rect">
+            <a:avLst/>
+          </a:prstGeom>
+          <a:solidFill>
+            <a:schemeClr val="bg1"/>
+          </a:solidFill>
+          <a:ln>
+            <a:noFill/>
+          </a:ln>
+        </p:spPr>
+        <p:style>
+          <a:lnRef idx="2">
+            <a:schemeClr val="accent1">
+              <a:shade val="50000"/>
+            </a:schemeClr>
+          </a:lnRef>
+          <a:fillRef idx="1">
+            <a:schemeClr val="accent1"/>
+          </a:fillRef>
+          <a:effectRef idx="0">
+            <a:schemeClr val="accent1"/>
+          </a:effectRef>
+          <a:fontRef idx="minor">
+            <a:schemeClr val="lt1"/>
+          </a:fontRef>
+        </p:style>
+        <p:txBody>
+          <a:bodyPr rtlCol="0" anchor="ctr"/>
+          <a:lstStyle/>
+          <a:p>
+            <a:pPr algn="ctr"/>
+            <a:endParaRPr lang="en-GB"/>
+          </a:p>
+        </p:txBody>
+      </p:sp>
+      <p:sp>
+        <p:nvSpPr>
+          <p:cNvPr id="107" name="TextBox 106">
+            <a:extLst>
+              <a:ext uri="{FF2B5EF4-FFF2-40B4-BE49-F238E27FC236}">
+                <a16:creationId xmlns:a16="http://schemas.microsoft.com/office/drawing/2014/main" id="{63BF52F6-E0AC-8D4C-BEEA-46592E9C9B36}"/>
+              </a:ext>
+            </a:extLst>
+          </p:cNvPr>
+          <p:cNvSpPr txBox="1"/>
+          <p:nvPr/>
+        </p:nvSpPr>
+        <p:spPr>
+          <a:xfrm rot="-2700000">
+            <a:off x="10533408" y="13391962"/>
+            <a:ext cx="614271" cy="307777"/>
+          </a:xfrm>
+          <a:prstGeom prst="rect">
+            <a:avLst/>
+          </a:prstGeom>
+          <a:noFill/>
+        </p:spPr>
+        <p:txBody>
+          <a:bodyPr wrap="none" rtlCol="0">
+            <a:spAutoFit/>
+          </a:bodyPr>
+          <a:lstStyle/>
+          <a:p>
+            <a:r>
+              <a:rPr lang="en-GB" sz="1400" dirty="0">
+                <a:latin typeface="Roboto Mono" pitchFamily="2" charset="0"/>
+                <a:ea typeface="Roboto Mono" pitchFamily="2" charset="0"/>
+              </a:rPr>
+              <a:t>2.50</a:t>
+            </a:r>
+          </a:p>
+        </p:txBody>
+      </p:sp>
+      <p:sp>
+        <p:nvSpPr>
+          <p:cNvPr id="108" name="TextBox 107">
+            <a:extLst>
+              <a:ext uri="{FF2B5EF4-FFF2-40B4-BE49-F238E27FC236}">
+                <a16:creationId xmlns:a16="http://schemas.microsoft.com/office/drawing/2014/main" id="{0E5B99CD-D727-0F49-B366-E18BC4266E4F}"/>
+              </a:ext>
+            </a:extLst>
+          </p:cNvPr>
+          <p:cNvSpPr txBox="1"/>
+          <p:nvPr/>
+        </p:nvSpPr>
+        <p:spPr>
+          <a:xfrm>
+            <a:off x="14122706" y="13507627"/>
+            <a:ext cx="651140" cy="307777"/>
+          </a:xfrm>
+          <a:prstGeom prst="rect">
+            <a:avLst/>
+          </a:prstGeom>
+          <a:noFill/>
+        </p:spPr>
+        <p:txBody>
+          <a:bodyPr wrap="none" rtlCol="0">
+            <a:spAutoFit/>
+          </a:bodyPr>
+          <a:lstStyle/>
+          <a:p>
+            <a:r>
+              <a:rPr lang="en-GB" sz="1400" dirty="0">
+                <a:latin typeface="Roboto Mono" pitchFamily="2" charset="0"/>
+                <a:ea typeface="Roboto Mono" pitchFamily="2" charset="0"/>
+              </a:rPr>
+              <a:t>x10</a:t>
+            </a:r>
+            <a:r>
+              <a:rPr lang="en-GB" sz="1400" baseline="30000" dirty="0">
+                <a:latin typeface="Roboto Mono" pitchFamily="2" charset="0"/>
+                <a:ea typeface="Roboto Mono" pitchFamily="2" charset="0"/>
+              </a:rPr>
+              <a:t>35</a:t>
+            </a:r>
+            <a:endParaRPr lang="en-GB" sz="1400" dirty="0">
+              <a:latin typeface="Roboto Mono" pitchFamily="2" charset="0"/>
+              <a:ea typeface="Roboto Mono" pitchFamily="2" charset="0"/>
+            </a:endParaRPr>
+          </a:p>
+        </p:txBody>
+      </p:sp>
+      <p:sp>
+        <p:nvSpPr>
+          <p:cNvPr id="109" name="TextBox 108">
+            <a:extLst>
+              <a:ext uri="{FF2B5EF4-FFF2-40B4-BE49-F238E27FC236}">
+                <a16:creationId xmlns:a16="http://schemas.microsoft.com/office/drawing/2014/main" id="{C7891DB9-3CDB-A348-8981-BF7C422BC7C2}"/>
+              </a:ext>
+            </a:extLst>
+          </p:cNvPr>
+          <p:cNvSpPr txBox="1"/>
+          <p:nvPr/>
+        </p:nvSpPr>
+        <p:spPr>
+          <a:xfrm rot="-2700000">
+            <a:off x="10955987" y="13405088"/>
+            <a:ext cx="614271" cy="307777"/>
+          </a:xfrm>
+          <a:prstGeom prst="rect">
+            <a:avLst/>
+          </a:prstGeom>
+          <a:noFill/>
+        </p:spPr>
+        <p:txBody>
+          <a:bodyPr wrap="none" rtlCol="0">
+            <a:spAutoFit/>
+          </a:bodyPr>
+          <a:lstStyle/>
+          <a:p>
+            <a:r>
+              <a:rPr lang="en-GB" sz="1400" dirty="0">
+                <a:latin typeface="Roboto Mono" pitchFamily="2" charset="0"/>
+                <a:ea typeface="Roboto Mono" pitchFamily="2" charset="0"/>
+              </a:rPr>
+              <a:t>2.75</a:t>
+            </a:r>
+          </a:p>
+        </p:txBody>
+      </p:sp>
+      <p:sp>
+        <p:nvSpPr>
+          <p:cNvPr id="110" name="TextBox 109">
+            <a:extLst>
+              <a:ext uri="{FF2B5EF4-FFF2-40B4-BE49-F238E27FC236}">
+                <a16:creationId xmlns:a16="http://schemas.microsoft.com/office/drawing/2014/main" id="{3FDD2FD6-7BD3-1645-8552-33FD64AF9249}"/>
+              </a:ext>
+            </a:extLst>
+          </p:cNvPr>
+          <p:cNvSpPr txBox="1"/>
+          <p:nvPr/>
+        </p:nvSpPr>
+        <p:spPr>
+          <a:xfrm rot="-2700000">
+            <a:off x="11414270" y="13400534"/>
+            <a:ext cx="614271" cy="307777"/>
+          </a:xfrm>
+          <a:prstGeom prst="rect">
+            <a:avLst/>
+          </a:prstGeom>
+          <a:noFill/>
+        </p:spPr>
+        <p:txBody>
+          <a:bodyPr wrap="none" rtlCol="0">
+            <a:spAutoFit/>
+          </a:bodyPr>
+          <a:lstStyle/>
+          <a:p>
+            <a:r>
+              <a:rPr lang="en-GB" sz="1400" dirty="0">
+                <a:latin typeface="Roboto Mono" pitchFamily="2" charset="0"/>
+                <a:ea typeface="Roboto Mono" pitchFamily="2" charset="0"/>
+              </a:rPr>
+              <a:t>3.00</a:t>
+            </a:r>
+          </a:p>
+        </p:txBody>
+      </p:sp>
+      <p:sp>
+        <p:nvSpPr>
+          <p:cNvPr id="111" name="TextBox 110">
+            <a:extLst>
+              <a:ext uri="{FF2B5EF4-FFF2-40B4-BE49-F238E27FC236}">
+                <a16:creationId xmlns:a16="http://schemas.microsoft.com/office/drawing/2014/main" id="{91718F93-E834-EC48-A154-5758E8B303D2}"/>
+              </a:ext>
+            </a:extLst>
+          </p:cNvPr>
+          <p:cNvSpPr txBox="1"/>
+          <p:nvPr/>
+        </p:nvSpPr>
+        <p:spPr>
+          <a:xfrm rot="18900000">
+            <a:off x="11852371" y="13404900"/>
+            <a:ext cx="614271" cy="307777"/>
+          </a:xfrm>
+          <a:prstGeom prst="rect">
+            <a:avLst/>
+          </a:prstGeom>
+          <a:noFill/>
+        </p:spPr>
+        <p:txBody>
+          <a:bodyPr wrap="none" rtlCol="0">
+            <a:spAutoFit/>
+          </a:bodyPr>
+          <a:lstStyle/>
+          <a:p>
+            <a:r>
+              <a:rPr lang="en-GB" sz="1400" dirty="0">
+                <a:latin typeface="Roboto Mono" pitchFamily="2" charset="0"/>
+                <a:ea typeface="Roboto Mono" pitchFamily="2" charset="0"/>
+              </a:rPr>
+              <a:t>3.25</a:t>
+            </a:r>
+          </a:p>
+        </p:txBody>
+      </p:sp>
+      <p:sp>
+        <p:nvSpPr>
+          <p:cNvPr id="112" name="TextBox 111">
+            <a:extLst>
+              <a:ext uri="{FF2B5EF4-FFF2-40B4-BE49-F238E27FC236}">
+                <a16:creationId xmlns:a16="http://schemas.microsoft.com/office/drawing/2014/main" id="{34E7A011-EF6F-C442-BB70-006E54677FB6}"/>
+              </a:ext>
+            </a:extLst>
+          </p:cNvPr>
+          <p:cNvSpPr txBox="1"/>
+          <p:nvPr/>
+        </p:nvSpPr>
+        <p:spPr>
+          <a:xfrm>
+            <a:off x="12302754" y="13728817"/>
+            <a:ext cx="635110" cy="338554"/>
+          </a:xfrm>
+          <a:prstGeom prst="rect">
+            <a:avLst/>
+          </a:prstGeom>
+          <a:noFill/>
+        </p:spPr>
+        <p:txBody>
+          <a:bodyPr wrap="none" rtlCol="0">
+            <a:spAutoFit/>
+          </a:bodyPr>
+          <a:lstStyle/>
+          <a:p>
+            <a:r>
+              <a:rPr lang="en-GB" sz="1600" b="1" i="1" dirty="0" err="1">
+                <a:latin typeface="Roboto Mono" pitchFamily="2" charset="0"/>
+                <a:ea typeface="Roboto Mono" pitchFamily="2" charset="0"/>
+              </a:rPr>
+              <a:t>L</a:t>
+            </a:r>
+            <a:r>
+              <a:rPr lang="en-GB" sz="1600" b="1" i="1" baseline="-25000" dirty="0" err="1">
+                <a:latin typeface="Roboto Mono" pitchFamily="2" charset="0"/>
+                <a:ea typeface="Roboto Mono" pitchFamily="2" charset="0"/>
+              </a:rPr>
+              <a:t>peak</a:t>
+            </a:r>
+            <a:endParaRPr lang="en-GB" sz="1600" b="1" i="1" dirty="0">
+              <a:latin typeface="Roboto Mono" pitchFamily="2" charset="0"/>
+              <a:ea typeface="Roboto Mono" pitchFamily="2" charset="0"/>
+            </a:endParaRPr>
+          </a:p>
+        </p:txBody>
+      </p:sp>
+      <p:sp>
+        <p:nvSpPr>
+          <p:cNvPr id="113" name="TextBox 112">
+            <a:extLst>
+              <a:ext uri="{FF2B5EF4-FFF2-40B4-BE49-F238E27FC236}">
+                <a16:creationId xmlns:a16="http://schemas.microsoft.com/office/drawing/2014/main" id="{4500FE40-059D-1340-8F28-0F42274A446E}"/>
+              </a:ext>
+            </a:extLst>
+          </p:cNvPr>
+          <p:cNvSpPr txBox="1"/>
+          <p:nvPr/>
+        </p:nvSpPr>
+        <p:spPr>
+          <a:xfrm rot="18900000">
+            <a:off x="12323954" y="13407424"/>
+            <a:ext cx="614271" cy="307777"/>
+          </a:xfrm>
+          <a:prstGeom prst="rect">
+            <a:avLst/>
+          </a:prstGeom>
+          <a:noFill/>
+        </p:spPr>
+        <p:txBody>
+          <a:bodyPr wrap="none" rtlCol="0">
+            <a:spAutoFit/>
+          </a:bodyPr>
+          <a:lstStyle/>
+          <a:p>
+            <a:r>
+              <a:rPr lang="en-GB" sz="1400" dirty="0">
+                <a:latin typeface="Roboto Mono" pitchFamily="2" charset="0"/>
+                <a:ea typeface="Roboto Mono" pitchFamily="2" charset="0"/>
+              </a:rPr>
+              <a:t>3.50</a:t>
+            </a:r>
+          </a:p>
+        </p:txBody>
+      </p:sp>
+      <p:sp>
+        <p:nvSpPr>
+          <p:cNvPr id="114" name="TextBox 113">
+            <a:extLst>
+              <a:ext uri="{FF2B5EF4-FFF2-40B4-BE49-F238E27FC236}">
+                <a16:creationId xmlns:a16="http://schemas.microsoft.com/office/drawing/2014/main" id="{78D5EDC2-D604-AF45-8C79-90E4EE6F1954}"/>
+              </a:ext>
+            </a:extLst>
+          </p:cNvPr>
+          <p:cNvSpPr txBox="1"/>
+          <p:nvPr/>
+        </p:nvSpPr>
+        <p:spPr>
+          <a:xfrm rot="18900000">
+            <a:off x="12777917" y="13400534"/>
+            <a:ext cx="614271" cy="307777"/>
+          </a:xfrm>
+          <a:prstGeom prst="rect">
+            <a:avLst/>
+          </a:prstGeom>
+          <a:noFill/>
+        </p:spPr>
+        <p:txBody>
+          <a:bodyPr wrap="none" rtlCol="0">
+            <a:spAutoFit/>
+          </a:bodyPr>
+          <a:lstStyle/>
+          <a:p>
+            <a:r>
+              <a:rPr lang="en-GB" sz="1400" dirty="0">
+                <a:latin typeface="Roboto Mono" pitchFamily="2" charset="0"/>
+                <a:ea typeface="Roboto Mono" pitchFamily="2" charset="0"/>
+              </a:rPr>
+              <a:t>3.75</a:t>
+            </a:r>
+          </a:p>
+        </p:txBody>
+      </p:sp>
+      <p:sp>
+        <p:nvSpPr>
+          <p:cNvPr id="115" name="TextBox 114">
+            <a:extLst>
+              <a:ext uri="{FF2B5EF4-FFF2-40B4-BE49-F238E27FC236}">
+                <a16:creationId xmlns:a16="http://schemas.microsoft.com/office/drawing/2014/main" id="{8AAD1905-FFE2-8A4C-9593-F1A28C1D0F46}"/>
+              </a:ext>
+            </a:extLst>
+          </p:cNvPr>
+          <p:cNvSpPr txBox="1"/>
+          <p:nvPr/>
+        </p:nvSpPr>
+        <p:spPr>
+          <a:xfrm rot="18900000">
+            <a:off x="13156397" y="13411791"/>
+            <a:ext cx="614271" cy="307777"/>
+          </a:xfrm>
+          <a:prstGeom prst="rect">
+            <a:avLst/>
+          </a:prstGeom>
+          <a:noFill/>
+        </p:spPr>
+        <p:txBody>
+          <a:bodyPr wrap="none" rtlCol="0">
+            <a:spAutoFit/>
+          </a:bodyPr>
+          <a:lstStyle/>
+          <a:p>
+            <a:r>
+              <a:rPr lang="en-GB" sz="1400" dirty="0">
+                <a:latin typeface="Roboto Mono" pitchFamily="2" charset="0"/>
+                <a:ea typeface="Roboto Mono" pitchFamily="2" charset="0"/>
+              </a:rPr>
+              <a:t>4.00</a:t>
+            </a:r>
+          </a:p>
+        </p:txBody>
+      </p:sp>
+      <p:sp>
+        <p:nvSpPr>
+          <p:cNvPr id="116" name="TextBox 115">
+            <a:extLst>
+              <a:ext uri="{FF2B5EF4-FFF2-40B4-BE49-F238E27FC236}">
+                <a16:creationId xmlns:a16="http://schemas.microsoft.com/office/drawing/2014/main" id="{8D9D47DB-7D69-D347-8E6C-33102BF055E5}"/>
+              </a:ext>
+            </a:extLst>
+          </p:cNvPr>
+          <p:cNvSpPr txBox="1"/>
+          <p:nvPr/>
+        </p:nvSpPr>
+        <p:spPr>
+          <a:xfrm rot="18900000">
+            <a:off x="13604448" y="13403652"/>
+            <a:ext cx="614271" cy="307777"/>
+          </a:xfrm>
+          <a:prstGeom prst="rect">
+            <a:avLst/>
+          </a:prstGeom>
+          <a:noFill/>
+        </p:spPr>
+        <p:txBody>
+          <a:bodyPr wrap="none" rtlCol="0">
+            <a:spAutoFit/>
+          </a:bodyPr>
+          <a:lstStyle/>
+          <a:p>
+            <a:r>
+              <a:rPr lang="en-GB" sz="1400" dirty="0">
+                <a:latin typeface="Roboto Mono" pitchFamily="2" charset="0"/>
+                <a:ea typeface="Roboto Mono" pitchFamily="2" charset="0"/>
+              </a:rPr>
+              <a:t>4.25</a:t>
+            </a:r>
+          </a:p>
+        </p:txBody>
+      </p:sp>
+      <p:sp>
+        <p:nvSpPr>
+          <p:cNvPr id="117" name="TextBox 116">
+            <a:extLst>
+              <a:ext uri="{FF2B5EF4-FFF2-40B4-BE49-F238E27FC236}">
+                <a16:creationId xmlns:a16="http://schemas.microsoft.com/office/drawing/2014/main" id="{70AB2369-BB27-CF41-B649-D1EE49B5E5A1}"/>
+              </a:ext>
+            </a:extLst>
+          </p:cNvPr>
+          <p:cNvSpPr txBox="1"/>
+          <p:nvPr/>
+        </p:nvSpPr>
+        <p:spPr>
+          <a:xfrm>
+            <a:off x="10280164" y="14041118"/>
+            <a:ext cx="4410671" cy="2539157"/>
+          </a:xfrm>
+          <a:prstGeom prst="rect">
+            <a:avLst/>
+          </a:prstGeom>
+          <a:noFill/>
+        </p:spPr>
+        <p:txBody>
+          <a:bodyPr wrap="square" rtlCol="0">
+            <a:spAutoFit/>
+          </a:bodyPr>
+          <a:lstStyle/>
+          <a:p>
+            <a:r>
+              <a:rPr lang="en-GB" sz="1450" dirty="0">
+                <a:latin typeface="Roboto Mono" pitchFamily="2" charset="0"/>
+                <a:ea typeface="Roboto Mono" pitchFamily="2" charset="0"/>
+              </a:rPr>
+              <a:t>FIG. 2: Plot showing the MCMC sample space. </a:t>
+            </a:r>
+            <a:r>
+              <a:rPr lang="el-GR" sz="1400" b="1" i="1" dirty="0">
+                <a:latin typeface="Roboto Mono" pitchFamily="2" charset="0"/>
+                <a:ea typeface="Roboto Mono" pitchFamily="2" charset="0"/>
+              </a:rPr>
+              <a:t>Ω</a:t>
+            </a:r>
+            <a:r>
+              <a:rPr lang="en-GB" sz="1400" b="1" i="1" baseline="-25000" dirty="0">
+                <a:latin typeface="Roboto Mono" pitchFamily="2" charset="0"/>
+                <a:ea typeface="Roboto Mono" pitchFamily="2" charset="0"/>
+              </a:rPr>
+              <a:t>Λ</a:t>
+            </a:r>
+            <a:r>
+              <a:rPr lang="en-GB" sz="1400" b="1" dirty="0">
+                <a:latin typeface="Roboto Mono" pitchFamily="2" charset="0"/>
+                <a:ea typeface="Roboto Mono" pitchFamily="2" charset="0"/>
+              </a:rPr>
+              <a:t> </a:t>
+            </a:r>
+            <a:r>
+              <a:rPr lang="en-GB" sz="1400" dirty="0">
+                <a:latin typeface="Roboto Mono" pitchFamily="2" charset="0"/>
+                <a:ea typeface="Roboto Mono" pitchFamily="2" charset="0"/>
+              </a:rPr>
+              <a:t>was fitted with </a:t>
+            </a:r>
+            <a:r>
+              <a:rPr lang="en-GB" sz="1400" b="1" i="1" dirty="0" err="1">
+                <a:latin typeface="Roboto Mono" pitchFamily="2" charset="0"/>
+                <a:ea typeface="Roboto Mono" pitchFamily="2" charset="0"/>
+              </a:rPr>
+              <a:t>L</a:t>
+            </a:r>
+            <a:r>
+              <a:rPr lang="en-GB" sz="1400" b="1" i="1" baseline="-25000" dirty="0" err="1">
+                <a:latin typeface="Roboto Mono" pitchFamily="2" charset="0"/>
+                <a:ea typeface="Roboto Mono" pitchFamily="2" charset="0"/>
+              </a:rPr>
+              <a:t>peak</a:t>
+            </a:r>
+            <a:r>
+              <a:rPr lang="en-GB" sz="1400" dirty="0">
+                <a:latin typeface="Roboto Mono" pitchFamily="2" charset="0"/>
+                <a:ea typeface="Roboto Mono" pitchFamily="2" charset="0"/>
+              </a:rPr>
+              <a:t>, an extra variable in the supernova flux model.</a:t>
+            </a:r>
+            <a:r>
+              <a:rPr lang="en-GB" sz="1400" b="1" i="1" dirty="0">
+                <a:latin typeface="Roboto Mono" pitchFamily="2" charset="0"/>
+                <a:ea typeface="Roboto Mono" pitchFamily="2" charset="0"/>
+              </a:rPr>
+              <a:t> </a:t>
+            </a:r>
+            <a:r>
+              <a:rPr lang="en-GB" sz="1450" dirty="0">
+                <a:latin typeface="Roboto Mono" pitchFamily="2" charset="0"/>
+                <a:ea typeface="Roboto Mono" pitchFamily="2" charset="0"/>
+              </a:rPr>
+              <a:t>15,000 parameter values were tested over 10 runs of 1500 tests each. The red dot shows the initial search, the blue shows the most likely from each run, and the green is the final averaged values. The red ellipses show the standard deviation spread (1</a:t>
+            </a:r>
+            <a:r>
+              <a:rPr lang="el-GR" sz="1450" dirty="0">
+                <a:latin typeface="Roboto Mono" pitchFamily="2" charset="0"/>
+                <a:ea typeface="Roboto Mono" pitchFamily="2" charset="0"/>
+              </a:rPr>
+              <a:t>σ</a:t>
+            </a:r>
+            <a:r>
+              <a:rPr lang="en-GB" sz="1450" dirty="0">
+                <a:latin typeface="Roboto Mono" pitchFamily="2" charset="0"/>
+                <a:ea typeface="Roboto Mono" pitchFamily="2" charset="0"/>
+              </a:rPr>
+              <a:t>, 2</a:t>
+            </a:r>
+            <a:r>
+              <a:rPr lang="el-GR" sz="1450" dirty="0">
+                <a:latin typeface="Roboto Mono" pitchFamily="2" charset="0"/>
+                <a:ea typeface="Roboto Mono" pitchFamily="2" charset="0"/>
+              </a:rPr>
+              <a:t>σ</a:t>
+            </a:r>
+            <a:r>
+              <a:rPr lang="en-GB" sz="1450" dirty="0">
+                <a:latin typeface="Roboto Mono" pitchFamily="2" charset="0"/>
+                <a:ea typeface="Roboto Mono" pitchFamily="2" charset="0"/>
+              </a:rPr>
+              <a:t>, and 3</a:t>
+            </a:r>
+            <a:r>
+              <a:rPr lang="el-GR" sz="1450" dirty="0">
+                <a:latin typeface="Roboto Mono" pitchFamily="2" charset="0"/>
+                <a:ea typeface="Roboto Mono" pitchFamily="2" charset="0"/>
+              </a:rPr>
+              <a:t>σ</a:t>
+            </a:r>
+            <a:r>
+              <a:rPr lang="en-GB" sz="1450" dirty="0">
+                <a:latin typeface="Roboto Mono" pitchFamily="2" charset="0"/>
+                <a:ea typeface="Roboto Mono" pitchFamily="2" charset="0"/>
+              </a:rPr>
+              <a:t>).</a:t>
+            </a:r>
+          </a:p>
+        </p:txBody>
+      </p:sp>
+      <p:sp>
+        <p:nvSpPr>
+          <p:cNvPr id="119" name="TextBox 118">
+            <a:extLst>
+              <a:ext uri="{FF2B5EF4-FFF2-40B4-BE49-F238E27FC236}">
+                <a16:creationId xmlns:a16="http://schemas.microsoft.com/office/drawing/2014/main" id="{645EED62-AB16-7F4E-B6EF-847682D17A35}"/>
+              </a:ext>
+            </a:extLst>
+          </p:cNvPr>
+          <p:cNvSpPr txBox="1"/>
+          <p:nvPr/>
+        </p:nvSpPr>
+        <p:spPr>
+          <a:xfrm>
+            <a:off x="5076429" y="11395264"/>
+            <a:ext cx="4441238" cy="369332"/>
+          </a:xfrm>
+          <a:prstGeom prst="rect">
+            <a:avLst/>
+          </a:prstGeom>
+          <a:noFill/>
+        </p:spPr>
+        <p:txBody>
+          <a:bodyPr wrap="square" rtlCol="0">
+            <a:spAutoFit/>
+          </a:bodyPr>
+          <a:lstStyle/>
+          <a:p>
+            <a:pPr algn="ctr"/>
+            <a:r>
+              <a:rPr lang="en-GB" sz="1800" i="1" dirty="0">
+                <a:latin typeface="Roboto Mono Medium" pitchFamily="2" charset="0"/>
+                <a:ea typeface="Roboto Mono Medium" pitchFamily="2" charset="0"/>
+              </a:rPr>
+              <a:t>H=H</a:t>
+            </a:r>
+            <a:r>
+              <a:rPr lang="en-GB" sz="1800" i="1" baseline="-25000" dirty="0">
+                <a:latin typeface="Roboto Mono Medium" pitchFamily="2" charset="0"/>
+                <a:ea typeface="Roboto Mono Medium" pitchFamily="2" charset="0"/>
+              </a:rPr>
+              <a:t>0</a:t>
+            </a:r>
+            <a:r>
+              <a:rPr lang="en-GB" sz="1800" i="1" dirty="0">
+                <a:latin typeface="Roboto Mono Medium" pitchFamily="2" charset="0"/>
+                <a:ea typeface="Roboto Mono Medium" pitchFamily="2" charset="0"/>
+              </a:rPr>
+              <a:t>[X(z)</a:t>
+            </a:r>
+            <a:r>
+              <a:rPr lang="el-GR" sz="1800" i="1" dirty="0">
+                <a:latin typeface="Roboto Mono Medium" pitchFamily="2" charset="0"/>
+                <a:ea typeface="Roboto Mono Medium" pitchFamily="2" charset="0"/>
+              </a:rPr>
+              <a:t>Ω</a:t>
+            </a:r>
+            <a:r>
+              <a:rPr lang="en-GB" sz="1800" i="1" baseline="-25000" dirty="0">
+                <a:latin typeface="Roboto Mono Medium" pitchFamily="2" charset="0"/>
+                <a:ea typeface="Roboto Mono Medium" pitchFamily="2" charset="0"/>
+              </a:rPr>
+              <a:t>Λ</a:t>
+            </a:r>
+            <a:r>
+              <a:rPr lang="en-GB" sz="1800" i="1" dirty="0">
+                <a:latin typeface="Roboto Mono Medium" pitchFamily="2" charset="0"/>
+                <a:ea typeface="Roboto Mono Medium" pitchFamily="2" charset="0"/>
+              </a:rPr>
+              <a:t>+(1+z)</a:t>
+            </a:r>
+            <a:r>
+              <a:rPr lang="en-GB" sz="1800" i="1" baseline="30000" dirty="0">
+                <a:latin typeface="Roboto Mono Medium" pitchFamily="2" charset="0"/>
+                <a:ea typeface="Roboto Mono Medium" pitchFamily="2" charset="0"/>
+              </a:rPr>
+              <a:t>2</a:t>
+            </a:r>
+            <a:r>
+              <a:rPr lang="el-GR" sz="1800" i="1" dirty="0">
+                <a:latin typeface="Roboto Mono Medium" pitchFamily="2" charset="0"/>
+                <a:ea typeface="Roboto Mono Medium" pitchFamily="2" charset="0"/>
+              </a:rPr>
+              <a:t>Ω</a:t>
+            </a:r>
+            <a:r>
+              <a:rPr lang="en-GB" sz="1800" i="1" baseline="-25000" dirty="0">
+                <a:latin typeface="Roboto Mono Medium" pitchFamily="2" charset="0"/>
+                <a:ea typeface="Roboto Mono Medium" pitchFamily="2" charset="0"/>
+              </a:rPr>
+              <a:t>k</a:t>
+            </a:r>
+            <a:r>
+              <a:rPr lang="en-GB" sz="1800" i="1" dirty="0">
+                <a:latin typeface="Roboto Mono Medium" pitchFamily="2" charset="0"/>
+                <a:ea typeface="Roboto Mono Medium" pitchFamily="2" charset="0"/>
+              </a:rPr>
+              <a:t>+(1+z)</a:t>
+            </a:r>
+            <a:r>
+              <a:rPr lang="en-GB" sz="1800" i="1" baseline="30000" dirty="0">
+                <a:latin typeface="Roboto Mono Medium" pitchFamily="2" charset="0"/>
+                <a:ea typeface="Roboto Mono Medium" pitchFamily="2" charset="0"/>
+              </a:rPr>
+              <a:t>3</a:t>
+            </a:r>
+            <a:r>
+              <a:rPr lang="el-GR" sz="1800" i="1" dirty="0">
+                <a:latin typeface="Roboto Mono Medium" pitchFamily="2" charset="0"/>
+                <a:ea typeface="Roboto Mono Medium" pitchFamily="2" charset="0"/>
+              </a:rPr>
+              <a:t>Ω</a:t>
+            </a:r>
+            <a:r>
+              <a:rPr lang="en-GB" sz="1800" i="1" baseline="-25000" dirty="0">
+                <a:latin typeface="Roboto Mono Medium" pitchFamily="2" charset="0"/>
+                <a:ea typeface="Roboto Mono Medium" pitchFamily="2" charset="0"/>
+              </a:rPr>
+              <a:t>m</a:t>
+            </a:r>
+            <a:endParaRPr lang="en-GB" sz="1800" i="1" dirty="0">
+              <a:latin typeface="Roboto Mono Medium" pitchFamily="2" charset="0"/>
+              <a:ea typeface="Roboto Mono Medium" pitchFamily="2" charset="0"/>
+            </a:endParaRPr>
+          </a:p>
+        </p:txBody>
+      </p:sp>
+      <p:sp>
+        <p:nvSpPr>
+          <p:cNvPr id="120" name="TextBox 119">
+            <a:extLst>
+              <a:ext uri="{FF2B5EF4-FFF2-40B4-BE49-F238E27FC236}">
+                <a16:creationId xmlns:a16="http://schemas.microsoft.com/office/drawing/2014/main" id="{35C71151-528D-EF4A-804A-913E312331F4}"/>
+              </a:ext>
+            </a:extLst>
+          </p:cNvPr>
+          <p:cNvSpPr txBox="1"/>
+          <p:nvPr/>
+        </p:nvSpPr>
+        <p:spPr>
+          <a:xfrm>
+            <a:off x="418797" y="13640183"/>
+            <a:ext cx="4715888" cy="3908762"/>
+          </a:xfrm>
+          <a:prstGeom prst="rect">
+            <a:avLst/>
+          </a:prstGeom>
+          <a:noFill/>
+        </p:spPr>
+        <p:txBody>
+          <a:bodyPr wrap="square" rtlCol="0">
+            <a:spAutoFit/>
+          </a:bodyPr>
+          <a:lstStyle/>
+          <a:p>
+            <a:r>
+              <a:rPr lang="en-GB" sz="1600" dirty="0">
+                <a:latin typeface="Roboto Mono" pitchFamily="2" charset="0"/>
+                <a:ea typeface="Roboto Mono" pitchFamily="2" charset="0"/>
+              </a:rPr>
+              <a:t>To work with a model with multiple parameters, MCMC analysis was chosen. It allowed us to easily sample and manipulate a parameter space to obtain accurate parameters.</a:t>
+            </a:r>
+          </a:p>
+          <a:p>
+            <a:endParaRPr lang="en-GB" sz="1200" dirty="0">
+              <a:latin typeface="Roboto Mono" pitchFamily="2" charset="0"/>
+              <a:ea typeface="Roboto Mono" pitchFamily="2" charset="0"/>
+            </a:endParaRPr>
+          </a:p>
+          <a:p>
+            <a:r>
+              <a:rPr lang="en-GB" sz="1600" dirty="0">
+                <a:latin typeface="Roboto Mono" pitchFamily="2" charset="0"/>
+                <a:ea typeface="Roboto Mono" pitchFamily="2" charset="0"/>
+              </a:rPr>
+              <a:t>This method simply assigns a probability to the model produced and to the corresponding parameters used, the system with the highest likelihood would then be accepted.</a:t>
+            </a:r>
+          </a:p>
+          <a:p>
+            <a:endParaRPr lang="en-GB" sz="1200" dirty="0">
+              <a:latin typeface="Roboto Mono" pitchFamily="2" charset="0"/>
+              <a:ea typeface="Roboto Mono" pitchFamily="2" charset="0"/>
+            </a:endParaRPr>
+          </a:p>
+          <a:p>
+            <a:r>
+              <a:rPr lang="en-GB" sz="1600" dirty="0">
+                <a:latin typeface="Roboto Mono" pitchFamily="2" charset="0"/>
+                <a:ea typeface="Roboto Mono" pitchFamily="2" charset="0"/>
+              </a:rPr>
+              <a:t>We attempted this for the single </a:t>
+            </a:r>
+            <a:r>
+              <a:rPr lang="el-GR" sz="1600" b="1" i="1" dirty="0">
+                <a:latin typeface="Roboto Mono" pitchFamily="2" charset="0"/>
+                <a:ea typeface="Roboto Mono" pitchFamily="2" charset="0"/>
+              </a:rPr>
+              <a:t>Ω</a:t>
+            </a:r>
+            <a:r>
+              <a:rPr lang="en-GB" sz="1600" b="1" i="1" baseline="-25000" dirty="0">
+                <a:latin typeface="Roboto Mono" pitchFamily="2" charset="0"/>
+                <a:ea typeface="Roboto Mono" pitchFamily="2" charset="0"/>
+              </a:rPr>
+              <a:t>Λ</a:t>
+            </a:r>
+            <a:r>
+              <a:rPr lang="en-GB" sz="1600" dirty="0">
+                <a:latin typeface="Roboto Mono" pitchFamily="2" charset="0"/>
+                <a:ea typeface="Roboto Mono" pitchFamily="2" charset="0"/>
+              </a:rPr>
+              <a:t> model and obtained </a:t>
+            </a:r>
+            <a:r>
+              <a:rPr lang="en-GB" sz="1600" b="1" dirty="0">
+                <a:latin typeface="Roboto Mono" pitchFamily="2" charset="0"/>
+                <a:ea typeface="Roboto Mono" pitchFamily="2" charset="0"/>
+              </a:rPr>
+              <a:t>0.720±0.008</a:t>
+            </a:r>
+            <a:r>
+              <a:rPr lang="en-GB" sz="1600" dirty="0">
+                <a:latin typeface="Roboto Mono" pitchFamily="2" charset="0"/>
+                <a:ea typeface="Roboto Mono" pitchFamily="2" charset="0"/>
+              </a:rPr>
+              <a:t>. In Figure 2 we see the multiple spaces attempted until it settled.</a:t>
+            </a:r>
+            <a:endParaRPr lang="en-GB" sz="1600" b="1" i="1" dirty="0">
+              <a:latin typeface="Roboto Mono" pitchFamily="2" charset="0"/>
+              <a:ea typeface="Roboto Mono" pitchFamily="2" charset="0"/>
+            </a:endParaRPr>
+          </a:p>
+        </p:txBody>
+      </p:sp>
+      <p:sp>
+        <p:nvSpPr>
+          <p:cNvPr id="121" name="TextBox 120">
+            <a:extLst>
+              <a:ext uri="{FF2B5EF4-FFF2-40B4-BE49-F238E27FC236}">
+                <a16:creationId xmlns:a16="http://schemas.microsoft.com/office/drawing/2014/main" id="{6D84420C-6EF2-134B-A225-86434479CA4E}"/>
+              </a:ext>
+            </a:extLst>
+          </p:cNvPr>
+          <p:cNvSpPr txBox="1"/>
+          <p:nvPr/>
+        </p:nvSpPr>
+        <p:spPr>
+          <a:xfrm>
+            <a:off x="300411" y="10188980"/>
+            <a:ext cx="3852019" cy="523220"/>
+          </a:xfrm>
+          <a:prstGeom prst="rect">
+            <a:avLst/>
+          </a:prstGeom>
+          <a:noFill/>
+        </p:spPr>
+        <p:txBody>
+          <a:bodyPr wrap="square" rtlCol="0">
+            <a:spAutoFit/>
+          </a:bodyPr>
+          <a:lstStyle/>
+          <a:p>
+            <a:r>
+              <a:rPr lang="en-GB" sz="2800" b="1" i="1" dirty="0">
+                <a:solidFill>
+                  <a:srgbClr val="757575"/>
+                </a:solidFill>
+                <a:latin typeface="Roboto Mono" pitchFamily="2" charset="0"/>
+                <a:ea typeface="Roboto Mono" pitchFamily="2" charset="0"/>
+              </a:rPr>
+              <a:t>Bigger Data Set</a:t>
+            </a:r>
+          </a:p>
+        </p:txBody>
+      </p:sp>
+      <p:sp>
+        <p:nvSpPr>
+          <p:cNvPr id="122" name="TextBox 121">
+            <a:extLst>
+              <a:ext uri="{FF2B5EF4-FFF2-40B4-BE49-F238E27FC236}">
+                <a16:creationId xmlns:a16="http://schemas.microsoft.com/office/drawing/2014/main" id="{514A7960-F24D-1342-851F-8268BE883F02}"/>
+              </a:ext>
+            </a:extLst>
+          </p:cNvPr>
+          <p:cNvSpPr txBox="1"/>
+          <p:nvPr/>
+        </p:nvSpPr>
+        <p:spPr>
+          <a:xfrm>
+            <a:off x="5133106" y="10185351"/>
+            <a:ext cx="4565923" cy="523220"/>
+          </a:xfrm>
+          <a:prstGeom prst="rect">
+            <a:avLst/>
+          </a:prstGeom>
+          <a:noFill/>
+        </p:spPr>
+        <p:txBody>
+          <a:bodyPr wrap="square" rtlCol="0">
+            <a:spAutoFit/>
+          </a:bodyPr>
+          <a:lstStyle/>
+          <a:p>
+            <a:r>
+              <a:rPr lang="en-GB" sz="2800" b="1" i="1" dirty="0">
+                <a:solidFill>
+                  <a:srgbClr val="757575"/>
+                </a:solidFill>
+                <a:latin typeface="Roboto Mono" pitchFamily="2" charset="0"/>
+                <a:ea typeface="Roboto Mono" pitchFamily="2" charset="0"/>
+              </a:rPr>
+              <a:t>A larger model</a:t>
+            </a:r>
+          </a:p>
+        </p:txBody>
+      </p:sp>
+      <p:sp>
+        <p:nvSpPr>
+          <p:cNvPr id="123" name="TextBox 122">
+            <a:extLst>
+              <a:ext uri="{FF2B5EF4-FFF2-40B4-BE49-F238E27FC236}">
+                <a16:creationId xmlns:a16="http://schemas.microsoft.com/office/drawing/2014/main" id="{EBF97FAA-2D40-2E4C-9F38-191E32C21736}"/>
+              </a:ext>
+            </a:extLst>
+          </p:cNvPr>
+          <p:cNvSpPr txBox="1"/>
+          <p:nvPr/>
+        </p:nvSpPr>
+        <p:spPr>
+          <a:xfrm>
+            <a:off x="5292070" y="10611882"/>
+            <a:ext cx="4738714" cy="830997"/>
+          </a:xfrm>
+          <a:prstGeom prst="rect">
+            <a:avLst/>
+          </a:prstGeom>
+          <a:noFill/>
+        </p:spPr>
+        <p:txBody>
+          <a:bodyPr wrap="square" rtlCol="0">
+            <a:spAutoFit/>
+          </a:bodyPr>
+          <a:lstStyle/>
+          <a:p>
+            <a:r>
+              <a:rPr lang="en-GB" sz="1600" dirty="0">
+                <a:latin typeface="Roboto Mono" pitchFamily="2" charset="0"/>
+                <a:ea typeface="Roboto Mono" pitchFamily="2" charset="0"/>
+              </a:rPr>
+              <a:t>We chose to implement the full </a:t>
+            </a:r>
+            <a:r>
+              <a:rPr lang="en-GB" sz="1600" dirty="0">
+                <a:latin typeface="Roboto Mono Medium" pitchFamily="2" charset="0"/>
+                <a:ea typeface="Roboto Mono Medium" pitchFamily="2" charset="0"/>
+              </a:rPr>
+              <a:t>Lambda Cold Dark Matter </a:t>
+            </a:r>
+            <a:r>
+              <a:rPr lang="en-GB" sz="1600" dirty="0">
+                <a:latin typeface="Roboto Mono" pitchFamily="2" charset="0"/>
+                <a:ea typeface="Roboto Mono" pitchFamily="2" charset="0"/>
+              </a:rPr>
+              <a:t>model (</a:t>
+            </a:r>
+            <a:r>
+              <a:rPr lang="el-GR" sz="1600" dirty="0">
+                <a:latin typeface="Roboto Mono" pitchFamily="2" charset="0"/>
+                <a:ea typeface="Roboto Mono" pitchFamily="2" charset="0"/>
+              </a:rPr>
+              <a:t>Λ</a:t>
+            </a:r>
+            <a:r>
+              <a:rPr lang="en-GB" sz="1600" dirty="0">
+                <a:latin typeface="Roboto Mono" pitchFamily="2" charset="0"/>
+                <a:ea typeface="Roboto Mono" pitchFamily="2" charset="0"/>
+              </a:rPr>
+              <a:t>CDM). With this, the Hubble Parameter became, </a:t>
+            </a:r>
+          </a:p>
+        </p:txBody>
+      </p:sp>
+      <p:sp>
+        <p:nvSpPr>
+          <p:cNvPr id="124" name="TextBox 123">
+            <a:extLst>
+              <a:ext uri="{FF2B5EF4-FFF2-40B4-BE49-F238E27FC236}">
+                <a16:creationId xmlns:a16="http://schemas.microsoft.com/office/drawing/2014/main" id="{7BA4602C-82B9-0E48-992B-4C96F870E3D3}"/>
+              </a:ext>
+            </a:extLst>
+          </p:cNvPr>
+          <p:cNvSpPr txBox="1"/>
+          <p:nvPr/>
+        </p:nvSpPr>
+        <p:spPr>
+          <a:xfrm>
+            <a:off x="7573108" y="17759942"/>
+            <a:ext cx="6012482" cy="461665"/>
+          </a:xfrm>
+          <a:prstGeom prst="rect">
+            <a:avLst/>
+          </a:prstGeom>
+          <a:noFill/>
+        </p:spPr>
+        <p:txBody>
+          <a:bodyPr wrap="square" rtlCol="0">
+            <a:spAutoFit/>
+          </a:bodyPr>
+          <a:lstStyle/>
+          <a:p>
+            <a:r>
+              <a:rPr lang="en-GB" sz="2400" dirty="0">
+                <a:solidFill>
+                  <a:srgbClr val="202020"/>
+                </a:solidFill>
+                <a:latin typeface="Roboto Mono Medium" pitchFamily="2" charset="0"/>
+                <a:ea typeface="Roboto Mono Medium" pitchFamily="2" charset="0"/>
+              </a:rPr>
+              <a:t>ΛCDM Results</a:t>
+            </a:r>
+          </a:p>
+        </p:txBody>
+      </p:sp>
+      <p:sp>
+        <p:nvSpPr>
+          <p:cNvPr id="125" name="TextBox 124">
+            <a:extLst>
+              <a:ext uri="{FF2B5EF4-FFF2-40B4-BE49-F238E27FC236}">
+                <a16:creationId xmlns:a16="http://schemas.microsoft.com/office/drawing/2014/main" id="{376265A0-DDB2-5842-85C6-C5F01DB61556}"/>
+              </a:ext>
+            </a:extLst>
+          </p:cNvPr>
+          <p:cNvSpPr txBox="1"/>
+          <p:nvPr/>
+        </p:nvSpPr>
+        <p:spPr>
+          <a:xfrm>
+            <a:off x="5676284" y="11728787"/>
+            <a:ext cx="4441238" cy="369332"/>
+          </a:xfrm>
+          <a:prstGeom prst="rect">
+            <a:avLst/>
+          </a:prstGeom>
+          <a:noFill/>
+        </p:spPr>
+        <p:txBody>
+          <a:bodyPr wrap="square" rtlCol="0">
+            <a:spAutoFit/>
+          </a:bodyPr>
+          <a:lstStyle/>
+          <a:p>
+            <a:pPr algn="ctr"/>
+            <a:r>
+              <a:rPr lang="en-GB" sz="1800" i="1" dirty="0">
+                <a:latin typeface="Roboto Mono Medium" pitchFamily="2" charset="0"/>
+                <a:ea typeface="Roboto Mono Medium" pitchFamily="2" charset="0"/>
+              </a:rPr>
+              <a:t>+(1+z)</a:t>
+            </a:r>
+            <a:r>
+              <a:rPr lang="en-GB" sz="1800" i="1" baseline="30000" dirty="0">
+                <a:latin typeface="Roboto Mono Medium" pitchFamily="2" charset="0"/>
+                <a:ea typeface="Roboto Mono Medium" pitchFamily="2" charset="0"/>
+              </a:rPr>
+              <a:t>4</a:t>
+            </a:r>
+            <a:r>
+              <a:rPr lang="el-GR" sz="1800" i="1" dirty="0">
+                <a:latin typeface="Roboto Mono Medium" pitchFamily="2" charset="0"/>
+                <a:ea typeface="Roboto Mono Medium" pitchFamily="2" charset="0"/>
+              </a:rPr>
+              <a:t>Ω</a:t>
+            </a:r>
+            <a:r>
+              <a:rPr lang="en-GB" sz="1800" i="1" baseline="-25000" dirty="0">
+                <a:latin typeface="Roboto Mono Medium" pitchFamily="2" charset="0"/>
+                <a:ea typeface="Roboto Mono Medium" pitchFamily="2" charset="0"/>
+              </a:rPr>
+              <a:t>r</a:t>
+            </a:r>
+            <a:r>
+              <a:rPr lang="en-GB" sz="1800" i="1" dirty="0">
+                <a:latin typeface="Roboto Mono Medium" pitchFamily="2" charset="0"/>
+                <a:ea typeface="Roboto Mono Medium" pitchFamily="2" charset="0"/>
+              </a:rPr>
+              <a:t>)]</a:t>
+            </a:r>
+            <a:r>
+              <a:rPr lang="en-GB" sz="1800" i="1" baseline="30000" dirty="0">
+                <a:latin typeface="Roboto Mono Medium" pitchFamily="2" charset="0"/>
+                <a:ea typeface="Roboto Mono Medium" pitchFamily="2" charset="0"/>
+              </a:rPr>
+              <a:t>1/2</a:t>
+            </a:r>
+            <a:r>
+              <a:rPr lang="en-GB" sz="1800" i="1" dirty="0">
+                <a:latin typeface="Roboto Mono Medium" pitchFamily="2" charset="0"/>
+                <a:ea typeface="Roboto Mono Medium" pitchFamily="2" charset="0"/>
+              </a:rPr>
+              <a:t>,</a:t>
+            </a:r>
+          </a:p>
+        </p:txBody>
+      </p:sp>
+      <p:sp>
+        <p:nvSpPr>
+          <p:cNvPr id="126" name="TextBox 125">
+            <a:extLst>
+              <a:ext uri="{FF2B5EF4-FFF2-40B4-BE49-F238E27FC236}">
+                <a16:creationId xmlns:a16="http://schemas.microsoft.com/office/drawing/2014/main" id="{48956290-973C-C843-91B5-F407E301F2DB}"/>
+              </a:ext>
+            </a:extLst>
+          </p:cNvPr>
+          <p:cNvSpPr txBox="1"/>
+          <p:nvPr/>
+        </p:nvSpPr>
+        <p:spPr>
+          <a:xfrm>
+            <a:off x="5209721" y="12080792"/>
+            <a:ext cx="4770573" cy="3293209"/>
+          </a:xfrm>
+          <a:prstGeom prst="rect">
+            <a:avLst/>
+          </a:prstGeom>
+          <a:noFill/>
+        </p:spPr>
+        <p:txBody>
+          <a:bodyPr wrap="square" rtlCol="0">
+            <a:spAutoFit/>
+          </a:bodyPr>
+          <a:lstStyle/>
+          <a:p>
+            <a:r>
+              <a:rPr lang="en-GB" sz="1600" dirty="0">
+                <a:latin typeface="Roboto Mono" pitchFamily="2" charset="0"/>
+                <a:ea typeface="Roboto Mono" pitchFamily="2" charset="0"/>
+              </a:rPr>
+              <a:t>where </a:t>
+            </a:r>
+            <a:r>
+              <a:rPr lang="en-GB" sz="1600" b="1" i="1" dirty="0">
+                <a:latin typeface="Roboto Mono" pitchFamily="2" charset="0"/>
+                <a:ea typeface="Roboto Mono" pitchFamily="2" charset="0"/>
+              </a:rPr>
+              <a:t>X(z) </a:t>
+            </a:r>
+            <a:r>
+              <a:rPr lang="en-GB" sz="1600" dirty="0">
+                <a:latin typeface="Roboto Mono" pitchFamily="2" charset="0"/>
+                <a:ea typeface="Roboto Mono" pitchFamily="2" charset="0"/>
+              </a:rPr>
+              <a:t>is the dark energy density, </a:t>
+            </a:r>
+            <a:r>
+              <a:rPr lang="el-GR" sz="1600" i="1" dirty="0">
+                <a:latin typeface="Roboto Mono Medium" pitchFamily="2" charset="0"/>
+                <a:ea typeface="Roboto Mono Medium" pitchFamily="2" charset="0"/>
+              </a:rPr>
+              <a:t>Ω</a:t>
+            </a:r>
+            <a:r>
+              <a:rPr lang="en-GB" sz="1600" i="1" baseline="-25000" dirty="0">
+                <a:latin typeface="Roboto Mono Medium" pitchFamily="2" charset="0"/>
+                <a:ea typeface="Roboto Mono Medium" pitchFamily="2" charset="0"/>
+              </a:rPr>
+              <a:t>k</a:t>
+            </a:r>
+            <a:r>
+              <a:rPr lang="en-GB" sz="1600" dirty="0">
+                <a:latin typeface="Roboto Mono Medium" pitchFamily="2" charset="0"/>
+                <a:ea typeface="Roboto Mono Medium" pitchFamily="2" charset="0"/>
+              </a:rPr>
+              <a:t> </a:t>
+            </a:r>
+            <a:r>
+              <a:rPr lang="en-GB" sz="1600" dirty="0">
+                <a:latin typeface="Roboto Mono" pitchFamily="2" charset="0"/>
+                <a:ea typeface="Roboto Mono" pitchFamily="2" charset="0"/>
+              </a:rPr>
+              <a:t>the spatial curvature,</a:t>
+            </a:r>
+            <a:r>
+              <a:rPr lang="el-GR" sz="1600" i="1" dirty="0">
+                <a:latin typeface="Roboto Mono Medium" pitchFamily="2" charset="0"/>
+                <a:ea typeface="Roboto Mono Medium" pitchFamily="2" charset="0"/>
+              </a:rPr>
+              <a:t> Ω</a:t>
+            </a:r>
+            <a:r>
+              <a:rPr lang="en-GB" sz="1600" i="1" baseline="-25000" dirty="0">
+                <a:latin typeface="Roboto Mono Medium" pitchFamily="2" charset="0"/>
+                <a:ea typeface="Roboto Mono Medium" pitchFamily="2" charset="0"/>
+              </a:rPr>
+              <a:t>m</a:t>
+            </a:r>
+            <a:r>
+              <a:rPr lang="en-GB" sz="1600" dirty="0">
+                <a:latin typeface="Roboto Mono" pitchFamily="2" charset="0"/>
+                <a:ea typeface="Roboto Mono" pitchFamily="2" charset="0"/>
+              </a:rPr>
+              <a:t> the matter density, and </a:t>
+            </a:r>
+            <a:r>
+              <a:rPr lang="el-GR" sz="1600" i="1" dirty="0">
+                <a:latin typeface="Roboto Mono Medium" pitchFamily="2" charset="0"/>
+                <a:ea typeface="Roboto Mono Medium" pitchFamily="2" charset="0"/>
+              </a:rPr>
+              <a:t>Ω</a:t>
+            </a:r>
+            <a:r>
+              <a:rPr lang="en-GB" sz="1600" i="1" baseline="-25000" dirty="0">
+                <a:latin typeface="Roboto Mono Medium" pitchFamily="2" charset="0"/>
+                <a:ea typeface="Roboto Mono Medium" pitchFamily="2" charset="0"/>
+              </a:rPr>
+              <a:t>r </a:t>
+            </a:r>
+            <a:r>
+              <a:rPr lang="en-GB" sz="1600" dirty="0">
+                <a:latin typeface="Roboto Mono" pitchFamily="2" charset="0"/>
+                <a:ea typeface="Roboto Mono" pitchFamily="2" charset="0"/>
+              </a:rPr>
+              <a:t>as the radiation from photons and neutrinos.</a:t>
+            </a:r>
+          </a:p>
+          <a:p>
+            <a:endParaRPr lang="en-GB" sz="1200" dirty="0">
+              <a:latin typeface="Roboto Mono" pitchFamily="2" charset="0"/>
+              <a:ea typeface="Roboto Mono" pitchFamily="2" charset="0"/>
+            </a:endParaRPr>
+          </a:p>
+          <a:p>
+            <a:r>
+              <a:rPr lang="en-GB" sz="1600" dirty="0">
+                <a:latin typeface="Roboto Mono" pitchFamily="2" charset="0"/>
+                <a:ea typeface="Roboto Mono" pitchFamily="2" charset="0"/>
+              </a:rPr>
+              <a:t>In Table I we provide the results that we achieved if </a:t>
+            </a:r>
+            <a:r>
+              <a:rPr lang="en-GB" sz="1600" b="1" i="1" dirty="0">
+                <a:latin typeface="Roboto Mono" pitchFamily="2" charset="0"/>
+                <a:ea typeface="Roboto Mono" pitchFamily="2" charset="0"/>
+              </a:rPr>
+              <a:t>X(z) </a:t>
+            </a:r>
+            <a:r>
+              <a:rPr lang="en-GB" sz="1600" dirty="0">
+                <a:latin typeface="Roboto Mono" pitchFamily="2" charset="0"/>
+                <a:ea typeface="Roboto Mono" pitchFamily="2" charset="0"/>
+              </a:rPr>
+              <a:t>is set to one. We see that they are in strong agreement with literature values.</a:t>
+            </a:r>
+          </a:p>
+          <a:p>
+            <a:endParaRPr lang="en-GB" sz="1600" dirty="0">
+              <a:latin typeface="Roboto Mono" pitchFamily="2" charset="0"/>
+              <a:ea typeface="Roboto Mono" pitchFamily="2" charset="0"/>
+            </a:endParaRPr>
+          </a:p>
+          <a:p>
+            <a:endParaRPr lang="en-GB" sz="1600" dirty="0">
+              <a:latin typeface="Roboto Mono" pitchFamily="2" charset="0"/>
+              <a:ea typeface="Roboto Mono" pitchFamily="2" charset="0"/>
+            </a:endParaRPr>
+          </a:p>
+          <a:p>
+            <a:endParaRPr lang="en-GB" sz="1600" b="1" i="1" dirty="0">
+              <a:latin typeface="Roboto Mono" pitchFamily="2" charset="0"/>
+              <a:ea typeface="Roboto Mono" pitchFamily="2" charset="0"/>
+            </a:endParaRPr>
+          </a:p>
+          <a:p>
+            <a:endParaRPr lang="en-GB" sz="1600" b="1" i="1" dirty="0">
+              <a:latin typeface="Roboto Mono" pitchFamily="2" charset="0"/>
+              <a:ea typeface="Roboto Mono" pitchFamily="2" charset="0"/>
+            </a:endParaRPr>
+          </a:p>
+        </p:txBody>
+      </p:sp>
+      <p:sp>
+        <p:nvSpPr>
+          <p:cNvPr id="127" name="TextBox 126">
+            <a:extLst>
+              <a:ext uri="{FF2B5EF4-FFF2-40B4-BE49-F238E27FC236}">
+                <a16:creationId xmlns:a16="http://schemas.microsoft.com/office/drawing/2014/main" id="{7C19B27A-0103-FC4A-8D6E-4BAAD368AA95}"/>
+              </a:ext>
+            </a:extLst>
+          </p:cNvPr>
+          <p:cNvSpPr txBox="1"/>
+          <p:nvPr/>
+        </p:nvSpPr>
+        <p:spPr>
+          <a:xfrm>
+            <a:off x="5072232" y="14275080"/>
+            <a:ext cx="4565923" cy="523220"/>
+          </a:xfrm>
+          <a:prstGeom prst="rect">
+            <a:avLst/>
+          </a:prstGeom>
+          <a:noFill/>
+        </p:spPr>
+        <p:txBody>
+          <a:bodyPr wrap="square" rtlCol="0">
+            <a:spAutoFit/>
+          </a:bodyPr>
+          <a:lstStyle/>
+          <a:p>
+            <a:r>
+              <a:rPr lang="en-GB" sz="2800" b="1" i="1" dirty="0">
+                <a:solidFill>
+                  <a:srgbClr val="757575"/>
+                </a:solidFill>
+                <a:latin typeface="Roboto Mono" pitchFamily="2" charset="0"/>
+                <a:ea typeface="Roboto Mono" pitchFamily="2" charset="0"/>
+              </a:rPr>
+              <a:t>An extra parameter</a:t>
+            </a:r>
+          </a:p>
+        </p:txBody>
+      </p:sp>
+      <p:sp>
+        <p:nvSpPr>
+          <p:cNvPr id="128" name="TextBox 127">
+            <a:extLst>
+              <a:ext uri="{FF2B5EF4-FFF2-40B4-BE49-F238E27FC236}">
+                <a16:creationId xmlns:a16="http://schemas.microsoft.com/office/drawing/2014/main" id="{CFEDAAB9-C904-134C-A70E-2DED0B59AF37}"/>
+              </a:ext>
+            </a:extLst>
+          </p:cNvPr>
+          <p:cNvSpPr txBox="1"/>
+          <p:nvPr/>
+        </p:nvSpPr>
+        <p:spPr>
+          <a:xfrm>
+            <a:off x="5279385" y="14756460"/>
+            <a:ext cx="4770573" cy="2800767"/>
+          </a:xfrm>
+          <a:prstGeom prst="rect">
+            <a:avLst/>
+          </a:prstGeom>
+          <a:noFill/>
+        </p:spPr>
+        <p:txBody>
+          <a:bodyPr wrap="square" rtlCol="0">
+            <a:spAutoFit/>
+          </a:bodyPr>
+          <a:lstStyle/>
+          <a:p>
+            <a:r>
+              <a:rPr lang="en-GB" sz="1600" dirty="0">
+                <a:latin typeface="Roboto Mono" pitchFamily="2" charset="0"/>
+                <a:ea typeface="Roboto Mono" pitchFamily="2" charset="0"/>
+              </a:rPr>
+              <a:t>To build on using ΛCDM, our future research would involve setting </a:t>
+            </a:r>
+            <a:r>
+              <a:rPr lang="en-GB" sz="1600" b="1" i="1" dirty="0">
+                <a:latin typeface="Roboto Mono" pitchFamily="2" charset="0"/>
+                <a:ea typeface="Roboto Mono" pitchFamily="2" charset="0"/>
+              </a:rPr>
+              <a:t>X(z)</a:t>
+            </a:r>
+            <a:r>
+              <a:rPr lang="en-GB" sz="1600" dirty="0">
+                <a:latin typeface="Roboto Mono" pitchFamily="2" charset="0"/>
+                <a:ea typeface="Roboto Mono" pitchFamily="2" charset="0"/>
+              </a:rPr>
+              <a:t> equal to </a:t>
+            </a:r>
+            <a:r>
+              <a:rPr lang="en-GB" sz="1600" b="1" i="1" dirty="0">
+                <a:latin typeface="Roboto Mono" pitchFamily="2" charset="0"/>
+                <a:ea typeface="Roboto Mono" pitchFamily="2" charset="0"/>
+              </a:rPr>
+              <a:t>(1+z)</a:t>
+            </a:r>
+            <a:r>
+              <a:rPr lang="en-GB" sz="1600" b="1" i="1" baseline="30000" dirty="0">
+                <a:latin typeface="Roboto Mono" pitchFamily="2" charset="0"/>
+                <a:ea typeface="Roboto Mono" pitchFamily="2" charset="0"/>
+              </a:rPr>
+              <a:t>3(1+</a:t>
+            </a:r>
+            <a:r>
+              <a:rPr lang="el-GR" sz="1600" b="1" i="1" baseline="30000" dirty="0">
+                <a:latin typeface="Roboto Mono" pitchFamily="2" charset="0"/>
+                <a:ea typeface="Roboto Mono" pitchFamily="2" charset="0"/>
+              </a:rPr>
+              <a:t>ω</a:t>
+            </a:r>
+            <a:r>
+              <a:rPr lang="en-GB" sz="1600" b="1" i="1" baseline="30000" dirty="0">
+                <a:latin typeface="Roboto Mono" pitchFamily="2" charset="0"/>
+                <a:ea typeface="Roboto Mono" pitchFamily="2" charset="0"/>
+              </a:rPr>
+              <a:t>)</a:t>
+            </a:r>
+            <a:r>
+              <a:rPr lang="en-GB" sz="1600" dirty="0">
+                <a:latin typeface="Roboto Mono" pitchFamily="2" charset="0"/>
+                <a:ea typeface="Roboto Mono" pitchFamily="2" charset="0"/>
+              </a:rPr>
+              <a:t>, where </a:t>
+            </a:r>
+            <a:r>
+              <a:rPr lang="el-GR" sz="1600" b="1" i="1" dirty="0">
+                <a:latin typeface="Roboto Mono" pitchFamily="2" charset="0"/>
+                <a:ea typeface="Roboto Mono" pitchFamily="2" charset="0"/>
+              </a:rPr>
+              <a:t>ω</a:t>
+            </a:r>
+            <a:r>
+              <a:rPr lang="en-GB" sz="1600" dirty="0">
+                <a:latin typeface="Roboto Mono" pitchFamily="2" charset="0"/>
+                <a:ea typeface="Roboto Mono" pitchFamily="2" charset="0"/>
+              </a:rPr>
+              <a:t> is the dark energy equation of state. This would incorporate </a:t>
+            </a:r>
+            <a:r>
+              <a:rPr lang="en-GB" sz="1600" dirty="0">
+                <a:latin typeface="Roboto Mono Medium" pitchFamily="2" charset="0"/>
+                <a:ea typeface="Roboto Mono Medium" pitchFamily="2" charset="0"/>
+              </a:rPr>
+              <a:t>quintessence</a:t>
+            </a:r>
+            <a:r>
+              <a:rPr lang="en-GB" sz="1600" dirty="0">
+                <a:latin typeface="Roboto Mono" pitchFamily="2" charset="0"/>
+                <a:ea typeface="Roboto Mono" pitchFamily="2" charset="0"/>
+              </a:rPr>
+              <a:t> into our model and allow us to constrain even more parameters together. But, we must be aware that there may be a large correlation between some parameters this would definitely need to be corrected for.</a:t>
+            </a:r>
           </a:p>
         </p:txBody>
       </p:sp>

</xml_diff>

<commit_message>
pps: so much work has been done
</commit_message>
<xml_diff>
--- a/physics_problem_solving/poster/supernova_poster.pptx
+++ b/physics_problem_solving/poster/supernova_poster.pptx
@@ -3698,7 +3698,7 @@
         <p:spPr>
           <a:xfrm>
             <a:off x="-187569" y="9708641"/>
-            <a:ext cx="15521354" cy="7905751"/>
+            <a:ext cx="15521354" cy="8051301"/>
           </a:xfrm>
           <a:prstGeom prst="rect">
             <a:avLst/>
@@ -5620,7 +5620,7 @@
         </p:nvSpPr>
         <p:spPr>
           <a:xfrm>
-            <a:off x="489097" y="17759943"/>
+            <a:off x="489097" y="17866268"/>
             <a:ext cx="2101703" cy="461665"/>
           </a:xfrm>
           <a:prstGeom prst="rect">
@@ -6435,7 +6435,7 @@
         </p:nvSpPr>
         <p:spPr>
           <a:xfrm>
-            <a:off x="651052" y="18185080"/>
+            <a:off x="651052" y="18270140"/>
             <a:ext cx="6357420" cy="3816429"/>
           </a:xfrm>
           <a:prstGeom prst="rect">
@@ -6591,7 +6591,7 @@
         </p:nvSpPr>
         <p:spPr>
           <a:xfrm>
-            <a:off x="279146" y="13230208"/>
+            <a:off x="279146" y="13336533"/>
             <a:ext cx="3024333" cy="492443"/>
           </a:xfrm>
           <a:prstGeom prst="rect">
@@ -6832,10 +6832,10 @@
       </p:sp>
       <p:sp>
         <p:nvSpPr>
-          <p:cNvPr id="96" name="Rectangle 95">
+          <p:cNvPr id="138" name="Oval 137">
             <a:extLst>
               <a:ext uri="{FF2B5EF4-FFF2-40B4-BE49-F238E27FC236}">
-                <a16:creationId xmlns:a16="http://schemas.microsoft.com/office/drawing/2014/main" id="{C74941D4-145C-894B-B39F-B8AE1A547C70}"/>
+                <a16:creationId xmlns:a16="http://schemas.microsoft.com/office/drawing/2014/main" id="{99710B73-1754-0E4F-BD89-F7B7C11D44F6}"/>
               </a:ext>
             </a:extLst>
           </p:cNvPr>
@@ -6844,105 +6844,17 @@
         </p:nvSpPr>
         <p:spPr>
           <a:xfrm>
-            <a:off x="10208451" y="10371752"/>
-            <a:ext cx="4535426" cy="6527849"/>
+            <a:off x="13393122" y="14707227"/>
+            <a:ext cx="2540216" cy="2540216"/>
           </a:xfrm>
-          <a:prstGeom prst="rect">
+          <a:prstGeom prst="ellipse">
             <a:avLst/>
           </a:prstGeom>
-          <a:solidFill>
-            <a:schemeClr val="bg1"/>
-          </a:solidFill>
-          <a:ln>
-            <a:noFill/>
-          </a:ln>
-          <a:effectLst>
-            <a:outerShdw blurRad="190500" dist="38100" dir="5400000" sx="99000" sy="99000" algn="ctr" rotWithShape="0">
-              <a:prstClr val="black">
-                <a:alpha val="40000"/>
-              </a:prstClr>
-            </a:outerShdw>
-          </a:effectLst>
-        </p:spPr>
-        <p:style>
-          <a:lnRef idx="2">
-            <a:schemeClr val="accent1">
-              <a:shade val="50000"/>
-            </a:schemeClr>
-          </a:lnRef>
-          <a:fillRef idx="1">
-            <a:schemeClr val="accent1"/>
-          </a:fillRef>
-          <a:effectRef idx="0">
-            <a:schemeClr val="accent1"/>
-          </a:effectRef>
-          <a:fontRef idx="minor">
-            <a:schemeClr val="lt1"/>
-          </a:fontRef>
-        </p:style>
-        <p:txBody>
-          <a:bodyPr rtlCol="0" anchor="ctr"/>
-          <a:lstStyle/>
-          <a:p>
-            <a:pPr algn="ctr"/>
-            <a:endParaRPr lang="en-GB" dirty="0"/>
-          </a:p>
-        </p:txBody>
-      </p:sp>
-      <p:pic>
-        <p:nvPicPr>
-          <p:cNvPr id="98" name="Picture 97">
-            <a:extLst>
-              <a:ext uri="{FF2B5EF4-FFF2-40B4-BE49-F238E27FC236}">
-                <a16:creationId xmlns:a16="http://schemas.microsoft.com/office/drawing/2014/main" id="{EC8299F9-4CC3-ED45-AD09-AA7549A5B29A}"/>
-              </a:ext>
-            </a:extLst>
-          </p:cNvPr>
-          <p:cNvPicPr>
-            <a:picLocks noChangeAspect="1"/>
-          </p:cNvPicPr>
-          <p:nvPr/>
-        </p:nvPicPr>
-        <p:blipFill rotWithShape="1">
-          <a:blip r:embed="rId6"/>
-          <a:srcRect l="6719" t="11882" r="8081"/>
-          <a:stretch/>
-        </p:blipFill>
-        <p:spPr>
-          <a:xfrm>
-            <a:off x="10518256" y="10467523"/>
-            <a:ext cx="4197969" cy="3265782"/>
-          </a:xfrm>
-          <a:prstGeom prst="rect">
-            <a:avLst/>
-          </a:prstGeom>
-        </p:spPr>
-      </p:pic>
-      <p:sp>
-        <p:nvSpPr>
-          <p:cNvPr id="99" name="Rectangle 98">
-            <a:extLst>
-              <a:ext uri="{FF2B5EF4-FFF2-40B4-BE49-F238E27FC236}">
-                <a16:creationId xmlns:a16="http://schemas.microsoft.com/office/drawing/2014/main" id="{0F3A41AE-ADF5-8149-B6D3-70AB951FE57B}"/>
-              </a:ext>
-            </a:extLst>
-          </p:cNvPr>
-          <p:cNvSpPr/>
-          <p:nvPr/>
-        </p:nvSpPr>
-        <p:spPr>
-          <a:xfrm>
-            <a:off x="10535678" y="10456889"/>
-            <a:ext cx="210001" cy="2959111"/>
-          </a:xfrm>
-          <a:prstGeom prst="rect">
-            <a:avLst/>
-          </a:prstGeom>
-          <a:solidFill>
-            <a:schemeClr val="bg1"/>
-          </a:solidFill>
-          <a:ln>
-            <a:noFill/>
+          <a:noFill/>
+          <a:ln w="63500">
+            <a:solidFill>
+              <a:srgbClr val="FFC108"/>
+            </a:solidFill>
           </a:ln>
         </p:spPr>
         <p:style>
@@ -6972,306 +6884,31 @@
       </p:sp>
       <p:sp>
         <p:nvSpPr>
-          <p:cNvPr id="97" name="TextBox 96">
+          <p:cNvPr id="139" name="Rectangle 138">
             <a:extLst>
               <a:ext uri="{FF2B5EF4-FFF2-40B4-BE49-F238E27FC236}">
-                <a16:creationId xmlns:a16="http://schemas.microsoft.com/office/drawing/2014/main" id="{CF890B9D-43FF-9249-897F-8F7D8B5034EB}"/>
+                <a16:creationId xmlns:a16="http://schemas.microsoft.com/office/drawing/2014/main" id="{67603B26-CF31-B24A-A129-360E0FDF7C27}"/>
               </a:ext>
             </a:extLst>
           </p:cNvPr>
-          <p:cNvSpPr txBox="1"/>
+          <p:cNvSpPr/>
           <p:nvPr/>
         </p:nvSpPr>
         <p:spPr>
-          <a:xfrm>
-            <a:off x="10318224" y="13045908"/>
-            <a:ext cx="506870" cy="307777"/>
+          <a:xfrm rot="19813861">
+            <a:off x="13493008" y="16315859"/>
+            <a:ext cx="1030487" cy="1030487"/>
           </a:xfrm>
           <a:prstGeom prst="rect">
             <a:avLst/>
           </a:prstGeom>
           <a:noFill/>
-        </p:spPr>
-        <p:txBody>
-          <a:bodyPr wrap="none" rtlCol="0">
-            <a:spAutoFit/>
-          </a:bodyPr>
-          <a:lstStyle/>
-          <a:p>
-            <a:r>
-              <a:rPr lang="en-GB" sz="1400" dirty="0">
-                <a:latin typeface="Roboto Mono" pitchFamily="2" charset="0"/>
-                <a:ea typeface="Roboto Mono" pitchFamily="2" charset="0"/>
-              </a:rPr>
-              <a:t>0.0</a:t>
-            </a:r>
-          </a:p>
-        </p:txBody>
-      </p:sp>
-      <p:sp>
-        <p:nvSpPr>
-          <p:cNvPr id="100" name="TextBox 99">
-            <a:extLst>
-              <a:ext uri="{FF2B5EF4-FFF2-40B4-BE49-F238E27FC236}">
-                <a16:creationId xmlns:a16="http://schemas.microsoft.com/office/drawing/2014/main" id="{3D5B9817-CBDF-784B-B4FD-3BD7A7435965}"/>
-              </a:ext>
-            </a:extLst>
-          </p:cNvPr>
-          <p:cNvSpPr txBox="1"/>
-          <p:nvPr/>
-        </p:nvSpPr>
-        <p:spPr>
-          <a:xfrm>
-            <a:off x="10318224" y="12614941"/>
-            <a:ext cx="506870" cy="307777"/>
-          </a:xfrm>
-          <a:prstGeom prst="rect">
-            <a:avLst/>
-          </a:prstGeom>
-          <a:noFill/>
-        </p:spPr>
-        <p:txBody>
-          <a:bodyPr wrap="none" rtlCol="0">
-            <a:spAutoFit/>
-          </a:bodyPr>
-          <a:lstStyle/>
-          <a:p>
-            <a:r>
-              <a:rPr lang="en-GB" sz="1400" dirty="0">
-                <a:latin typeface="Roboto Mono" pitchFamily="2" charset="0"/>
-                <a:ea typeface="Roboto Mono" pitchFamily="2" charset="0"/>
-              </a:rPr>
-              <a:t>0.2</a:t>
-            </a:r>
-          </a:p>
-        </p:txBody>
-      </p:sp>
-      <p:sp>
-        <p:nvSpPr>
-          <p:cNvPr id="101" name="TextBox 100">
-            <a:extLst>
-              <a:ext uri="{FF2B5EF4-FFF2-40B4-BE49-F238E27FC236}">
-                <a16:creationId xmlns:a16="http://schemas.microsoft.com/office/drawing/2014/main" id="{C84CBD56-E59C-0B41-8E14-7C094B0C3F9F}"/>
-              </a:ext>
-            </a:extLst>
-          </p:cNvPr>
-          <p:cNvSpPr txBox="1"/>
-          <p:nvPr/>
-        </p:nvSpPr>
-        <p:spPr>
-          <a:xfrm>
-            <a:off x="10318224" y="12164022"/>
-            <a:ext cx="506870" cy="307777"/>
-          </a:xfrm>
-          <a:prstGeom prst="rect">
-            <a:avLst/>
-          </a:prstGeom>
-          <a:noFill/>
-        </p:spPr>
-        <p:txBody>
-          <a:bodyPr wrap="none" rtlCol="0">
-            <a:spAutoFit/>
-          </a:bodyPr>
-          <a:lstStyle/>
-          <a:p>
-            <a:r>
-              <a:rPr lang="en-GB" sz="1400" dirty="0">
-                <a:latin typeface="Roboto Mono" pitchFamily="2" charset="0"/>
-                <a:ea typeface="Roboto Mono" pitchFamily="2" charset="0"/>
-              </a:rPr>
-              <a:t>0.4</a:t>
-            </a:r>
-          </a:p>
-        </p:txBody>
-      </p:sp>
-      <p:sp>
-        <p:nvSpPr>
-          <p:cNvPr id="102" name="TextBox 101">
-            <a:extLst>
-              <a:ext uri="{FF2B5EF4-FFF2-40B4-BE49-F238E27FC236}">
-                <a16:creationId xmlns:a16="http://schemas.microsoft.com/office/drawing/2014/main" id="{2C546B30-26B1-6348-8DA1-ACDA6632BFE5}"/>
-              </a:ext>
-            </a:extLst>
-          </p:cNvPr>
-          <p:cNvSpPr txBox="1"/>
-          <p:nvPr/>
-        </p:nvSpPr>
-        <p:spPr>
-          <a:xfrm>
-            <a:off x="10318224" y="11721815"/>
-            <a:ext cx="506870" cy="307777"/>
-          </a:xfrm>
-          <a:prstGeom prst="rect">
-            <a:avLst/>
-          </a:prstGeom>
-          <a:noFill/>
-        </p:spPr>
-        <p:txBody>
-          <a:bodyPr wrap="none" rtlCol="0">
-            <a:spAutoFit/>
-          </a:bodyPr>
-          <a:lstStyle/>
-          <a:p>
-            <a:r>
-              <a:rPr lang="en-GB" sz="1400" dirty="0">
-                <a:latin typeface="Roboto Mono" pitchFamily="2" charset="0"/>
-                <a:ea typeface="Roboto Mono" pitchFamily="2" charset="0"/>
-              </a:rPr>
-              <a:t>0.6</a:t>
-            </a:r>
-          </a:p>
-        </p:txBody>
-      </p:sp>
-      <p:sp>
-        <p:nvSpPr>
-          <p:cNvPr id="103" name="TextBox 102">
-            <a:extLst>
-              <a:ext uri="{FF2B5EF4-FFF2-40B4-BE49-F238E27FC236}">
-                <a16:creationId xmlns:a16="http://schemas.microsoft.com/office/drawing/2014/main" id="{B0557B46-9D26-8149-A160-4C26B277239B}"/>
-              </a:ext>
-            </a:extLst>
-          </p:cNvPr>
-          <p:cNvSpPr txBox="1"/>
-          <p:nvPr/>
-        </p:nvSpPr>
-        <p:spPr>
-          <a:xfrm>
-            <a:off x="10226211" y="10438838"/>
-            <a:ext cx="389850" cy="338554"/>
-          </a:xfrm>
-          <a:prstGeom prst="rect">
-            <a:avLst/>
-          </a:prstGeom>
-          <a:noFill/>
-        </p:spPr>
-        <p:txBody>
-          <a:bodyPr wrap="none" rtlCol="0">
-            <a:spAutoFit/>
-          </a:bodyPr>
-          <a:lstStyle/>
-          <a:p>
-            <a:r>
-              <a:rPr lang="el-GR" sz="1600" b="1" i="1" dirty="0">
-                <a:latin typeface="Roboto Mono" pitchFamily="2" charset="0"/>
-                <a:ea typeface="Roboto Mono" pitchFamily="2" charset="0"/>
-              </a:rPr>
-              <a:t>Ω</a:t>
-            </a:r>
-            <a:r>
-              <a:rPr lang="en-GB" sz="1600" b="1" i="1" baseline="-25000" dirty="0">
-                <a:latin typeface="Roboto Mono" pitchFamily="2" charset="0"/>
-                <a:ea typeface="Roboto Mono" pitchFamily="2" charset="0"/>
-              </a:rPr>
-              <a:t>Λ</a:t>
-            </a:r>
-            <a:endParaRPr lang="en-GB" sz="1600" b="1" i="1" dirty="0">
-              <a:latin typeface="Roboto Mono" pitchFamily="2" charset="0"/>
-              <a:ea typeface="Roboto Mono" pitchFamily="2" charset="0"/>
-            </a:endParaRPr>
-          </a:p>
-        </p:txBody>
-      </p:sp>
-      <p:sp>
-        <p:nvSpPr>
-          <p:cNvPr id="104" name="TextBox 103">
-            <a:extLst>
-              <a:ext uri="{FF2B5EF4-FFF2-40B4-BE49-F238E27FC236}">
-                <a16:creationId xmlns:a16="http://schemas.microsoft.com/office/drawing/2014/main" id="{609BD436-2FFD-9740-84B8-B4FF7E4CF083}"/>
-              </a:ext>
-            </a:extLst>
-          </p:cNvPr>
-          <p:cNvSpPr txBox="1"/>
-          <p:nvPr/>
-        </p:nvSpPr>
-        <p:spPr>
-          <a:xfrm>
-            <a:off x="10329883" y="11290848"/>
-            <a:ext cx="506870" cy="307777"/>
-          </a:xfrm>
-          <a:prstGeom prst="rect">
-            <a:avLst/>
-          </a:prstGeom>
-          <a:noFill/>
-        </p:spPr>
-        <p:txBody>
-          <a:bodyPr wrap="none" rtlCol="0">
-            <a:spAutoFit/>
-          </a:bodyPr>
-          <a:lstStyle/>
-          <a:p>
-            <a:r>
-              <a:rPr lang="en-GB" sz="1400" dirty="0">
-                <a:latin typeface="Roboto Mono" pitchFamily="2" charset="0"/>
-                <a:ea typeface="Roboto Mono" pitchFamily="2" charset="0"/>
-              </a:rPr>
-              <a:t>0.8</a:t>
-            </a:r>
-          </a:p>
-        </p:txBody>
-      </p:sp>
-      <p:sp>
-        <p:nvSpPr>
-          <p:cNvPr id="105" name="TextBox 104">
-            <a:extLst>
-              <a:ext uri="{FF2B5EF4-FFF2-40B4-BE49-F238E27FC236}">
-                <a16:creationId xmlns:a16="http://schemas.microsoft.com/office/drawing/2014/main" id="{B997BA20-4984-174C-AC0B-FCDCDEC07EDF}"/>
-              </a:ext>
-            </a:extLst>
-          </p:cNvPr>
-          <p:cNvSpPr txBox="1"/>
-          <p:nvPr/>
-        </p:nvSpPr>
-        <p:spPr>
-          <a:xfrm>
-            <a:off x="10318224" y="10835781"/>
-            <a:ext cx="506870" cy="307777"/>
-          </a:xfrm>
-          <a:prstGeom prst="rect">
-            <a:avLst/>
-          </a:prstGeom>
-          <a:noFill/>
-        </p:spPr>
-        <p:txBody>
-          <a:bodyPr wrap="none" rtlCol="0">
-            <a:spAutoFit/>
-          </a:bodyPr>
-          <a:lstStyle/>
-          <a:p>
-            <a:r>
-              <a:rPr lang="en-GB" sz="1400" dirty="0">
-                <a:latin typeface="Roboto Mono" pitchFamily="2" charset="0"/>
-                <a:ea typeface="Roboto Mono" pitchFamily="2" charset="0"/>
-              </a:rPr>
-              <a:t>1.0</a:t>
-            </a:r>
-          </a:p>
-        </p:txBody>
-      </p:sp>
-      <p:sp>
-        <p:nvSpPr>
-          <p:cNvPr id="106" name="Rectangle 105">
-            <a:extLst>
-              <a:ext uri="{FF2B5EF4-FFF2-40B4-BE49-F238E27FC236}">
-                <a16:creationId xmlns:a16="http://schemas.microsoft.com/office/drawing/2014/main" id="{994A3F8F-3067-F149-975F-2BEFEDEF1901}"/>
-              </a:ext>
-            </a:extLst>
-          </p:cNvPr>
-          <p:cNvSpPr/>
-          <p:nvPr/>
-        </p:nvSpPr>
-        <p:spPr>
-          <a:xfrm rot="5400000">
-            <a:off x="12508461" y="11525545"/>
-            <a:ext cx="348661" cy="4066864"/>
-          </a:xfrm>
-          <a:prstGeom prst="rect">
-            <a:avLst/>
-          </a:prstGeom>
-          <a:solidFill>
-            <a:schemeClr val="bg1"/>
-          </a:solidFill>
-          <a:ln>
-            <a:noFill/>
+          <a:ln w="63500">
+            <a:solidFill>
+              <a:srgbClr val="BF360B">
+                <a:alpha val="85000"/>
+              </a:srgbClr>
+            </a:solidFill>
           </a:ln>
         </p:spPr>
         <p:style>
@@ -7299,12 +6936,1047 @@
           </a:p>
         </p:txBody>
       </p:sp>
-      <p:sp>
-        <p:nvSpPr>
-          <p:cNvPr id="107" name="TextBox 106">
+      <p:grpSp>
+        <p:nvGrpSpPr>
+          <p:cNvPr id="131" name="Group 130">
             <a:extLst>
               <a:ext uri="{FF2B5EF4-FFF2-40B4-BE49-F238E27FC236}">
-                <a16:creationId xmlns:a16="http://schemas.microsoft.com/office/drawing/2014/main" id="{63BF52F6-E0AC-8D4C-BEEA-46592E9C9B36}"/>
+                <a16:creationId xmlns:a16="http://schemas.microsoft.com/office/drawing/2014/main" id="{F6008431-0290-F548-9078-25F2B54D2C62}"/>
+              </a:ext>
+            </a:extLst>
+          </p:cNvPr>
+          <p:cNvGrpSpPr/>
+          <p:nvPr/>
+        </p:nvGrpSpPr>
+        <p:grpSpPr>
+          <a:xfrm>
+            <a:off x="10516521" y="10260413"/>
+            <a:ext cx="4565395" cy="6527849"/>
+            <a:chOff x="10208451" y="10371752"/>
+            <a:chExt cx="4565395" cy="6527849"/>
+          </a:xfrm>
+        </p:grpSpPr>
+        <p:sp>
+          <p:nvSpPr>
+            <p:cNvPr id="96" name="Rectangle 95">
+              <a:extLst>
+                <a:ext uri="{FF2B5EF4-FFF2-40B4-BE49-F238E27FC236}">
+                  <a16:creationId xmlns:a16="http://schemas.microsoft.com/office/drawing/2014/main" id="{C74941D4-145C-894B-B39F-B8AE1A547C70}"/>
+                </a:ext>
+              </a:extLst>
+            </p:cNvPr>
+            <p:cNvSpPr/>
+            <p:nvPr/>
+          </p:nvSpPr>
+          <p:spPr>
+            <a:xfrm>
+              <a:off x="10208451" y="10371752"/>
+              <a:ext cx="4535426" cy="6527849"/>
+            </a:xfrm>
+            <a:prstGeom prst="rect">
+              <a:avLst/>
+            </a:prstGeom>
+            <a:solidFill>
+              <a:schemeClr val="bg1"/>
+            </a:solidFill>
+            <a:ln>
+              <a:noFill/>
+            </a:ln>
+            <a:effectLst>
+              <a:outerShdw blurRad="190500" dist="38100" dir="5400000" sx="99000" sy="99000" algn="ctr" rotWithShape="0">
+                <a:prstClr val="black">
+                  <a:alpha val="40000"/>
+                </a:prstClr>
+              </a:outerShdw>
+            </a:effectLst>
+          </p:spPr>
+          <p:style>
+            <a:lnRef idx="2">
+              <a:schemeClr val="accent1">
+                <a:shade val="50000"/>
+              </a:schemeClr>
+            </a:lnRef>
+            <a:fillRef idx="1">
+              <a:schemeClr val="accent1"/>
+            </a:fillRef>
+            <a:effectRef idx="0">
+              <a:schemeClr val="accent1"/>
+            </a:effectRef>
+            <a:fontRef idx="minor">
+              <a:schemeClr val="lt1"/>
+            </a:fontRef>
+          </p:style>
+          <p:txBody>
+            <a:bodyPr rtlCol="0" anchor="ctr"/>
+            <a:lstStyle/>
+            <a:p>
+              <a:pPr algn="ctr"/>
+              <a:endParaRPr lang="en-GB" dirty="0"/>
+            </a:p>
+          </p:txBody>
+        </p:sp>
+        <p:pic>
+          <p:nvPicPr>
+            <p:cNvPr id="98" name="Picture 97">
+              <a:extLst>
+                <a:ext uri="{FF2B5EF4-FFF2-40B4-BE49-F238E27FC236}">
+                  <a16:creationId xmlns:a16="http://schemas.microsoft.com/office/drawing/2014/main" id="{EC8299F9-4CC3-ED45-AD09-AA7549A5B29A}"/>
+                </a:ext>
+              </a:extLst>
+            </p:cNvPr>
+            <p:cNvPicPr>
+              <a:picLocks noChangeAspect="1"/>
+            </p:cNvPicPr>
+            <p:nvPr/>
+          </p:nvPicPr>
+          <p:blipFill rotWithShape="1">
+            <a:blip r:embed="rId6"/>
+            <a:srcRect l="6719" t="11882" r="8081"/>
+            <a:stretch/>
+          </p:blipFill>
+          <p:spPr>
+            <a:xfrm>
+              <a:off x="10518256" y="10467523"/>
+              <a:ext cx="4197969" cy="3265782"/>
+            </a:xfrm>
+            <a:prstGeom prst="rect">
+              <a:avLst/>
+            </a:prstGeom>
+          </p:spPr>
+        </p:pic>
+        <p:sp>
+          <p:nvSpPr>
+            <p:cNvPr id="99" name="Rectangle 98">
+              <a:extLst>
+                <a:ext uri="{FF2B5EF4-FFF2-40B4-BE49-F238E27FC236}">
+                  <a16:creationId xmlns:a16="http://schemas.microsoft.com/office/drawing/2014/main" id="{0F3A41AE-ADF5-8149-B6D3-70AB951FE57B}"/>
+                </a:ext>
+              </a:extLst>
+            </p:cNvPr>
+            <p:cNvSpPr/>
+            <p:nvPr/>
+          </p:nvSpPr>
+          <p:spPr>
+            <a:xfrm>
+              <a:off x="10535678" y="10456889"/>
+              <a:ext cx="210001" cy="2959111"/>
+            </a:xfrm>
+            <a:prstGeom prst="rect">
+              <a:avLst/>
+            </a:prstGeom>
+            <a:solidFill>
+              <a:schemeClr val="bg1"/>
+            </a:solidFill>
+            <a:ln>
+              <a:noFill/>
+            </a:ln>
+          </p:spPr>
+          <p:style>
+            <a:lnRef idx="2">
+              <a:schemeClr val="accent1">
+                <a:shade val="50000"/>
+              </a:schemeClr>
+            </a:lnRef>
+            <a:fillRef idx="1">
+              <a:schemeClr val="accent1"/>
+            </a:fillRef>
+            <a:effectRef idx="0">
+              <a:schemeClr val="accent1"/>
+            </a:effectRef>
+            <a:fontRef idx="minor">
+              <a:schemeClr val="lt1"/>
+            </a:fontRef>
+          </p:style>
+          <p:txBody>
+            <a:bodyPr rtlCol="0" anchor="ctr"/>
+            <a:lstStyle/>
+            <a:p>
+              <a:pPr algn="ctr"/>
+              <a:endParaRPr lang="en-GB"/>
+            </a:p>
+          </p:txBody>
+        </p:sp>
+        <p:sp>
+          <p:nvSpPr>
+            <p:cNvPr id="97" name="TextBox 96">
+              <a:extLst>
+                <a:ext uri="{FF2B5EF4-FFF2-40B4-BE49-F238E27FC236}">
+                  <a16:creationId xmlns:a16="http://schemas.microsoft.com/office/drawing/2014/main" id="{CF890B9D-43FF-9249-897F-8F7D8B5034EB}"/>
+                </a:ext>
+              </a:extLst>
+            </p:cNvPr>
+            <p:cNvSpPr txBox="1"/>
+            <p:nvPr/>
+          </p:nvSpPr>
+          <p:spPr>
+            <a:xfrm>
+              <a:off x="10318224" y="13045908"/>
+              <a:ext cx="506870" cy="307777"/>
+            </a:xfrm>
+            <a:prstGeom prst="rect">
+              <a:avLst/>
+            </a:prstGeom>
+            <a:noFill/>
+          </p:spPr>
+          <p:txBody>
+            <a:bodyPr wrap="none" rtlCol="0">
+              <a:spAutoFit/>
+            </a:bodyPr>
+            <a:lstStyle/>
+            <a:p>
+              <a:r>
+                <a:rPr lang="en-GB" sz="1400" dirty="0">
+                  <a:latin typeface="Roboto Mono" pitchFamily="2" charset="0"/>
+                  <a:ea typeface="Roboto Mono" pitchFamily="2" charset="0"/>
+                </a:rPr>
+                <a:t>0.0</a:t>
+              </a:r>
+            </a:p>
+          </p:txBody>
+        </p:sp>
+        <p:sp>
+          <p:nvSpPr>
+            <p:cNvPr id="100" name="TextBox 99">
+              <a:extLst>
+                <a:ext uri="{FF2B5EF4-FFF2-40B4-BE49-F238E27FC236}">
+                  <a16:creationId xmlns:a16="http://schemas.microsoft.com/office/drawing/2014/main" id="{3D5B9817-CBDF-784B-B4FD-3BD7A7435965}"/>
+                </a:ext>
+              </a:extLst>
+            </p:cNvPr>
+            <p:cNvSpPr txBox="1"/>
+            <p:nvPr/>
+          </p:nvSpPr>
+          <p:spPr>
+            <a:xfrm>
+              <a:off x="10318224" y="12614941"/>
+              <a:ext cx="506870" cy="307777"/>
+            </a:xfrm>
+            <a:prstGeom prst="rect">
+              <a:avLst/>
+            </a:prstGeom>
+            <a:noFill/>
+          </p:spPr>
+          <p:txBody>
+            <a:bodyPr wrap="none" rtlCol="0">
+              <a:spAutoFit/>
+            </a:bodyPr>
+            <a:lstStyle/>
+            <a:p>
+              <a:r>
+                <a:rPr lang="en-GB" sz="1400" dirty="0">
+                  <a:latin typeface="Roboto Mono" pitchFamily="2" charset="0"/>
+                  <a:ea typeface="Roboto Mono" pitchFamily="2" charset="0"/>
+                </a:rPr>
+                <a:t>0.2</a:t>
+              </a:r>
+            </a:p>
+          </p:txBody>
+        </p:sp>
+        <p:sp>
+          <p:nvSpPr>
+            <p:cNvPr id="101" name="TextBox 100">
+              <a:extLst>
+                <a:ext uri="{FF2B5EF4-FFF2-40B4-BE49-F238E27FC236}">
+                  <a16:creationId xmlns:a16="http://schemas.microsoft.com/office/drawing/2014/main" id="{C84CBD56-E59C-0B41-8E14-7C094B0C3F9F}"/>
+                </a:ext>
+              </a:extLst>
+            </p:cNvPr>
+            <p:cNvSpPr txBox="1"/>
+            <p:nvPr/>
+          </p:nvSpPr>
+          <p:spPr>
+            <a:xfrm>
+              <a:off x="10318224" y="12164022"/>
+              <a:ext cx="506870" cy="307777"/>
+            </a:xfrm>
+            <a:prstGeom prst="rect">
+              <a:avLst/>
+            </a:prstGeom>
+            <a:noFill/>
+          </p:spPr>
+          <p:txBody>
+            <a:bodyPr wrap="none" rtlCol="0">
+              <a:spAutoFit/>
+            </a:bodyPr>
+            <a:lstStyle/>
+            <a:p>
+              <a:r>
+                <a:rPr lang="en-GB" sz="1400" dirty="0">
+                  <a:latin typeface="Roboto Mono" pitchFamily="2" charset="0"/>
+                  <a:ea typeface="Roboto Mono" pitchFamily="2" charset="0"/>
+                </a:rPr>
+                <a:t>0.4</a:t>
+              </a:r>
+            </a:p>
+          </p:txBody>
+        </p:sp>
+        <p:sp>
+          <p:nvSpPr>
+            <p:cNvPr id="102" name="TextBox 101">
+              <a:extLst>
+                <a:ext uri="{FF2B5EF4-FFF2-40B4-BE49-F238E27FC236}">
+                  <a16:creationId xmlns:a16="http://schemas.microsoft.com/office/drawing/2014/main" id="{2C546B30-26B1-6348-8DA1-ACDA6632BFE5}"/>
+                </a:ext>
+              </a:extLst>
+            </p:cNvPr>
+            <p:cNvSpPr txBox="1"/>
+            <p:nvPr/>
+          </p:nvSpPr>
+          <p:spPr>
+            <a:xfrm>
+              <a:off x="10318224" y="11721815"/>
+              <a:ext cx="506870" cy="307777"/>
+            </a:xfrm>
+            <a:prstGeom prst="rect">
+              <a:avLst/>
+            </a:prstGeom>
+            <a:noFill/>
+          </p:spPr>
+          <p:txBody>
+            <a:bodyPr wrap="none" rtlCol="0">
+              <a:spAutoFit/>
+            </a:bodyPr>
+            <a:lstStyle/>
+            <a:p>
+              <a:r>
+                <a:rPr lang="en-GB" sz="1400" dirty="0">
+                  <a:latin typeface="Roboto Mono" pitchFamily="2" charset="0"/>
+                  <a:ea typeface="Roboto Mono" pitchFamily="2" charset="0"/>
+                </a:rPr>
+                <a:t>0.6</a:t>
+              </a:r>
+            </a:p>
+          </p:txBody>
+        </p:sp>
+        <p:sp>
+          <p:nvSpPr>
+            <p:cNvPr id="103" name="TextBox 102">
+              <a:extLst>
+                <a:ext uri="{FF2B5EF4-FFF2-40B4-BE49-F238E27FC236}">
+                  <a16:creationId xmlns:a16="http://schemas.microsoft.com/office/drawing/2014/main" id="{B0557B46-9D26-8149-A160-4C26B277239B}"/>
+                </a:ext>
+              </a:extLst>
+            </p:cNvPr>
+            <p:cNvSpPr txBox="1"/>
+            <p:nvPr/>
+          </p:nvSpPr>
+          <p:spPr>
+            <a:xfrm>
+              <a:off x="10226211" y="10438838"/>
+              <a:ext cx="389850" cy="338554"/>
+            </a:xfrm>
+            <a:prstGeom prst="rect">
+              <a:avLst/>
+            </a:prstGeom>
+            <a:noFill/>
+          </p:spPr>
+          <p:txBody>
+            <a:bodyPr wrap="none" rtlCol="0">
+              <a:spAutoFit/>
+            </a:bodyPr>
+            <a:lstStyle/>
+            <a:p>
+              <a:r>
+                <a:rPr lang="el-GR" sz="1600" b="1" i="1" dirty="0">
+                  <a:latin typeface="Roboto Mono" pitchFamily="2" charset="0"/>
+                  <a:ea typeface="Roboto Mono" pitchFamily="2" charset="0"/>
+                </a:rPr>
+                <a:t>Ω</a:t>
+              </a:r>
+              <a:r>
+                <a:rPr lang="en-GB" sz="1600" b="1" i="1" baseline="-25000" dirty="0">
+                  <a:latin typeface="Roboto Mono" pitchFamily="2" charset="0"/>
+                  <a:ea typeface="Roboto Mono" pitchFamily="2" charset="0"/>
+                </a:rPr>
+                <a:t>Λ</a:t>
+              </a:r>
+              <a:endParaRPr lang="en-GB" sz="1600" b="1" i="1" dirty="0">
+                <a:latin typeface="Roboto Mono" pitchFamily="2" charset="0"/>
+                <a:ea typeface="Roboto Mono" pitchFamily="2" charset="0"/>
+              </a:endParaRPr>
+            </a:p>
+          </p:txBody>
+        </p:sp>
+        <p:sp>
+          <p:nvSpPr>
+            <p:cNvPr id="104" name="TextBox 103">
+              <a:extLst>
+                <a:ext uri="{FF2B5EF4-FFF2-40B4-BE49-F238E27FC236}">
+                  <a16:creationId xmlns:a16="http://schemas.microsoft.com/office/drawing/2014/main" id="{609BD436-2FFD-9740-84B8-B4FF7E4CF083}"/>
+                </a:ext>
+              </a:extLst>
+            </p:cNvPr>
+            <p:cNvSpPr txBox="1"/>
+            <p:nvPr/>
+          </p:nvSpPr>
+          <p:spPr>
+            <a:xfrm>
+              <a:off x="10329883" y="11290848"/>
+              <a:ext cx="506870" cy="307777"/>
+            </a:xfrm>
+            <a:prstGeom prst="rect">
+              <a:avLst/>
+            </a:prstGeom>
+            <a:noFill/>
+          </p:spPr>
+          <p:txBody>
+            <a:bodyPr wrap="none" rtlCol="0">
+              <a:spAutoFit/>
+            </a:bodyPr>
+            <a:lstStyle/>
+            <a:p>
+              <a:r>
+                <a:rPr lang="en-GB" sz="1400" dirty="0">
+                  <a:latin typeface="Roboto Mono" pitchFamily="2" charset="0"/>
+                  <a:ea typeface="Roboto Mono" pitchFamily="2" charset="0"/>
+                </a:rPr>
+                <a:t>0.8</a:t>
+              </a:r>
+            </a:p>
+          </p:txBody>
+        </p:sp>
+        <p:sp>
+          <p:nvSpPr>
+            <p:cNvPr id="105" name="TextBox 104">
+              <a:extLst>
+                <a:ext uri="{FF2B5EF4-FFF2-40B4-BE49-F238E27FC236}">
+                  <a16:creationId xmlns:a16="http://schemas.microsoft.com/office/drawing/2014/main" id="{B997BA20-4984-174C-AC0B-FCDCDEC07EDF}"/>
+                </a:ext>
+              </a:extLst>
+            </p:cNvPr>
+            <p:cNvSpPr txBox="1"/>
+            <p:nvPr/>
+          </p:nvSpPr>
+          <p:spPr>
+            <a:xfrm>
+              <a:off x="10318224" y="10835781"/>
+              <a:ext cx="506870" cy="307777"/>
+            </a:xfrm>
+            <a:prstGeom prst="rect">
+              <a:avLst/>
+            </a:prstGeom>
+            <a:noFill/>
+          </p:spPr>
+          <p:txBody>
+            <a:bodyPr wrap="none" rtlCol="0">
+              <a:spAutoFit/>
+            </a:bodyPr>
+            <a:lstStyle/>
+            <a:p>
+              <a:r>
+                <a:rPr lang="en-GB" sz="1400" dirty="0">
+                  <a:latin typeface="Roboto Mono" pitchFamily="2" charset="0"/>
+                  <a:ea typeface="Roboto Mono" pitchFamily="2" charset="0"/>
+                </a:rPr>
+                <a:t>1.0</a:t>
+              </a:r>
+            </a:p>
+          </p:txBody>
+        </p:sp>
+        <p:sp>
+          <p:nvSpPr>
+            <p:cNvPr id="106" name="Rectangle 105">
+              <a:extLst>
+                <a:ext uri="{FF2B5EF4-FFF2-40B4-BE49-F238E27FC236}">
+                  <a16:creationId xmlns:a16="http://schemas.microsoft.com/office/drawing/2014/main" id="{994A3F8F-3067-F149-975F-2BEFEDEF1901}"/>
+                </a:ext>
+              </a:extLst>
+            </p:cNvPr>
+            <p:cNvSpPr/>
+            <p:nvPr/>
+          </p:nvSpPr>
+          <p:spPr>
+            <a:xfrm rot="5400000">
+              <a:off x="12508461" y="11525545"/>
+              <a:ext cx="348661" cy="4066864"/>
+            </a:xfrm>
+            <a:prstGeom prst="rect">
+              <a:avLst/>
+            </a:prstGeom>
+            <a:solidFill>
+              <a:schemeClr val="bg1"/>
+            </a:solidFill>
+            <a:ln>
+              <a:noFill/>
+            </a:ln>
+          </p:spPr>
+          <p:style>
+            <a:lnRef idx="2">
+              <a:schemeClr val="accent1">
+                <a:shade val="50000"/>
+              </a:schemeClr>
+            </a:lnRef>
+            <a:fillRef idx="1">
+              <a:schemeClr val="accent1"/>
+            </a:fillRef>
+            <a:effectRef idx="0">
+              <a:schemeClr val="accent1"/>
+            </a:effectRef>
+            <a:fontRef idx="minor">
+              <a:schemeClr val="lt1"/>
+            </a:fontRef>
+          </p:style>
+          <p:txBody>
+            <a:bodyPr rtlCol="0" anchor="ctr"/>
+            <a:lstStyle/>
+            <a:p>
+              <a:pPr algn="ctr"/>
+              <a:endParaRPr lang="en-GB"/>
+            </a:p>
+          </p:txBody>
+        </p:sp>
+        <p:sp>
+          <p:nvSpPr>
+            <p:cNvPr id="107" name="TextBox 106">
+              <a:extLst>
+                <a:ext uri="{FF2B5EF4-FFF2-40B4-BE49-F238E27FC236}">
+                  <a16:creationId xmlns:a16="http://schemas.microsoft.com/office/drawing/2014/main" id="{63BF52F6-E0AC-8D4C-BEEA-46592E9C9B36}"/>
+                </a:ext>
+              </a:extLst>
+            </p:cNvPr>
+            <p:cNvSpPr txBox="1"/>
+            <p:nvPr/>
+          </p:nvSpPr>
+          <p:spPr>
+            <a:xfrm rot="-2700000">
+              <a:off x="10533408" y="13391962"/>
+              <a:ext cx="614271" cy="307777"/>
+            </a:xfrm>
+            <a:prstGeom prst="rect">
+              <a:avLst/>
+            </a:prstGeom>
+            <a:noFill/>
+          </p:spPr>
+          <p:txBody>
+            <a:bodyPr wrap="none" rtlCol="0">
+              <a:spAutoFit/>
+            </a:bodyPr>
+            <a:lstStyle/>
+            <a:p>
+              <a:r>
+                <a:rPr lang="en-GB" sz="1400" dirty="0">
+                  <a:latin typeface="Roboto Mono" pitchFamily="2" charset="0"/>
+                  <a:ea typeface="Roboto Mono" pitchFamily="2" charset="0"/>
+                </a:rPr>
+                <a:t>2.50</a:t>
+              </a:r>
+            </a:p>
+          </p:txBody>
+        </p:sp>
+        <p:sp>
+          <p:nvSpPr>
+            <p:cNvPr id="108" name="TextBox 107">
+              <a:extLst>
+                <a:ext uri="{FF2B5EF4-FFF2-40B4-BE49-F238E27FC236}">
+                  <a16:creationId xmlns:a16="http://schemas.microsoft.com/office/drawing/2014/main" id="{0E5B99CD-D727-0F49-B366-E18BC4266E4F}"/>
+                </a:ext>
+              </a:extLst>
+            </p:cNvPr>
+            <p:cNvSpPr txBox="1"/>
+            <p:nvPr/>
+          </p:nvSpPr>
+          <p:spPr>
+            <a:xfrm>
+              <a:off x="14122706" y="13507627"/>
+              <a:ext cx="651140" cy="307777"/>
+            </a:xfrm>
+            <a:prstGeom prst="rect">
+              <a:avLst/>
+            </a:prstGeom>
+            <a:noFill/>
+          </p:spPr>
+          <p:txBody>
+            <a:bodyPr wrap="none" rtlCol="0">
+              <a:spAutoFit/>
+            </a:bodyPr>
+            <a:lstStyle/>
+            <a:p>
+              <a:r>
+                <a:rPr lang="en-GB" sz="1400" dirty="0">
+                  <a:latin typeface="Roboto Mono" pitchFamily="2" charset="0"/>
+                  <a:ea typeface="Roboto Mono" pitchFamily="2" charset="0"/>
+                </a:rPr>
+                <a:t>x10</a:t>
+              </a:r>
+              <a:r>
+                <a:rPr lang="en-GB" sz="1400" baseline="30000" dirty="0">
+                  <a:latin typeface="Roboto Mono" pitchFamily="2" charset="0"/>
+                  <a:ea typeface="Roboto Mono" pitchFamily="2" charset="0"/>
+                </a:rPr>
+                <a:t>35</a:t>
+              </a:r>
+              <a:endParaRPr lang="en-GB" sz="1400" dirty="0">
+                <a:latin typeface="Roboto Mono" pitchFamily="2" charset="0"/>
+                <a:ea typeface="Roboto Mono" pitchFamily="2" charset="0"/>
+              </a:endParaRPr>
+            </a:p>
+          </p:txBody>
+        </p:sp>
+        <p:sp>
+          <p:nvSpPr>
+            <p:cNvPr id="109" name="TextBox 108">
+              <a:extLst>
+                <a:ext uri="{FF2B5EF4-FFF2-40B4-BE49-F238E27FC236}">
+                  <a16:creationId xmlns:a16="http://schemas.microsoft.com/office/drawing/2014/main" id="{C7891DB9-3CDB-A348-8981-BF7C422BC7C2}"/>
+                </a:ext>
+              </a:extLst>
+            </p:cNvPr>
+            <p:cNvSpPr txBox="1"/>
+            <p:nvPr/>
+          </p:nvSpPr>
+          <p:spPr>
+            <a:xfrm rot="-2700000">
+              <a:off x="10955987" y="13405088"/>
+              <a:ext cx="614271" cy="307777"/>
+            </a:xfrm>
+            <a:prstGeom prst="rect">
+              <a:avLst/>
+            </a:prstGeom>
+            <a:noFill/>
+          </p:spPr>
+          <p:txBody>
+            <a:bodyPr wrap="none" rtlCol="0">
+              <a:spAutoFit/>
+            </a:bodyPr>
+            <a:lstStyle/>
+            <a:p>
+              <a:r>
+                <a:rPr lang="en-GB" sz="1400" dirty="0">
+                  <a:latin typeface="Roboto Mono" pitchFamily="2" charset="0"/>
+                  <a:ea typeface="Roboto Mono" pitchFamily="2" charset="0"/>
+                </a:rPr>
+                <a:t>2.75</a:t>
+              </a:r>
+            </a:p>
+          </p:txBody>
+        </p:sp>
+        <p:sp>
+          <p:nvSpPr>
+            <p:cNvPr id="110" name="TextBox 109">
+              <a:extLst>
+                <a:ext uri="{FF2B5EF4-FFF2-40B4-BE49-F238E27FC236}">
+                  <a16:creationId xmlns:a16="http://schemas.microsoft.com/office/drawing/2014/main" id="{3FDD2FD6-7BD3-1645-8552-33FD64AF9249}"/>
+                </a:ext>
+              </a:extLst>
+            </p:cNvPr>
+            <p:cNvSpPr txBox="1"/>
+            <p:nvPr/>
+          </p:nvSpPr>
+          <p:spPr>
+            <a:xfrm rot="-2700000">
+              <a:off x="11414270" y="13400534"/>
+              <a:ext cx="614271" cy="307777"/>
+            </a:xfrm>
+            <a:prstGeom prst="rect">
+              <a:avLst/>
+            </a:prstGeom>
+            <a:noFill/>
+          </p:spPr>
+          <p:txBody>
+            <a:bodyPr wrap="none" rtlCol="0">
+              <a:spAutoFit/>
+            </a:bodyPr>
+            <a:lstStyle/>
+            <a:p>
+              <a:r>
+                <a:rPr lang="en-GB" sz="1400" dirty="0">
+                  <a:latin typeface="Roboto Mono" pitchFamily="2" charset="0"/>
+                  <a:ea typeface="Roboto Mono" pitchFamily="2" charset="0"/>
+                </a:rPr>
+                <a:t>3.00</a:t>
+              </a:r>
+            </a:p>
+          </p:txBody>
+        </p:sp>
+        <p:sp>
+          <p:nvSpPr>
+            <p:cNvPr id="111" name="TextBox 110">
+              <a:extLst>
+                <a:ext uri="{FF2B5EF4-FFF2-40B4-BE49-F238E27FC236}">
+                  <a16:creationId xmlns:a16="http://schemas.microsoft.com/office/drawing/2014/main" id="{91718F93-E834-EC48-A154-5758E8B303D2}"/>
+                </a:ext>
+              </a:extLst>
+            </p:cNvPr>
+            <p:cNvSpPr txBox="1"/>
+            <p:nvPr/>
+          </p:nvSpPr>
+          <p:spPr>
+            <a:xfrm rot="18900000">
+              <a:off x="11852371" y="13404900"/>
+              <a:ext cx="614271" cy="307777"/>
+            </a:xfrm>
+            <a:prstGeom prst="rect">
+              <a:avLst/>
+            </a:prstGeom>
+            <a:noFill/>
+          </p:spPr>
+          <p:txBody>
+            <a:bodyPr wrap="none" rtlCol="0">
+              <a:spAutoFit/>
+            </a:bodyPr>
+            <a:lstStyle/>
+            <a:p>
+              <a:r>
+                <a:rPr lang="en-GB" sz="1400" dirty="0">
+                  <a:latin typeface="Roboto Mono" pitchFamily="2" charset="0"/>
+                  <a:ea typeface="Roboto Mono" pitchFamily="2" charset="0"/>
+                </a:rPr>
+                <a:t>3.25</a:t>
+              </a:r>
+            </a:p>
+          </p:txBody>
+        </p:sp>
+        <p:sp>
+          <p:nvSpPr>
+            <p:cNvPr id="112" name="TextBox 111">
+              <a:extLst>
+                <a:ext uri="{FF2B5EF4-FFF2-40B4-BE49-F238E27FC236}">
+                  <a16:creationId xmlns:a16="http://schemas.microsoft.com/office/drawing/2014/main" id="{34E7A011-EF6F-C442-BB70-006E54677FB6}"/>
+                </a:ext>
+              </a:extLst>
+            </p:cNvPr>
+            <p:cNvSpPr txBox="1"/>
+            <p:nvPr/>
+          </p:nvSpPr>
+          <p:spPr>
+            <a:xfrm>
+              <a:off x="12302754" y="13728817"/>
+              <a:ext cx="635110" cy="338554"/>
+            </a:xfrm>
+            <a:prstGeom prst="rect">
+              <a:avLst/>
+            </a:prstGeom>
+            <a:noFill/>
+          </p:spPr>
+          <p:txBody>
+            <a:bodyPr wrap="none" rtlCol="0">
+              <a:spAutoFit/>
+            </a:bodyPr>
+            <a:lstStyle/>
+            <a:p>
+              <a:r>
+                <a:rPr lang="en-GB" sz="1600" b="1" i="1" dirty="0" err="1">
+                  <a:latin typeface="Roboto Mono" pitchFamily="2" charset="0"/>
+                  <a:ea typeface="Roboto Mono" pitchFamily="2" charset="0"/>
+                </a:rPr>
+                <a:t>L</a:t>
+              </a:r>
+              <a:r>
+                <a:rPr lang="en-GB" sz="1600" b="1" i="1" baseline="-25000" dirty="0" err="1">
+                  <a:latin typeface="Roboto Mono" pitchFamily="2" charset="0"/>
+                  <a:ea typeface="Roboto Mono" pitchFamily="2" charset="0"/>
+                </a:rPr>
+                <a:t>peak</a:t>
+              </a:r>
+              <a:endParaRPr lang="en-GB" sz="1600" b="1" i="1" dirty="0">
+                <a:latin typeface="Roboto Mono" pitchFamily="2" charset="0"/>
+                <a:ea typeface="Roboto Mono" pitchFamily="2" charset="0"/>
+              </a:endParaRPr>
+            </a:p>
+          </p:txBody>
+        </p:sp>
+        <p:sp>
+          <p:nvSpPr>
+            <p:cNvPr id="113" name="TextBox 112">
+              <a:extLst>
+                <a:ext uri="{FF2B5EF4-FFF2-40B4-BE49-F238E27FC236}">
+                  <a16:creationId xmlns:a16="http://schemas.microsoft.com/office/drawing/2014/main" id="{4500FE40-059D-1340-8F28-0F42274A446E}"/>
+                </a:ext>
+              </a:extLst>
+            </p:cNvPr>
+            <p:cNvSpPr txBox="1"/>
+            <p:nvPr/>
+          </p:nvSpPr>
+          <p:spPr>
+            <a:xfrm rot="18900000">
+              <a:off x="12323954" y="13407424"/>
+              <a:ext cx="614271" cy="307777"/>
+            </a:xfrm>
+            <a:prstGeom prst="rect">
+              <a:avLst/>
+            </a:prstGeom>
+            <a:noFill/>
+          </p:spPr>
+          <p:txBody>
+            <a:bodyPr wrap="none" rtlCol="0">
+              <a:spAutoFit/>
+            </a:bodyPr>
+            <a:lstStyle/>
+            <a:p>
+              <a:r>
+                <a:rPr lang="en-GB" sz="1400" dirty="0">
+                  <a:latin typeface="Roboto Mono" pitchFamily="2" charset="0"/>
+                  <a:ea typeface="Roboto Mono" pitchFamily="2" charset="0"/>
+                </a:rPr>
+                <a:t>3.50</a:t>
+              </a:r>
+            </a:p>
+          </p:txBody>
+        </p:sp>
+        <p:sp>
+          <p:nvSpPr>
+            <p:cNvPr id="114" name="TextBox 113">
+              <a:extLst>
+                <a:ext uri="{FF2B5EF4-FFF2-40B4-BE49-F238E27FC236}">
+                  <a16:creationId xmlns:a16="http://schemas.microsoft.com/office/drawing/2014/main" id="{78D5EDC2-D604-AF45-8C79-90E4EE6F1954}"/>
+                </a:ext>
+              </a:extLst>
+            </p:cNvPr>
+            <p:cNvSpPr txBox="1"/>
+            <p:nvPr/>
+          </p:nvSpPr>
+          <p:spPr>
+            <a:xfrm rot="18900000">
+              <a:off x="12777917" y="13400534"/>
+              <a:ext cx="614271" cy="307777"/>
+            </a:xfrm>
+            <a:prstGeom prst="rect">
+              <a:avLst/>
+            </a:prstGeom>
+            <a:noFill/>
+          </p:spPr>
+          <p:txBody>
+            <a:bodyPr wrap="none" rtlCol="0">
+              <a:spAutoFit/>
+            </a:bodyPr>
+            <a:lstStyle/>
+            <a:p>
+              <a:r>
+                <a:rPr lang="en-GB" sz="1400" dirty="0">
+                  <a:latin typeface="Roboto Mono" pitchFamily="2" charset="0"/>
+                  <a:ea typeface="Roboto Mono" pitchFamily="2" charset="0"/>
+                </a:rPr>
+                <a:t>3.75</a:t>
+              </a:r>
+            </a:p>
+          </p:txBody>
+        </p:sp>
+        <p:sp>
+          <p:nvSpPr>
+            <p:cNvPr id="115" name="TextBox 114">
+              <a:extLst>
+                <a:ext uri="{FF2B5EF4-FFF2-40B4-BE49-F238E27FC236}">
+                  <a16:creationId xmlns:a16="http://schemas.microsoft.com/office/drawing/2014/main" id="{8AAD1905-FFE2-8A4C-9593-F1A28C1D0F46}"/>
+                </a:ext>
+              </a:extLst>
+            </p:cNvPr>
+            <p:cNvSpPr txBox="1"/>
+            <p:nvPr/>
+          </p:nvSpPr>
+          <p:spPr>
+            <a:xfrm rot="18900000">
+              <a:off x="13156397" y="13411791"/>
+              <a:ext cx="614271" cy="307777"/>
+            </a:xfrm>
+            <a:prstGeom prst="rect">
+              <a:avLst/>
+            </a:prstGeom>
+            <a:noFill/>
+          </p:spPr>
+          <p:txBody>
+            <a:bodyPr wrap="none" rtlCol="0">
+              <a:spAutoFit/>
+            </a:bodyPr>
+            <a:lstStyle/>
+            <a:p>
+              <a:r>
+                <a:rPr lang="en-GB" sz="1400" dirty="0">
+                  <a:latin typeface="Roboto Mono" pitchFamily="2" charset="0"/>
+                  <a:ea typeface="Roboto Mono" pitchFamily="2" charset="0"/>
+                </a:rPr>
+                <a:t>4.00</a:t>
+              </a:r>
+            </a:p>
+          </p:txBody>
+        </p:sp>
+        <p:sp>
+          <p:nvSpPr>
+            <p:cNvPr id="116" name="TextBox 115">
+              <a:extLst>
+                <a:ext uri="{FF2B5EF4-FFF2-40B4-BE49-F238E27FC236}">
+                  <a16:creationId xmlns:a16="http://schemas.microsoft.com/office/drawing/2014/main" id="{8D9D47DB-7D69-D347-8E6C-33102BF055E5}"/>
+                </a:ext>
+              </a:extLst>
+            </p:cNvPr>
+            <p:cNvSpPr txBox="1"/>
+            <p:nvPr/>
+          </p:nvSpPr>
+          <p:spPr>
+            <a:xfrm rot="18900000">
+              <a:off x="13604448" y="13403652"/>
+              <a:ext cx="614271" cy="307777"/>
+            </a:xfrm>
+            <a:prstGeom prst="rect">
+              <a:avLst/>
+            </a:prstGeom>
+            <a:noFill/>
+          </p:spPr>
+          <p:txBody>
+            <a:bodyPr wrap="none" rtlCol="0">
+              <a:spAutoFit/>
+            </a:bodyPr>
+            <a:lstStyle/>
+            <a:p>
+              <a:r>
+                <a:rPr lang="en-GB" sz="1400" dirty="0">
+                  <a:latin typeface="Roboto Mono" pitchFamily="2" charset="0"/>
+                  <a:ea typeface="Roboto Mono" pitchFamily="2" charset="0"/>
+                </a:rPr>
+                <a:t>4.25</a:t>
+              </a:r>
+            </a:p>
+          </p:txBody>
+        </p:sp>
+        <p:sp>
+          <p:nvSpPr>
+            <p:cNvPr id="117" name="TextBox 116">
+              <a:extLst>
+                <a:ext uri="{FF2B5EF4-FFF2-40B4-BE49-F238E27FC236}">
+                  <a16:creationId xmlns:a16="http://schemas.microsoft.com/office/drawing/2014/main" id="{70AB2369-BB27-CF41-B649-D1EE49B5E5A1}"/>
+                </a:ext>
+              </a:extLst>
+            </p:cNvPr>
+            <p:cNvSpPr txBox="1"/>
+            <p:nvPr/>
+          </p:nvSpPr>
+          <p:spPr>
+            <a:xfrm>
+              <a:off x="10280164" y="14168708"/>
+              <a:ext cx="4410671" cy="2539157"/>
+            </a:xfrm>
+            <a:prstGeom prst="rect">
+              <a:avLst/>
+            </a:prstGeom>
+            <a:noFill/>
+          </p:spPr>
+          <p:txBody>
+            <a:bodyPr wrap="square" rtlCol="0">
+              <a:spAutoFit/>
+            </a:bodyPr>
+            <a:lstStyle/>
+            <a:p>
+              <a:r>
+                <a:rPr lang="en-GB" sz="1450" dirty="0">
+                  <a:latin typeface="Roboto Mono" pitchFamily="2" charset="0"/>
+                  <a:ea typeface="Roboto Mono" pitchFamily="2" charset="0"/>
+                </a:rPr>
+                <a:t>FIG. 2: Plot showing the MCMC sample space. </a:t>
+              </a:r>
+              <a:r>
+                <a:rPr lang="el-GR" sz="1400" b="1" i="1" dirty="0">
+                  <a:latin typeface="Roboto Mono" pitchFamily="2" charset="0"/>
+                  <a:ea typeface="Roboto Mono" pitchFamily="2" charset="0"/>
+                </a:rPr>
+                <a:t>Ω</a:t>
+              </a:r>
+              <a:r>
+                <a:rPr lang="en-GB" sz="1400" b="1" i="1" baseline="-25000" dirty="0">
+                  <a:latin typeface="Roboto Mono" pitchFamily="2" charset="0"/>
+                  <a:ea typeface="Roboto Mono" pitchFamily="2" charset="0"/>
+                </a:rPr>
+                <a:t>Λ</a:t>
+              </a:r>
+              <a:r>
+                <a:rPr lang="en-GB" sz="1400" b="1" dirty="0">
+                  <a:latin typeface="Roboto Mono" pitchFamily="2" charset="0"/>
+                  <a:ea typeface="Roboto Mono" pitchFamily="2" charset="0"/>
+                </a:rPr>
+                <a:t> </a:t>
+              </a:r>
+              <a:r>
+                <a:rPr lang="en-GB" sz="1400" dirty="0">
+                  <a:latin typeface="Roboto Mono" pitchFamily="2" charset="0"/>
+                  <a:ea typeface="Roboto Mono" pitchFamily="2" charset="0"/>
+                </a:rPr>
+                <a:t>was fitted with </a:t>
+              </a:r>
+              <a:r>
+                <a:rPr lang="en-GB" sz="1400" b="1" i="1" dirty="0" err="1">
+                  <a:latin typeface="Roboto Mono" pitchFamily="2" charset="0"/>
+                  <a:ea typeface="Roboto Mono" pitchFamily="2" charset="0"/>
+                </a:rPr>
+                <a:t>L</a:t>
+              </a:r>
+              <a:r>
+                <a:rPr lang="en-GB" sz="1400" b="1" i="1" baseline="-25000" dirty="0" err="1">
+                  <a:latin typeface="Roboto Mono" pitchFamily="2" charset="0"/>
+                  <a:ea typeface="Roboto Mono" pitchFamily="2" charset="0"/>
+                </a:rPr>
+                <a:t>peak</a:t>
+              </a:r>
+              <a:r>
+                <a:rPr lang="en-GB" sz="1400" dirty="0">
+                  <a:latin typeface="Roboto Mono" pitchFamily="2" charset="0"/>
+                  <a:ea typeface="Roboto Mono" pitchFamily="2" charset="0"/>
+                </a:rPr>
+                <a:t>, an extra variable in the supernova flux model.</a:t>
+              </a:r>
+              <a:r>
+                <a:rPr lang="en-GB" sz="1400" b="1" i="1" dirty="0">
+                  <a:latin typeface="Roboto Mono" pitchFamily="2" charset="0"/>
+                  <a:ea typeface="Roboto Mono" pitchFamily="2" charset="0"/>
+                </a:rPr>
+                <a:t> </a:t>
+              </a:r>
+              <a:r>
+                <a:rPr lang="en-GB" sz="1450" dirty="0">
+                  <a:latin typeface="Roboto Mono" pitchFamily="2" charset="0"/>
+                  <a:ea typeface="Roboto Mono" pitchFamily="2" charset="0"/>
+                </a:rPr>
+                <a:t>15,000 parameter values were tested over 10 runs of 1500 tests each. The red dot shows the initial search, the blue shows the most likely from each run, and the green is the final averaged values. The red ellipses show the standard deviation spread (1</a:t>
+              </a:r>
+              <a:r>
+                <a:rPr lang="el-GR" sz="1450" dirty="0">
+                  <a:latin typeface="Roboto Mono" pitchFamily="2" charset="0"/>
+                  <a:ea typeface="Roboto Mono" pitchFamily="2" charset="0"/>
+                </a:rPr>
+                <a:t>σ</a:t>
+              </a:r>
+              <a:r>
+                <a:rPr lang="en-GB" sz="1450" dirty="0">
+                  <a:latin typeface="Roboto Mono" pitchFamily="2" charset="0"/>
+                  <a:ea typeface="Roboto Mono" pitchFamily="2" charset="0"/>
+                </a:rPr>
+                <a:t>, 2</a:t>
+              </a:r>
+              <a:r>
+                <a:rPr lang="el-GR" sz="1450" dirty="0">
+                  <a:latin typeface="Roboto Mono" pitchFamily="2" charset="0"/>
+                  <a:ea typeface="Roboto Mono" pitchFamily="2" charset="0"/>
+                </a:rPr>
+                <a:t>σ</a:t>
+              </a:r>
+              <a:r>
+                <a:rPr lang="en-GB" sz="1450" dirty="0">
+                  <a:latin typeface="Roboto Mono" pitchFamily="2" charset="0"/>
+                  <a:ea typeface="Roboto Mono" pitchFamily="2" charset="0"/>
+                </a:rPr>
+                <a:t>, and 3</a:t>
+              </a:r>
+              <a:r>
+                <a:rPr lang="el-GR" sz="1450" dirty="0">
+                  <a:latin typeface="Roboto Mono" pitchFamily="2" charset="0"/>
+                  <a:ea typeface="Roboto Mono" pitchFamily="2" charset="0"/>
+                </a:rPr>
+                <a:t>σ</a:t>
+              </a:r>
+              <a:r>
+                <a:rPr lang="en-GB" sz="1450" dirty="0">
+                  <a:latin typeface="Roboto Mono" pitchFamily="2" charset="0"/>
+                  <a:ea typeface="Roboto Mono" pitchFamily="2" charset="0"/>
+                </a:rPr>
+                <a:t>).</a:t>
+              </a:r>
+            </a:p>
+          </p:txBody>
+        </p:sp>
+      </p:grpSp>
+      <p:sp>
+        <p:nvSpPr>
+          <p:cNvPr id="128" name="TextBox 127">
+            <a:extLst>
+              <a:ext uri="{FF2B5EF4-FFF2-40B4-BE49-F238E27FC236}">
+                <a16:creationId xmlns:a16="http://schemas.microsoft.com/office/drawing/2014/main" id="{CFEDAAB9-C904-134C-A70E-2DED0B59AF37}"/>
               </a:ext>
             </a:extLst>
           </p:cNvPr>
@@ -7312,9 +7984,9 @@
           <p:nvPr/>
         </p:nvSpPr>
         <p:spPr>
-          <a:xfrm rot="-2700000">
-            <a:off x="10533408" y="13391962"/>
-            <a:ext cx="614271" cy="307777"/>
+          <a:xfrm>
+            <a:off x="5507112" y="14824642"/>
+            <a:ext cx="4770573" cy="2800767"/>
           </a:xfrm>
           <a:prstGeom prst="rect">
             <a:avLst/>
@@ -7322,524 +7994,94 @@
           <a:noFill/>
         </p:spPr>
         <p:txBody>
-          <a:bodyPr wrap="none" rtlCol="0">
-            <a:spAutoFit/>
-          </a:bodyPr>
-          <a:lstStyle/>
-          <a:p>
-            <a:r>
-              <a:rPr lang="en-GB" sz="1400" dirty="0">
-                <a:latin typeface="Roboto Mono" pitchFamily="2" charset="0"/>
-                <a:ea typeface="Roboto Mono" pitchFamily="2" charset="0"/>
-              </a:rPr>
-              <a:t>2.50</a:t>
-            </a:r>
-          </a:p>
-        </p:txBody>
-      </p:sp>
-      <p:sp>
-        <p:nvSpPr>
-          <p:cNvPr id="108" name="TextBox 107">
-            <a:extLst>
-              <a:ext uri="{FF2B5EF4-FFF2-40B4-BE49-F238E27FC236}">
-                <a16:creationId xmlns:a16="http://schemas.microsoft.com/office/drawing/2014/main" id="{0E5B99CD-D727-0F49-B366-E18BC4266E4F}"/>
-              </a:ext>
-            </a:extLst>
-          </p:cNvPr>
-          <p:cNvSpPr txBox="1"/>
-          <p:nvPr/>
-        </p:nvSpPr>
-        <p:spPr>
-          <a:xfrm>
-            <a:off x="14122706" y="13507627"/>
-            <a:ext cx="651140" cy="307777"/>
-          </a:xfrm>
-          <a:prstGeom prst="rect">
-            <a:avLst/>
-          </a:prstGeom>
-          <a:noFill/>
-        </p:spPr>
-        <p:txBody>
-          <a:bodyPr wrap="none" rtlCol="0">
-            <a:spAutoFit/>
-          </a:bodyPr>
-          <a:lstStyle/>
-          <a:p>
-            <a:r>
-              <a:rPr lang="en-GB" sz="1400" dirty="0">
-                <a:latin typeface="Roboto Mono" pitchFamily="2" charset="0"/>
-                <a:ea typeface="Roboto Mono" pitchFamily="2" charset="0"/>
-              </a:rPr>
-              <a:t>x10</a:t>
-            </a:r>
-            <a:r>
-              <a:rPr lang="en-GB" sz="1400" baseline="30000" dirty="0">
-                <a:latin typeface="Roboto Mono" pitchFamily="2" charset="0"/>
-                <a:ea typeface="Roboto Mono" pitchFamily="2" charset="0"/>
-              </a:rPr>
-              <a:t>35</a:t>
-            </a:r>
-            <a:endParaRPr lang="en-GB" sz="1400" dirty="0">
-              <a:latin typeface="Roboto Mono" pitchFamily="2" charset="0"/>
-              <a:ea typeface="Roboto Mono" pitchFamily="2" charset="0"/>
-            </a:endParaRPr>
-          </a:p>
-        </p:txBody>
-      </p:sp>
-      <p:sp>
-        <p:nvSpPr>
-          <p:cNvPr id="109" name="TextBox 108">
-            <a:extLst>
-              <a:ext uri="{FF2B5EF4-FFF2-40B4-BE49-F238E27FC236}">
-                <a16:creationId xmlns:a16="http://schemas.microsoft.com/office/drawing/2014/main" id="{C7891DB9-3CDB-A348-8981-BF7C422BC7C2}"/>
-              </a:ext>
-            </a:extLst>
-          </p:cNvPr>
-          <p:cNvSpPr txBox="1"/>
-          <p:nvPr/>
-        </p:nvSpPr>
-        <p:spPr>
-          <a:xfrm rot="-2700000">
-            <a:off x="10955987" y="13405088"/>
-            <a:ext cx="614271" cy="307777"/>
-          </a:xfrm>
-          <a:prstGeom prst="rect">
-            <a:avLst/>
-          </a:prstGeom>
-          <a:noFill/>
-        </p:spPr>
-        <p:txBody>
-          <a:bodyPr wrap="none" rtlCol="0">
-            <a:spAutoFit/>
-          </a:bodyPr>
-          <a:lstStyle/>
-          <a:p>
-            <a:r>
-              <a:rPr lang="en-GB" sz="1400" dirty="0">
-                <a:latin typeface="Roboto Mono" pitchFamily="2" charset="0"/>
-                <a:ea typeface="Roboto Mono" pitchFamily="2" charset="0"/>
-              </a:rPr>
-              <a:t>2.75</a:t>
-            </a:r>
-          </a:p>
-        </p:txBody>
-      </p:sp>
-      <p:sp>
-        <p:nvSpPr>
-          <p:cNvPr id="110" name="TextBox 109">
-            <a:extLst>
-              <a:ext uri="{FF2B5EF4-FFF2-40B4-BE49-F238E27FC236}">
-                <a16:creationId xmlns:a16="http://schemas.microsoft.com/office/drawing/2014/main" id="{3FDD2FD6-7BD3-1645-8552-33FD64AF9249}"/>
-              </a:ext>
-            </a:extLst>
-          </p:cNvPr>
-          <p:cNvSpPr txBox="1"/>
-          <p:nvPr/>
-        </p:nvSpPr>
-        <p:spPr>
-          <a:xfrm rot="-2700000">
-            <a:off x="11414270" y="13400534"/>
-            <a:ext cx="614271" cy="307777"/>
-          </a:xfrm>
-          <a:prstGeom prst="rect">
-            <a:avLst/>
-          </a:prstGeom>
-          <a:noFill/>
-        </p:spPr>
-        <p:txBody>
-          <a:bodyPr wrap="none" rtlCol="0">
-            <a:spAutoFit/>
-          </a:bodyPr>
-          <a:lstStyle/>
-          <a:p>
-            <a:r>
-              <a:rPr lang="en-GB" sz="1400" dirty="0">
-                <a:latin typeface="Roboto Mono" pitchFamily="2" charset="0"/>
-                <a:ea typeface="Roboto Mono" pitchFamily="2" charset="0"/>
-              </a:rPr>
-              <a:t>3.00</a:t>
-            </a:r>
-          </a:p>
-        </p:txBody>
-      </p:sp>
-      <p:sp>
-        <p:nvSpPr>
-          <p:cNvPr id="111" name="TextBox 110">
-            <a:extLst>
-              <a:ext uri="{FF2B5EF4-FFF2-40B4-BE49-F238E27FC236}">
-                <a16:creationId xmlns:a16="http://schemas.microsoft.com/office/drawing/2014/main" id="{91718F93-E834-EC48-A154-5758E8B303D2}"/>
-              </a:ext>
-            </a:extLst>
-          </p:cNvPr>
-          <p:cNvSpPr txBox="1"/>
-          <p:nvPr/>
-        </p:nvSpPr>
-        <p:spPr>
-          <a:xfrm rot="18900000">
-            <a:off x="11852371" y="13404900"/>
-            <a:ext cx="614271" cy="307777"/>
-          </a:xfrm>
-          <a:prstGeom prst="rect">
-            <a:avLst/>
-          </a:prstGeom>
-          <a:noFill/>
-        </p:spPr>
-        <p:txBody>
-          <a:bodyPr wrap="none" rtlCol="0">
-            <a:spAutoFit/>
-          </a:bodyPr>
-          <a:lstStyle/>
-          <a:p>
-            <a:r>
-              <a:rPr lang="en-GB" sz="1400" dirty="0">
-                <a:latin typeface="Roboto Mono" pitchFamily="2" charset="0"/>
-                <a:ea typeface="Roboto Mono" pitchFamily="2" charset="0"/>
-              </a:rPr>
-              <a:t>3.25</a:t>
-            </a:r>
-          </a:p>
-        </p:txBody>
-      </p:sp>
-      <p:sp>
-        <p:nvSpPr>
-          <p:cNvPr id="112" name="TextBox 111">
-            <a:extLst>
-              <a:ext uri="{FF2B5EF4-FFF2-40B4-BE49-F238E27FC236}">
-                <a16:creationId xmlns:a16="http://schemas.microsoft.com/office/drawing/2014/main" id="{34E7A011-EF6F-C442-BB70-006E54677FB6}"/>
-              </a:ext>
-            </a:extLst>
-          </p:cNvPr>
-          <p:cNvSpPr txBox="1"/>
-          <p:nvPr/>
-        </p:nvSpPr>
-        <p:spPr>
-          <a:xfrm>
-            <a:off x="12302754" y="13728817"/>
-            <a:ext cx="635110" cy="338554"/>
-          </a:xfrm>
-          <a:prstGeom prst="rect">
-            <a:avLst/>
-          </a:prstGeom>
-          <a:noFill/>
-        </p:spPr>
-        <p:txBody>
-          <a:bodyPr wrap="none" rtlCol="0">
-            <a:spAutoFit/>
-          </a:bodyPr>
-          <a:lstStyle/>
-          <a:p>
-            <a:r>
-              <a:rPr lang="en-GB" sz="1600" b="1" i="1" dirty="0" err="1">
-                <a:latin typeface="Roboto Mono" pitchFamily="2" charset="0"/>
-                <a:ea typeface="Roboto Mono" pitchFamily="2" charset="0"/>
-              </a:rPr>
-              <a:t>L</a:t>
-            </a:r>
-            <a:r>
-              <a:rPr lang="en-GB" sz="1600" b="1" i="1" baseline="-25000" dirty="0" err="1">
-                <a:latin typeface="Roboto Mono" pitchFamily="2" charset="0"/>
-                <a:ea typeface="Roboto Mono" pitchFamily="2" charset="0"/>
-              </a:rPr>
-              <a:t>peak</a:t>
-            </a:r>
-            <a:endParaRPr lang="en-GB" sz="1600" b="1" i="1" dirty="0">
-              <a:latin typeface="Roboto Mono" pitchFamily="2" charset="0"/>
-              <a:ea typeface="Roboto Mono" pitchFamily="2" charset="0"/>
-            </a:endParaRPr>
-          </a:p>
-        </p:txBody>
-      </p:sp>
-      <p:sp>
-        <p:nvSpPr>
-          <p:cNvPr id="113" name="TextBox 112">
-            <a:extLst>
-              <a:ext uri="{FF2B5EF4-FFF2-40B4-BE49-F238E27FC236}">
-                <a16:creationId xmlns:a16="http://schemas.microsoft.com/office/drawing/2014/main" id="{4500FE40-059D-1340-8F28-0F42274A446E}"/>
-              </a:ext>
-            </a:extLst>
-          </p:cNvPr>
-          <p:cNvSpPr txBox="1"/>
-          <p:nvPr/>
-        </p:nvSpPr>
-        <p:spPr>
-          <a:xfrm rot="18900000">
-            <a:off x="12323954" y="13407424"/>
-            <a:ext cx="614271" cy="307777"/>
-          </a:xfrm>
-          <a:prstGeom prst="rect">
-            <a:avLst/>
-          </a:prstGeom>
-          <a:noFill/>
-        </p:spPr>
-        <p:txBody>
-          <a:bodyPr wrap="none" rtlCol="0">
-            <a:spAutoFit/>
-          </a:bodyPr>
-          <a:lstStyle/>
-          <a:p>
-            <a:r>
-              <a:rPr lang="en-GB" sz="1400" dirty="0">
-                <a:latin typeface="Roboto Mono" pitchFamily="2" charset="0"/>
-                <a:ea typeface="Roboto Mono" pitchFamily="2" charset="0"/>
-              </a:rPr>
-              <a:t>3.50</a:t>
-            </a:r>
-          </a:p>
-        </p:txBody>
-      </p:sp>
-      <p:sp>
-        <p:nvSpPr>
-          <p:cNvPr id="114" name="TextBox 113">
-            <a:extLst>
-              <a:ext uri="{FF2B5EF4-FFF2-40B4-BE49-F238E27FC236}">
-                <a16:creationId xmlns:a16="http://schemas.microsoft.com/office/drawing/2014/main" id="{78D5EDC2-D604-AF45-8C79-90E4EE6F1954}"/>
-              </a:ext>
-            </a:extLst>
-          </p:cNvPr>
-          <p:cNvSpPr txBox="1"/>
-          <p:nvPr/>
-        </p:nvSpPr>
-        <p:spPr>
-          <a:xfrm rot="18900000">
-            <a:off x="12777917" y="13400534"/>
-            <a:ext cx="614271" cy="307777"/>
-          </a:xfrm>
-          <a:prstGeom prst="rect">
-            <a:avLst/>
-          </a:prstGeom>
-          <a:noFill/>
-        </p:spPr>
-        <p:txBody>
-          <a:bodyPr wrap="none" rtlCol="0">
-            <a:spAutoFit/>
-          </a:bodyPr>
-          <a:lstStyle/>
-          <a:p>
-            <a:r>
-              <a:rPr lang="en-GB" sz="1400" dirty="0">
-                <a:latin typeface="Roboto Mono" pitchFamily="2" charset="0"/>
-                <a:ea typeface="Roboto Mono" pitchFamily="2" charset="0"/>
-              </a:rPr>
-              <a:t>3.75</a:t>
-            </a:r>
-          </a:p>
-        </p:txBody>
-      </p:sp>
-      <p:sp>
-        <p:nvSpPr>
-          <p:cNvPr id="115" name="TextBox 114">
-            <a:extLst>
-              <a:ext uri="{FF2B5EF4-FFF2-40B4-BE49-F238E27FC236}">
-                <a16:creationId xmlns:a16="http://schemas.microsoft.com/office/drawing/2014/main" id="{8AAD1905-FFE2-8A4C-9593-F1A28C1D0F46}"/>
-              </a:ext>
-            </a:extLst>
-          </p:cNvPr>
-          <p:cNvSpPr txBox="1"/>
-          <p:nvPr/>
-        </p:nvSpPr>
-        <p:spPr>
-          <a:xfrm rot="18900000">
-            <a:off x="13156397" y="13411791"/>
-            <a:ext cx="614271" cy="307777"/>
-          </a:xfrm>
-          <a:prstGeom prst="rect">
-            <a:avLst/>
-          </a:prstGeom>
-          <a:noFill/>
-        </p:spPr>
-        <p:txBody>
-          <a:bodyPr wrap="none" rtlCol="0">
-            <a:spAutoFit/>
-          </a:bodyPr>
-          <a:lstStyle/>
-          <a:p>
-            <a:r>
-              <a:rPr lang="en-GB" sz="1400" dirty="0">
-                <a:latin typeface="Roboto Mono" pitchFamily="2" charset="0"/>
-                <a:ea typeface="Roboto Mono" pitchFamily="2" charset="0"/>
-              </a:rPr>
-              <a:t>4.00</a:t>
-            </a:r>
-          </a:p>
-        </p:txBody>
-      </p:sp>
-      <p:sp>
-        <p:nvSpPr>
-          <p:cNvPr id="116" name="TextBox 115">
-            <a:extLst>
-              <a:ext uri="{FF2B5EF4-FFF2-40B4-BE49-F238E27FC236}">
-                <a16:creationId xmlns:a16="http://schemas.microsoft.com/office/drawing/2014/main" id="{8D9D47DB-7D69-D347-8E6C-33102BF055E5}"/>
-              </a:ext>
-            </a:extLst>
-          </p:cNvPr>
-          <p:cNvSpPr txBox="1"/>
-          <p:nvPr/>
-        </p:nvSpPr>
-        <p:spPr>
-          <a:xfrm rot="18900000">
-            <a:off x="13604448" y="13403652"/>
-            <a:ext cx="614271" cy="307777"/>
-          </a:xfrm>
-          <a:prstGeom prst="rect">
-            <a:avLst/>
-          </a:prstGeom>
-          <a:noFill/>
-        </p:spPr>
-        <p:txBody>
-          <a:bodyPr wrap="none" rtlCol="0">
-            <a:spAutoFit/>
-          </a:bodyPr>
-          <a:lstStyle/>
-          <a:p>
-            <a:r>
-              <a:rPr lang="en-GB" sz="1400" dirty="0">
-                <a:latin typeface="Roboto Mono" pitchFamily="2" charset="0"/>
-                <a:ea typeface="Roboto Mono" pitchFamily="2" charset="0"/>
-              </a:rPr>
-              <a:t>4.25</a:t>
-            </a:r>
-          </a:p>
-        </p:txBody>
-      </p:sp>
-      <p:sp>
-        <p:nvSpPr>
-          <p:cNvPr id="117" name="TextBox 116">
-            <a:extLst>
-              <a:ext uri="{FF2B5EF4-FFF2-40B4-BE49-F238E27FC236}">
-                <a16:creationId xmlns:a16="http://schemas.microsoft.com/office/drawing/2014/main" id="{70AB2369-BB27-CF41-B649-D1EE49B5E5A1}"/>
-              </a:ext>
-            </a:extLst>
-          </p:cNvPr>
-          <p:cNvSpPr txBox="1"/>
-          <p:nvPr/>
-        </p:nvSpPr>
-        <p:spPr>
-          <a:xfrm>
-            <a:off x="10280164" y="14041118"/>
-            <a:ext cx="4410671" cy="2539157"/>
-          </a:xfrm>
-          <a:prstGeom prst="rect">
-            <a:avLst/>
-          </a:prstGeom>
-          <a:noFill/>
-        </p:spPr>
-        <p:txBody>
           <a:bodyPr wrap="square" rtlCol="0">
             <a:spAutoFit/>
           </a:bodyPr>
           <a:lstStyle/>
           <a:p>
             <a:r>
-              <a:rPr lang="en-GB" sz="1450" dirty="0">
+              <a:rPr lang="en-GB" sz="1600" dirty="0">
                 <a:latin typeface="Roboto Mono" pitchFamily="2" charset="0"/>
                 <a:ea typeface="Roboto Mono" pitchFamily="2" charset="0"/>
               </a:rPr>
-              <a:t>FIG. 2: Plot showing the MCMC sample space. </a:t>
-            </a:r>
-            <a:r>
-              <a:rPr lang="el-GR" sz="1400" b="1" i="1" dirty="0">
+              <a:t>To build on using ΛCDM, our future research would involve setting </a:t>
+            </a:r>
+            <a:r>
+              <a:rPr lang="en-GB" sz="1600" b="1" i="1" dirty="0">
                 <a:latin typeface="Roboto Mono" pitchFamily="2" charset="0"/>
                 <a:ea typeface="Roboto Mono" pitchFamily="2" charset="0"/>
               </a:rPr>
-              <a:t>Ω</a:t>
-            </a:r>
-            <a:r>
-              <a:rPr lang="en-GB" sz="1400" b="1" i="1" baseline="-25000" dirty="0">
+              <a:t>X(z)</a:t>
+            </a:r>
+            <a:r>
+              <a:rPr lang="en-GB" sz="1600" dirty="0">
                 <a:latin typeface="Roboto Mono" pitchFamily="2" charset="0"/>
                 <a:ea typeface="Roboto Mono" pitchFamily="2" charset="0"/>
               </a:rPr>
-              <a:t>Λ</a:t>
-            </a:r>
-            <a:r>
-              <a:rPr lang="en-GB" sz="1400" b="1" dirty="0">
+              <a:t> equal to </a:t>
+            </a:r>
+            <a:r>
+              <a:rPr lang="en-GB" sz="1600" b="1" i="1" dirty="0">
                 <a:latin typeface="Roboto Mono" pitchFamily="2" charset="0"/>
                 <a:ea typeface="Roboto Mono" pitchFamily="2" charset="0"/>
               </a:rPr>
-              <a:t> </a:t>
-            </a:r>
-            <a:r>
-              <a:rPr lang="en-GB" sz="1400" dirty="0">
+              <a:t>(1+z)</a:t>
+            </a:r>
+            <a:r>
+              <a:rPr lang="en-GB" sz="1600" b="1" i="1" baseline="30000" dirty="0">
                 <a:latin typeface="Roboto Mono" pitchFamily="2" charset="0"/>
                 <a:ea typeface="Roboto Mono" pitchFamily="2" charset="0"/>
               </a:rPr>
-              <a:t>was fitted with </a:t>
-            </a:r>
-            <a:r>
-              <a:rPr lang="en-GB" sz="1400" b="1" i="1" dirty="0" err="1">
+              <a:t>3(1+</a:t>
+            </a:r>
+            <a:r>
+              <a:rPr lang="el-GR" sz="1600" b="1" i="1" baseline="30000" dirty="0">
                 <a:latin typeface="Roboto Mono" pitchFamily="2" charset="0"/>
                 <a:ea typeface="Roboto Mono" pitchFamily="2" charset="0"/>
               </a:rPr>
-              <a:t>L</a:t>
-            </a:r>
-            <a:r>
-              <a:rPr lang="en-GB" sz="1400" b="1" i="1" baseline="-25000" dirty="0" err="1">
+              <a:t>ω</a:t>
+            </a:r>
+            <a:r>
+              <a:rPr lang="en-GB" sz="1600" b="1" i="1" baseline="30000" dirty="0">
                 <a:latin typeface="Roboto Mono" pitchFamily="2" charset="0"/>
                 <a:ea typeface="Roboto Mono" pitchFamily="2" charset="0"/>
               </a:rPr>
-              <a:t>peak</a:t>
-            </a:r>
-            <a:r>
-              <a:rPr lang="en-GB" sz="1400" dirty="0">
+              <a:t>)</a:t>
+            </a:r>
+            <a:r>
+              <a:rPr lang="en-GB" sz="1600" dirty="0">
                 <a:latin typeface="Roboto Mono" pitchFamily="2" charset="0"/>
                 <a:ea typeface="Roboto Mono" pitchFamily="2" charset="0"/>
               </a:rPr>
-              <a:t>, an extra variable in the supernova flux model.</a:t>
-            </a:r>
-            <a:r>
-              <a:rPr lang="en-GB" sz="1400" b="1" i="1" dirty="0">
+              <a:t>, where </a:t>
+            </a:r>
+            <a:r>
+              <a:rPr lang="el-GR" sz="1600" b="1" i="1" dirty="0">
                 <a:latin typeface="Roboto Mono" pitchFamily="2" charset="0"/>
                 <a:ea typeface="Roboto Mono" pitchFamily="2" charset="0"/>
               </a:rPr>
-              <a:t> </a:t>
-            </a:r>
-            <a:r>
-              <a:rPr lang="en-GB" sz="1450" dirty="0">
+              <a:t>ω</a:t>
+            </a:r>
+            <a:r>
+              <a:rPr lang="en-GB" sz="1600" dirty="0">
                 <a:latin typeface="Roboto Mono" pitchFamily="2" charset="0"/>
                 <a:ea typeface="Roboto Mono" pitchFamily="2" charset="0"/>
               </a:rPr>
-              <a:t>15,000 parameter values were tested over 10 runs of 1500 tests each. The red dot shows the initial search, the blue shows the most likely from each run, and the green is the final averaged values. The red ellipses show the standard deviation spread (1</a:t>
-            </a:r>
-            <a:r>
-              <a:rPr lang="el-GR" sz="1450" dirty="0">
+              <a:t> is the dark energy equation of state. This would incorporate </a:t>
+            </a:r>
+            <a:r>
+              <a:rPr lang="en-GB" sz="1600" dirty="0">
+                <a:latin typeface="Roboto Mono Medium" pitchFamily="2" charset="0"/>
+                <a:ea typeface="Roboto Mono Medium" pitchFamily="2" charset="0"/>
+              </a:rPr>
+              <a:t>quintessence</a:t>
+            </a:r>
+            <a:r>
+              <a:rPr lang="en-GB" sz="1600" dirty="0">
                 <a:latin typeface="Roboto Mono" pitchFamily="2" charset="0"/>
                 <a:ea typeface="Roboto Mono" pitchFamily="2" charset="0"/>
               </a:rPr>
-              <a:t>σ</a:t>
-            </a:r>
-            <a:r>
-              <a:rPr lang="en-GB" sz="1450" dirty="0">
-                <a:latin typeface="Roboto Mono" pitchFamily="2" charset="0"/>
-                <a:ea typeface="Roboto Mono" pitchFamily="2" charset="0"/>
-              </a:rPr>
-              <a:t>, 2</a:t>
-            </a:r>
-            <a:r>
-              <a:rPr lang="el-GR" sz="1450" dirty="0">
-                <a:latin typeface="Roboto Mono" pitchFamily="2" charset="0"/>
-                <a:ea typeface="Roboto Mono" pitchFamily="2" charset="0"/>
-              </a:rPr>
-              <a:t>σ</a:t>
-            </a:r>
-            <a:r>
-              <a:rPr lang="en-GB" sz="1450" dirty="0">
-                <a:latin typeface="Roboto Mono" pitchFamily="2" charset="0"/>
-                <a:ea typeface="Roboto Mono" pitchFamily="2" charset="0"/>
-              </a:rPr>
-              <a:t>, and 3</a:t>
-            </a:r>
-            <a:r>
-              <a:rPr lang="el-GR" sz="1450" dirty="0">
-                <a:latin typeface="Roboto Mono" pitchFamily="2" charset="0"/>
-                <a:ea typeface="Roboto Mono" pitchFamily="2" charset="0"/>
-              </a:rPr>
-              <a:t>σ</a:t>
-            </a:r>
-            <a:r>
-              <a:rPr lang="en-GB" sz="1450" dirty="0">
-                <a:latin typeface="Roboto Mono" pitchFamily="2" charset="0"/>
-                <a:ea typeface="Roboto Mono" pitchFamily="2" charset="0"/>
-              </a:rPr>
-              <a:t>).</a:t>
+              <a:t> into our model and allow us to constrain even more parameters together. But, we must be aware that there may be a large correlation between some parameters this would definitely need to be corrected for.</a:t>
             </a:r>
           </a:p>
         </p:txBody>
@@ -7858,7 +8100,7 @@
         </p:nvSpPr>
         <p:spPr>
           <a:xfrm>
-            <a:off x="5076429" y="11395264"/>
+            <a:off x="5462666" y="11394111"/>
             <a:ext cx="4441238" cy="369332"/>
           </a:xfrm>
           <a:prstGeom prst="rect">
@@ -7985,7 +8227,7 @@
         </p:nvSpPr>
         <p:spPr>
           <a:xfrm>
-            <a:off x="418797" y="13640183"/>
+            <a:off x="418797" y="13767773"/>
             <a:ext cx="4715888" cy="3908762"/>
           </a:xfrm>
           <a:prstGeom prst="rect">
@@ -8133,7 +8375,7 @@
         </p:nvSpPr>
         <p:spPr>
           <a:xfrm>
-            <a:off x="5133106" y="10185351"/>
+            <a:off x="5344521" y="10185484"/>
             <a:ext cx="4565923" cy="523220"/>
           </a:xfrm>
           <a:prstGeom prst="rect">
@@ -8174,7 +8416,7 @@
         </p:nvSpPr>
         <p:spPr>
           <a:xfrm>
-            <a:off x="5292070" y="10611882"/>
+            <a:off x="5504494" y="10632361"/>
             <a:ext cx="4738714" cy="830997"/>
           </a:xfrm>
           <a:prstGeom prst="rect">
@@ -8240,7 +8482,7 @@
         </p:nvSpPr>
         <p:spPr>
           <a:xfrm>
-            <a:off x="7573108" y="17759942"/>
+            <a:off x="7554588" y="17866268"/>
             <a:ext cx="6012482" cy="461665"/>
           </a:xfrm>
           <a:prstGeom prst="rect">
@@ -8281,7 +8523,7 @@
         </p:nvSpPr>
         <p:spPr>
           <a:xfrm>
-            <a:off x="5676284" y="11728787"/>
+            <a:off x="5951977" y="11706951"/>
             <a:ext cx="4441238" cy="369332"/>
           </a:xfrm>
           <a:prstGeom prst="rect">
@@ -8344,6 +8586,47 @@
                 <a:ea typeface="Roboto Mono Medium" pitchFamily="2" charset="0"/>
               </a:rPr>
               <a:t>,</a:t>
+            </a:r>
+          </a:p>
+        </p:txBody>
+      </p:sp>
+      <p:sp>
+        <p:nvSpPr>
+          <p:cNvPr id="127" name="TextBox 126">
+            <a:extLst>
+              <a:ext uri="{FF2B5EF4-FFF2-40B4-BE49-F238E27FC236}">
+                <a16:creationId xmlns:a16="http://schemas.microsoft.com/office/drawing/2014/main" id="{7C19B27A-0103-FC4A-8D6E-4BAAD368AA95}"/>
+              </a:ext>
+            </a:extLst>
+          </p:cNvPr>
+          <p:cNvSpPr txBox="1"/>
+          <p:nvPr/>
+        </p:nvSpPr>
+        <p:spPr>
+          <a:xfrm>
+            <a:off x="5348021" y="14356572"/>
+            <a:ext cx="4565923" cy="523220"/>
+          </a:xfrm>
+          <a:prstGeom prst="rect">
+            <a:avLst/>
+          </a:prstGeom>
+          <a:noFill/>
+        </p:spPr>
+        <p:txBody>
+          <a:bodyPr wrap="square" rtlCol="0">
+            <a:spAutoFit/>
+          </a:bodyPr>
+          <a:lstStyle/>
+          <a:p>
+            <a:r>
+              <a:rPr lang="en-GB" sz="2800" b="1" i="1" dirty="0">
+                <a:solidFill>
+                  <a:srgbClr val="757575"/>
+                </a:solidFill>
+                <a:latin typeface="Roboto Mono" pitchFamily="2" charset="0"/>
+                <a:ea typeface="Roboto Mono" pitchFamily="2" charset="0"/>
+              </a:rPr>
+              <a:t>An extra parameter</a:t>
             </a:r>
           </a:p>
         </p:txBody>
@@ -8362,8 +8645,8 @@
         </p:nvSpPr>
         <p:spPr>
           <a:xfrm>
-            <a:off x="5209721" y="12080792"/>
-            <a:ext cx="4770573" cy="3293209"/>
+            <a:off x="5509549" y="12059851"/>
+            <a:ext cx="4741033" cy="3231654"/>
           </a:xfrm>
           <a:prstGeom prst="rect">
             <a:avLst/>
@@ -8523,162 +8806,96 @@
           </a:p>
         </p:txBody>
       </p:sp>
-      <p:sp>
-        <p:nvSpPr>
-          <p:cNvPr id="127" name="TextBox 126">
+      <p:cxnSp>
+        <p:nvCxnSpPr>
+          <p:cNvPr id="133" name="Straight Connector 132">
             <a:extLst>
               <a:ext uri="{FF2B5EF4-FFF2-40B4-BE49-F238E27FC236}">
-                <a16:creationId xmlns:a16="http://schemas.microsoft.com/office/drawing/2014/main" id="{7C19B27A-0103-FC4A-8D6E-4BAAD368AA95}"/>
+                <a16:creationId xmlns:a16="http://schemas.microsoft.com/office/drawing/2014/main" id="{7421E667-C462-7E4A-8C38-B40ECFA7431E}"/>
               </a:ext>
             </a:extLst>
           </p:cNvPr>
-          <p:cNvSpPr txBox="1"/>
+          <p:cNvCxnSpPr>
+            <a:cxnSpLocks/>
+          </p:cNvCxnSpPr>
           <p:nvPr/>
-        </p:nvSpPr>
+        </p:nvCxnSpPr>
         <p:spPr>
           <a:xfrm>
-            <a:off x="5072232" y="14275080"/>
-            <a:ext cx="4565923" cy="523220"/>
+            <a:off x="257881" y="13357632"/>
+            <a:ext cx="4793086" cy="0"/>
           </a:xfrm>
-          <a:prstGeom prst="rect">
+          <a:prstGeom prst="line">
             <a:avLst/>
           </a:prstGeom>
-          <a:noFill/>
+          <a:ln>
+            <a:solidFill>
+              <a:srgbClr val="757575">
+                <a:alpha val="25000"/>
+              </a:srgbClr>
+            </a:solidFill>
+          </a:ln>
         </p:spPr>
-        <p:txBody>
-          <a:bodyPr wrap="square" rtlCol="0">
-            <a:spAutoFit/>
-          </a:bodyPr>
-          <a:lstStyle/>
-          <a:p>
-            <a:r>
-              <a:rPr lang="en-GB" sz="2800" b="1" i="1" dirty="0">
-                <a:solidFill>
-                  <a:srgbClr val="757575"/>
-                </a:solidFill>
-                <a:latin typeface="Roboto Mono" pitchFamily="2" charset="0"/>
-                <a:ea typeface="Roboto Mono" pitchFamily="2" charset="0"/>
-              </a:rPr>
-              <a:t>An extra parameter</a:t>
-            </a:r>
-          </a:p>
-        </p:txBody>
-      </p:sp>
-      <p:sp>
-        <p:nvSpPr>
-          <p:cNvPr id="128" name="TextBox 127">
+        <p:style>
+          <a:lnRef idx="1">
+            <a:schemeClr val="accent1"/>
+          </a:lnRef>
+          <a:fillRef idx="0">
+            <a:schemeClr val="accent1"/>
+          </a:fillRef>
+          <a:effectRef idx="0">
+            <a:schemeClr val="accent1"/>
+          </a:effectRef>
+          <a:fontRef idx="minor">
+            <a:schemeClr val="tx1"/>
+          </a:fontRef>
+        </p:style>
+      </p:cxnSp>
+      <p:cxnSp>
+        <p:nvCxnSpPr>
+          <p:cNvPr id="136" name="Straight Connector 135">
             <a:extLst>
               <a:ext uri="{FF2B5EF4-FFF2-40B4-BE49-F238E27FC236}">
-                <a16:creationId xmlns:a16="http://schemas.microsoft.com/office/drawing/2014/main" id="{CFEDAAB9-C904-134C-A70E-2DED0B59AF37}"/>
+                <a16:creationId xmlns:a16="http://schemas.microsoft.com/office/drawing/2014/main" id="{991C2327-262F-1F47-8E94-C2D2F76B4999}"/>
               </a:ext>
             </a:extLst>
           </p:cNvPr>
-          <p:cNvSpPr txBox="1"/>
+          <p:cNvCxnSpPr>
+            <a:cxnSpLocks/>
+          </p:cNvCxnSpPr>
           <p:nvPr/>
-        </p:nvSpPr>
+        </p:nvCxnSpPr>
         <p:spPr>
           <a:xfrm>
-            <a:off x="5279385" y="14756460"/>
-            <a:ext cx="4770573" cy="2800767"/>
+            <a:off x="5304760" y="14372578"/>
+            <a:ext cx="4645994" cy="0"/>
           </a:xfrm>
-          <a:prstGeom prst="rect">
+          <a:prstGeom prst="line">
             <a:avLst/>
           </a:prstGeom>
-          <a:noFill/>
+          <a:ln>
+            <a:solidFill>
+              <a:srgbClr val="757575">
+                <a:alpha val="25000"/>
+              </a:srgbClr>
+            </a:solidFill>
+          </a:ln>
         </p:spPr>
-        <p:txBody>
-          <a:bodyPr wrap="square" rtlCol="0">
-            <a:spAutoFit/>
-          </a:bodyPr>
-          <a:lstStyle/>
-          <a:p>
-            <a:r>
-              <a:rPr lang="en-GB" sz="1600" dirty="0">
-                <a:latin typeface="Roboto Mono" pitchFamily="2" charset="0"/>
-                <a:ea typeface="Roboto Mono" pitchFamily="2" charset="0"/>
-              </a:rPr>
-              <a:t>To build on using ΛCDM, our future research would involve setting </a:t>
-            </a:r>
-            <a:r>
-              <a:rPr lang="en-GB" sz="1600" b="1" i="1" dirty="0">
-                <a:latin typeface="Roboto Mono" pitchFamily="2" charset="0"/>
-                <a:ea typeface="Roboto Mono" pitchFamily="2" charset="0"/>
-              </a:rPr>
-              <a:t>X(z)</a:t>
-            </a:r>
-            <a:r>
-              <a:rPr lang="en-GB" sz="1600" dirty="0">
-                <a:latin typeface="Roboto Mono" pitchFamily="2" charset="0"/>
-                <a:ea typeface="Roboto Mono" pitchFamily="2" charset="0"/>
-              </a:rPr>
-              <a:t> equal to </a:t>
-            </a:r>
-            <a:r>
-              <a:rPr lang="en-GB" sz="1600" b="1" i="1" dirty="0">
-                <a:latin typeface="Roboto Mono" pitchFamily="2" charset="0"/>
-                <a:ea typeface="Roboto Mono" pitchFamily="2" charset="0"/>
-              </a:rPr>
-              <a:t>(1+z)</a:t>
-            </a:r>
-            <a:r>
-              <a:rPr lang="en-GB" sz="1600" b="1" i="1" baseline="30000" dirty="0">
-                <a:latin typeface="Roboto Mono" pitchFamily="2" charset="0"/>
-                <a:ea typeface="Roboto Mono" pitchFamily="2" charset="0"/>
-              </a:rPr>
-              <a:t>3(1+</a:t>
-            </a:r>
-            <a:r>
-              <a:rPr lang="el-GR" sz="1600" b="1" i="1" baseline="30000" dirty="0">
-                <a:latin typeface="Roboto Mono" pitchFamily="2" charset="0"/>
-                <a:ea typeface="Roboto Mono" pitchFamily="2" charset="0"/>
-              </a:rPr>
-              <a:t>ω</a:t>
-            </a:r>
-            <a:r>
-              <a:rPr lang="en-GB" sz="1600" b="1" i="1" baseline="30000" dirty="0">
-                <a:latin typeface="Roboto Mono" pitchFamily="2" charset="0"/>
-                <a:ea typeface="Roboto Mono" pitchFamily="2" charset="0"/>
-              </a:rPr>
-              <a:t>)</a:t>
-            </a:r>
-            <a:r>
-              <a:rPr lang="en-GB" sz="1600" dirty="0">
-                <a:latin typeface="Roboto Mono" pitchFamily="2" charset="0"/>
-                <a:ea typeface="Roboto Mono" pitchFamily="2" charset="0"/>
-              </a:rPr>
-              <a:t>, where </a:t>
-            </a:r>
-            <a:r>
-              <a:rPr lang="el-GR" sz="1600" b="1" i="1" dirty="0">
-                <a:latin typeface="Roboto Mono" pitchFamily="2" charset="0"/>
-                <a:ea typeface="Roboto Mono" pitchFamily="2" charset="0"/>
-              </a:rPr>
-              <a:t>ω</a:t>
-            </a:r>
-            <a:r>
-              <a:rPr lang="en-GB" sz="1600" dirty="0">
-                <a:latin typeface="Roboto Mono" pitchFamily="2" charset="0"/>
-                <a:ea typeface="Roboto Mono" pitchFamily="2" charset="0"/>
-              </a:rPr>
-              <a:t> is the dark energy equation of state. This would incorporate </a:t>
-            </a:r>
-            <a:r>
-              <a:rPr lang="en-GB" sz="1600" dirty="0">
-                <a:latin typeface="Roboto Mono Medium" pitchFamily="2" charset="0"/>
-                <a:ea typeface="Roboto Mono Medium" pitchFamily="2" charset="0"/>
-              </a:rPr>
-              <a:t>quintessence</a:t>
-            </a:r>
-            <a:r>
-              <a:rPr lang="en-GB" sz="1600" dirty="0">
-                <a:latin typeface="Roboto Mono" pitchFamily="2" charset="0"/>
-                <a:ea typeface="Roboto Mono" pitchFamily="2" charset="0"/>
-              </a:rPr>
-              <a:t> into our model and allow us to constrain even more parameters together. But, we must be aware that there may be a large correlation between some parameters this would definitely need to be corrected for.</a:t>
-            </a:r>
-          </a:p>
-        </p:txBody>
-      </p:sp>
+        <p:style>
+          <a:lnRef idx="1">
+            <a:schemeClr val="accent1"/>
+          </a:lnRef>
+          <a:fillRef idx="0">
+            <a:schemeClr val="accent1"/>
+          </a:fillRef>
+          <a:effectRef idx="0">
+            <a:schemeClr val="accent1"/>
+          </a:effectRef>
+          <a:fontRef idx="minor">
+            <a:schemeClr val="tx1"/>
+          </a:fontRef>
+        </p:style>
+      </p:cxnSp>
     </p:spTree>
     <p:extLst>
       <p:ext uri="{BB962C8B-B14F-4D97-AF65-F5344CB8AC3E}">

</xml_diff>